<commit_message>
updated slides and fixes presentation
</commit_message>
<xml_diff>
--- a/PSDayUK2023_DurableFunctions_EmanuelPalm.pptx
+++ b/PSDayUK2023_DurableFunctions_EmanuelPalm.pptx
@@ -5019,38 +5019,6 @@
     </pc:docChg>
   </pc:docChgLst>
   <pc:docChgLst>
-    <pc:chgData name="Geoffroy Dubreuil" userId="S::geoffroydubreuil@synedgy.com::36186b9b-dc71-47e0-bff2-bd95e619117d" providerId="AD" clId="Web-{70831B7B-7240-2930-905C-5A029E9F81C9}"/>
-    <pc:docChg chg="modSld">
-      <pc:chgData name="Geoffroy Dubreuil" userId="S::geoffroydubreuil@synedgy.com::36186b9b-dc71-47e0-bff2-bd95e619117d" providerId="AD" clId="Web-{70831B7B-7240-2930-905C-5A029E9F81C9}" dt="2023-02-07T13:04:13.485" v="6" actId="1076"/>
-      <pc:docMkLst>
-        <pc:docMk/>
-      </pc:docMkLst>
-      <pc:sldChg chg="addSp modSp">
-        <pc:chgData name="Geoffroy Dubreuil" userId="S::geoffroydubreuil@synedgy.com::36186b9b-dc71-47e0-bff2-bd95e619117d" providerId="AD" clId="Web-{70831B7B-7240-2930-905C-5A029E9F81C9}" dt="2023-02-07T13:04:13.485" v="6" actId="1076"/>
-        <pc:sldMkLst>
-          <pc:docMk/>
-          <pc:sldMk cId="3984835757" sldId="261"/>
-        </pc:sldMkLst>
-        <pc:picChg chg="mod">
-          <ac:chgData name="Geoffroy Dubreuil" userId="S::geoffroydubreuil@synedgy.com::36186b9b-dc71-47e0-bff2-bd95e619117d" providerId="AD" clId="Web-{70831B7B-7240-2930-905C-5A029E9F81C9}" dt="2023-02-07T13:04:13.485" v="6" actId="1076"/>
-          <ac:picMkLst>
-            <pc:docMk/>
-            <pc:sldMk cId="3984835757" sldId="261"/>
-            <ac:picMk id="3" creationId="{FE381F8E-136A-9F6A-5074-1DBF37A9F9D8}"/>
-          </ac:picMkLst>
-        </pc:picChg>
-        <pc:picChg chg="add mod">
-          <ac:chgData name="Geoffroy Dubreuil" userId="S::geoffroydubreuil@synedgy.com::36186b9b-dc71-47e0-bff2-bd95e619117d" providerId="AD" clId="Web-{70831B7B-7240-2930-905C-5A029E9F81C9}" dt="2023-02-07T13:04:13.438" v="5" actId="1076"/>
-          <ac:picMkLst>
-            <pc:docMk/>
-            <pc:sldMk cId="3984835757" sldId="261"/>
-            <ac:picMk id="5" creationId="{1491D86D-0DB3-80B4-D474-91F8617C6E00}"/>
-          </ac:picMkLst>
-        </pc:picChg>
-      </pc:sldChg>
-    </pc:docChg>
-  </pc:docChgLst>
-  <pc:docChgLst>
     <pc:chgData name="Geoffroy Dubreuil" userId="36186b9b-dc71-47e0-bff2-bd95e619117d" providerId="ADAL" clId="{FDCFBEA8-E6B3-4B70-BD51-E497D37AE5D3}"/>
     <pc:docChg chg="undo custSel delSld modSld modMainMaster">
       <pc:chgData name="Geoffroy Dubreuil" userId="36186b9b-dc71-47e0-bff2-bd95e619117d" providerId="ADAL" clId="{FDCFBEA8-E6B3-4B70-BD51-E497D37AE5D3}" dt="2022-05-04T14:37:38.069" v="394" actId="478"/>
@@ -5441,6 +5409,38 @@
           </ac:picMkLst>
         </pc:picChg>
       </pc:sldMasterChg>
+    </pc:docChg>
+  </pc:docChgLst>
+  <pc:docChgLst>
+    <pc:chgData name="Geoffroy Dubreuil" userId="S::geoffroydubreuil@synedgy.com::36186b9b-dc71-47e0-bff2-bd95e619117d" providerId="AD" clId="Web-{70831B7B-7240-2930-905C-5A029E9F81C9}"/>
+    <pc:docChg chg="modSld">
+      <pc:chgData name="Geoffroy Dubreuil" userId="S::geoffroydubreuil@synedgy.com::36186b9b-dc71-47e0-bff2-bd95e619117d" providerId="AD" clId="Web-{70831B7B-7240-2930-905C-5A029E9F81C9}" dt="2023-02-07T13:04:13.485" v="6" actId="1076"/>
+      <pc:docMkLst>
+        <pc:docMk/>
+      </pc:docMkLst>
+      <pc:sldChg chg="addSp modSp">
+        <pc:chgData name="Geoffroy Dubreuil" userId="S::geoffroydubreuil@synedgy.com::36186b9b-dc71-47e0-bff2-bd95e619117d" providerId="AD" clId="Web-{70831B7B-7240-2930-905C-5A029E9F81C9}" dt="2023-02-07T13:04:13.485" v="6" actId="1076"/>
+        <pc:sldMkLst>
+          <pc:docMk/>
+          <pc:sldMk cId="3984835757" sldId="261"/>
+        </pc:sldMkLst>
+        <pc:picChg chg="mod">
+          <ac:chgData name="Geoffroy Dubreuil" userId="S::geoffroydubreuil@synedgy.com::36186b9b-dc71-47e0-bff2-bd95e619117d" providerId="AD" clId="Web-{70831B7B-7240-2930-905C-5A029E9F81C9}" dt="2023-02-07T13:04:13.485" v="6" actId="1076"/>
+          <ac:picMkLst>
+            <pc:docMk/>
+            <pc:sldMk cId="3984835757" sldId="261"/>
+            <ac:picMk id="3" creationId="{FE381F8E-136A-9F6A-5074-1DBF37A9F9D8}"/>
+          </ac:picMkLst>
+        </pc:picChg>
+        <pc:picChg chg="add mod">
+          <ac:chgData name="Geoffroy Dubreuil" userId="S::geoffroydubreuil@synedgy.com::36186b9b-dc71-47e0-bff2-bd95e619117d" providerId="AD" clId="Web-{70831B7B-7240-2930-905C-5A029E9F81C9}" dt="2023-02-07T13:04:13.438" v="5" actId="1076"/>
+          <ac:picMkLst>
+            <pc:docMk/>
+            <pc:sldMk cId="3984835757" sldId="261"/>
+            <ac:picMk id="5" creationId="{1491D86D-0DB3-80B4-D474-91F8617C6E00}"/>
+          </ac:picMkLst>
+        </pc:picChg>
+      </pc:sldChg>
     </pc:docChg>
   </pc:docChgLst>
   <pc:docChgLst>
@@ -7193,9 +7193,14 @@
           <a:p>
             <a:r>
               <a:rPr lang="en-US" dirty="0"/>
-              <a:t>6</a:t>
-            </a:r>
-            <a:endParaRPr lang="en-SE" dirty="0"/>
+              <a:t>2 hours back</a:t>
+            </a:r>
+          </a:p>
+          <a:p>
+            <a:r>
+              <a:rPr lang="en-US" dirty="0"/>
+              <a:t>108 days and 23 hours forward</a:t>
+            </a:r>
           </a:p>
         </p:txBody>
       </p:sp>
@@ -7216,7 +7221,7 @@
           <a:p>
             <a:fld id="{A7839206-A81D-4F76-8486-302187992F73}" type="slidenum">
               <a:rPr lang="en-GB" smtClean="0"/>
-              <a:t>6</a:t>
+              <a:t>5</a:t>
             </a:fld>
             <a:endParaRPr lang="en-GB"/>
           </a:p>
@@ -7225,7 +7230,7 @@
     </p:spTree>
     <p:extLst>
       <p:ext uri="{BB962C8B-B14F-4D97-AF65-F5344CB8AC3E}">
-        <p14:creationId xmlns:p14="http://schemas.microsoft.com/office/powerpoint/2010/main" val="3434972349"/>
+        <p14:creationId xmlns:p14="http://schemas.microsoft.com/office/powerpoint/2010/main" val="2341548269"/>
       </p:ext>
     </p:extLst>
   </p:cSld>
@@ -7280,588 +7285,10 @@
           <a:lstStyle/>
           <a:p>
             <a:r>
-              <a:rPr lang="sv-SE" sz="1800" dirty="0">
-                <a:effectLst/>
-                <a:latin typeface="Cascadia Mono" panose="020B0609020000020004" pitchFamily="49" charset="0"/>
-              </a:rPr>
-              <a:t>7</a:t>
-            </a:r>
-          </a:p>
-          <a:p>
-            <a:endParaRPr lang="sv-SE" sz="1800" dirty="0">
-              <a:effectLst/>
-              <a:latin typeface="Cascadia Mono" panose="020B0609020000020004" pitchFamily="49" charset="0"/>
-            </a:endParaRPr>
-          </a:p>
-          <a:p>
-            <a:r>
-              <a:rPr lang="sv-SE" sz="1800" dirty="0">
-                <a:effectLst/>
-                <a:latin typeface="Cascadia Mono" panose="020B0609020000020004" pitchFamily="49" charset="0"/>
-              </a:rPr>
-              <a:t>Image </a:t>
-            </a:r>
-            <a:r>
-              <a:rPr lang="sv-SE" sz="1800" dirty="0" err="1">
-                <a:effectLst/>
-                <a:latin typeface="Cascadia Mono" panose="020B0609020000020004" pitchFamily="49" charset="0"/>
-              </a:rPr>
-              <a:t>credit</a:t>
-            </a:r>
-            <a:r>
-              <a:rPr lang="sv-SE" sz="1800" dirty="0">
-                <a:effectLst/>
-                <a:latin typeface="Cascadia Mono" panose="020B0609020000020004" pitchFamily="49" charset="0"/>
-              </a:rPr>
-              <a:t>: Jeff </a:t>
-            </a:r>
-            <a:r>
-              <a:rPr lang="sv-SE" sz="1800" dirty="0" err="1">
-                <a:effectLst/>
-                <a:latin typeface="Cascadia Mono" panose="020B0609020000020004" pitchFamily="49" charset="0"/>
-              </a:rPr>
-              <a:t>Hollan’s</a:t>
-            </a:r>
-            <a:r>
-              <a:rPr lang="sv-SE" sz="1800" dirty="0">
-                <a:effectLst/>
-                <a:latin typeface="Cascadia Mono" panose="020B0609020000020004" pitchFamily="49" charset="0"/>
-              </a:rPr>
-              <a:t> presentation on Durable </a:t>
-            </a:r>
-            <a:r>
-              <a:rPr lang="sv-SE" sz="1800" dirty="0" err="1">
-                <a:effectLst/>
-                <a:latin typeface="Cascadia Mono" panose="020B0609020000020004" pitchFamily="49" charset="0"/>
-              </a:rPr>
-              <a:t>Functions</a:t>
-            </a:r>
-            <a:r>
-              <a:rPr lang="sv-SE" sz="1800" dirty="0">
-                <a:effectLst/>
-                <a:latin typeface="Cascadia Mono" panose="020B0609020000020004" pitchFamily="49" charset="0"/>
-              </a:rPr>
-              <a:t> 2.0 at </a:t>
-            </a:r>
-            <a:r>
-              <a:rPr lang="sv-SE" sz="1800" dirty="0" err="1">
-                <a:effectLst/>
-                <a:latin typeface="Cascadia Mono" panose="020B0609020000020004" pitchFamily="49" charset="0"/>
-              </a:rPr>
-              <a:t>DotNetConf</a:t>
-            </a:r>
-            <a:r>
-              <a:rPr lang="sv-SE" sz="1800" dirty="0">
-                <a:effectLst/>
-                <a:latin typeface="Cascadia Mono" panose="020B0609020000020004" pitchFamily="49" charset="0"/>
-              </a:rPr>
-              <a:t> 2019</a:t>
-            </a:r>
-          </a:p>
-          <a:p>
-            <a:endParaRPr lang="sv-SE" sz="1800" dirty="0">
-              <a:effectLst/>
-              <a:latin typeface="Cascadia Mono" panose="020B0609020000020004" pitchFamily="49" charset="0"/>
-            </a:endParaRPr>
-          </a:p>
-          <a:p>
-            <a:r>
-              <a:rPr lang="en-US" sz="2800" b="0" dirty="0">
-                <a:solidFill>
-                  <a:srgbClr val="DCDCAA"/>
-                </a:solidFill>
-                <a:effectLst/>
-                <a:latin typeface="Cascadia Code Regular" panose="020B0609020000020004" pitchFamily="49" charset="0"/>
-              </a:rPr>
-              <a:t>Get-</a:t>
-            </a:r>
-            <a:r>
-              <a:rPr lang="en-US" sz="2800" b="0" dirty="0" err="1">
-                <a:solidFill>
-                  <a:srgbClr val="DCDCAA"/>
-                </a:solidFill>
-                <a:effectLst/>
-                <a:latin typeface="Cascadia Code Regular" panose="020B0609020000020004" pitchFamily="49" charset="0"/>
-              </a:rPr>
-              <a:t>ChildItem</a:t>
-            </a:r>
-            <a:r>
-              <a:rPr lang="en-US" sz="2800" b="0" dirty="0">
-                <a:solidFill>
-                  <a:srgbClr val="FFFFFF"/>
-                </a:solidFill>
-                <a:effectLst/>
-                <a:latin typeface="Cascadia Code Regular" panose="020B0609020000020004" pitchFamily="49" charset="0"/>
-              </a:rPr>
-              <a:t> </a:t>
-            </a:r>
-            <a:r>
-              <a:rPr lang="en-US" sz="2800" b="0" dirty="0">
-                <a:solidFill>
-                  <a:srgbClr val="CE9178"/>
-                </a:solidFill>
-                <a:effectLst/>
-                <a:latin typeface="Cascadia Code Regular" panose="020B0609020000020004" pitchFamily="49" charset="0"/>
-              </a:rPr>
-              <a:t>"</a:t>
-            </a:r>
-            <a:r>
-              <a:rPr lang="en-US" sz="2800" b="0" dirty="0">
-                <a:solidFill>
-                  <a:srgbClr val="569CD6"/>
-                </a:solidFill>
-                <a:effectLst/>
-                <a:latin typeface="Cascadia Code Regular" panose="020B0609020000020004" pitchFamily="49" charset="0"/>
-              </a:rPr>
-              <a:t>$(</a:t>
-            </a:r>
-            <a:r>
-              <a:rPr lang="en-US" sz="2800" b="0" dirty="0">
-                <a:solidFill>
-                  <a:srgbClr val="DCDCAA"/>
-                </a:solidFill>
-                <a:effectLst/>
-                <a:latin typeface="Cascadia Code Regular" panose="020B0609020000020004" pitchFamily="49" charset="0"/>
-              </a:rPr>
-              <a:t>Split-Path</a:t>
-            </a:r>
-            <a:r>
-              <a:rPr lang="en-US" sz="2800" b="0" dirty="0">
-                <a:solidFill>
-                  <a:srgbClr val="D4D4D4"/>
-                </a:solidFill>
-                <a:effectLst/>
-                <a:latin typeface="Cascadia Code Regular" panose="020B0609020000020004" pitchFamily="49" charset="0"/>
-              </a:rPr>
-              <a:t> (</a:t>
-            </a:r>
-            <a:r>
-              <a:rPr lang="en-US" sz="2800" b="0" dirty="0">
-                <a:solidFill>
-                  <a:srgbClr val="DCDCAA"/>
-                </a:solidFill>
-                <a:effectLst/>
-                <a:latin typeface="Cascadia Code Regular" panose="020B0609020000020004" pitchFamily="49" charset="0"/>
-              </a:rPr>
-              <a:t>Get-Command</a:t>
-            </a:r>
-            <a:r>
-              <a:rPr lang="en-US" sz="2800" b="0" dirty="0">
-                <a:solidFill>
-                  <a:srgbClr val="D4D4D4"/>
-                </a:solidFill>
-                <a:effectLst/>
-                <a:latin typeface="Cascadia Code Regular" panose="020B0609020000020004" pitchFamily="49" charset="0"/>
-              </a:rPr>
-              <a:t> </a:t>
-            </a:r>
-            <a:r>
-              <a:rPr lang="en-US" sz="2800" b="0" dirty="0">
-                <a:solidFill>
-                  <a:srgbClr val="CE9178"/>
-                </a:solidFill>
-                <a:effectLst/>
-                <a:latin typeface="Cascadia Code Regular" panose="020B0609020000020004" pitchFamily="49" charset="0"/>
-              </a:rPr>
-              <a:t>'</a:t>
-            </a:r>
-            <a:r>
-              <a:rPr lang="en-US" sz="2800" b="0" dirty="0" err="1">
-                <a:solidFill>
-                  <a:srgbClr val="CE9178"/>
-                </a:solidFill>
-                <a:effectLst/>
-                <a:latin typeface="Cascadia Code Regular" panose="020B0609020000020004" pitchFamily="49" charset="0"/>
-              </a:rPr>
-              <a:t>func</a:t>
-            </a:r>
-            <a:r>
-              <a:rPr lang="en-US" sz="2800" b="0" dirty="0">
-                <a:solidFill>
-                  <a:srgbClr val="CE9178"/>
-                </a:solidFill>
-                <a:effectLst/>
-                <a:latin typeface="Cascadia Code Regular" panose="020B0609020000020004" pitchFamily="49" charset="0"/>
-              </a:rPr>
-              <a:t>'</a:t>
-            </a:r>
-            <a:r>
-              <a:rPr lang="en-US" sz="2800" b="0" dirty="0">
-                <a:solidFill>
-                  <a:srgbClr val="D4D4D4"/>
-                </a:solidFill>
-                <a:effectLst/>
-                <a:latin typeface="Cascadia Code Regular" panose="020B0609020000020004" pitchFamily="49" charset="0"/>
-              </a:rPr>
-              <a:t>).Source -Parent</a:t>
-            </a:r>
-            <a:r>
-              <a:rPr lang="en-US" sz="2800" b="0" dirty="0">
-                <a:solidFill>
-                  <a:srgbClr val="569CD6"/>
-                </a:solidFill>
-                <a:effectLst/>
-                <a:latin typeface="Cascadia Code Regular" panose="020B0609020000020004" pitchFamily="49" charset="0"/>
-              </a:rPr>
-              <a:t>)</a:t>
-            </a:r>
-            <a:r>
-              <a:rPr lang="en-US" sz="2800" b="0" dirty="0">
-                <a:solidFill>
-                  <a:srgbClr val="CE9178"/>
-                </a:solidFill>
-                <a:effectLst/>
-                <a:latin typeface="Cascadia Code Regular" panose="020B0609020000020004" pitchFamily="49" charset="0"/>
-              </a:rPr>
-              <a:t>\*\7.2"</a:t>
-            </a:r>
-            <a:r>
-              <a:rPr lang="en-US" sz="2800" b="0" dirty="0">
-                <a:solidFill>
-                  <a:srgbClr val="FFFFFF"/>
-                </a:solidFill>
-                <a:effectLst/>
-                <a:latin typeface="Cascadia Code Regular" panose="020B0609020000020004" pitchFamily="49" charset="0"/>
-              </a:rPr>
-              <a:t> </a:t>
-            </a:r>
-            <a:r>
-              <a:rPr lang="en-US" sz="2800" b="0" dirty="0">
-                <a:solidFill>
-                  <a:srgbClr val="D4D4D4"/>
-                </a:solidFill>
-                <a:effectLst/>
-                <a:latin typeface="Cascadia Code Regular" panose="020B0609020000020004" pitchFamily="49" charset="0"/>
-              </a:rPr>
-              <a:t>-</a:t>
-            </a:r>
-            <a:r>
-              <a:rPr lang="en-US" sz="2800" b="0" dirty="0">
-                <a:solidFill>
-                  <a:srgbClr val="FFFFFF"/>
-                </a:solidFill>
-                <a:effectLst/>
-                <a:latin typeface="Cascadia Code Regular" panose="020B0609020000020004" pitchFamily="49" charset="0"/>
-              </a:rPr>
-              <a:t>Recurse </a:t>
-            </a:r>
-            <a:r>
-              <a:rPr lang="en-US" sz="2800" b="0" dirty="0">
-                <a:solidFill>
-                  <a:srgbClr val="D4D4D4"/>
-                </a:solidFill>
-                <a:effectLst/>
-                <a:latin typeface="Cascadia Code Regular" panose="020B0609020000020004" pitchFamily="49" charset="0"/>
-              </a:rPr>
-              <a:t>|</a:t>
-            </a:r>
-            <a:r>
-              <a:rPr lang="en-US" sz="2800" b="0" dirty="0">
-                <a:solidFill>
-                  <a:srgbClr val="FFFFFF"/>
-                </a:solidFill>
-                <a:effectLst/>
-                <a:latin typeface="Cascadia Code Regular" panose="020B0609020000020004" pitchFamily="49" charset="0"/>
-              </a:rPr>
-              <a:t> </a:t>
-            </a:r>
-            <a:r>
-              <a:rPr lang="en-US" sz="2800" b="0" dirty="0">
-                <a:solidFill>
-                  <a:srgbClr val="DCDCAA"/>
-                </a:solidFill>
-                <a:effectLst/>
-                <a:latin typeface="Cascadia Code Regular" panose="020B0609020000020004" pitchFamily="49" charset="0"/>
-              </a:rPr>
-              <a:t>Get-</a:t>
-            </a:r>
-            <a:r>
-              <a:rPr lang="en-US" sz="2800" b="0" dirty="0" err="1">
-                <a:solidFill>
-                  <a:srgbClr val="DCDCAA"/>
-                </a:solidFill>
-                <a:effectLst/>
-                <a:latin typeface="Cascadia Code Regular" panose="020B0609020000020004" pitchFamily="49" charset="0"/>
-              </a:rPr>
-              <a:t>ChildItem</a:t>
-            </a:r>
-            <a:r>
-              <a:rPr lang="en-US" sz="2800" b="0" dirty="0">
-                <a:solidFill>
-                  <a:srgbClr val="FFFFFF"/>
-                </a:solidFill>
-                <a:effectLst/>
-                <a:latin typeface="Cascadia Code Regular" panose="020B0609020000020004" pitchFamily="49" charset="0"/>
-              </a:rPr>
-              <a:t> </a:t>
-            </a:r>
-            <a:r>
-              <a:rPr lang="en-US" sz="2800" b="0" dirty="0">
-                <a:solidFill>
-                  <a:srgbClr val="D4D4D4"/>
-                </a:solidFill>
-                <a:effectLst/>
-                <a:latin typeface="Cascadia Code Regular" panose="020B0609020000020004" pitchFamily="49" charset="0"/>
-              </a:rPr>
-              <a:t>-</a:t>
-            </a:r>
-            <a:r>
-              <a:rPr lang="en-US" sz="2800" b="0" dirty="0">
-                <a:solidFill>
-                  <a:srgbClr val="FFFFFF"/>
-                </a:solidFill>
-                <a:effectLst/>
-                <a:latin typeface="Cascadia Code Regular" panose="020B0609020000020004" pitchFamily="49" charset="0"/>
-              </a:rPr>
-              <a:t>Recurse </a:t>
-            </a:r>
-            <a:r>
-              <a:rPr lang="en-US" sz="2800" b="0" dirty="0">
-                <a:solidFill>
-                  <a:srgbClr val="D4D4D4"/>
-                </a:solidFill>
-                <a:effectLst/>
-                <a:latin typeface="Cascadia Code Regular" panose="020B0609020000020004" pitchFamily="49" charset="0"/>
-              </a:rPr>
-              <a:t>-</a:t>
-            </a:r>
-            <a:r>
-              <a:rPr lang="en-US" sz="2800" b="0" dirty="0">
-                <a:solidFill>
-                  <a:srgbClr val="FFFFFF"/>
-                </a:solidFill>
-                <a:effectLst/>
-                <a:latin typeface="Cascadia Code Regular" panose="020B0609020000020004" pitchFamily="49" charset="0"/>
-              </a:rPr>
-              <a:t>Filter </a:t>
-            </a:r>
-            <a:r>
-              <a:rPr lang="en-US" sz="2800" b="0" dirty="0">
-                <a:solidFill>
-                  <a:srgbClr val="CE9178"/>
-                </a:solidFill>
-                <a:effectLst/>
-                <a:latin typeface="Cascadia Code Regular" panose="020B0609020000020004" pitchFamily="49" charset="0"/>
-              </a:rPr>
-              <a:t>'</a:t>
-            </a:r>
-            <a:r>
-              <a:rPr lang="en-US" sz="2800" b="0" dirty="0" err="1">
-                <a:solidFill>
-                  <a:srgbClr val="CE9178"/>
-                </a:solidFill>
-                <a:effectLst/>
-                <a:latin typeface="Cascadia Code Regular" panose="020B0609020000020004" pitchFamily="49" charset="0"/>
-              </a:rPr>
-              <a:t>Microsoft.Azure.Functions.PowerShellWorker</a:t>
-            </a:r>
-            <a:r>
-              <a:rPr lang="en-US" sz="2800" b="0" dirty="0">
-                <a:solidFill>
-                  <a:srgbClr val="CE9178"/>
-                </a:solidFill>
-                <a:effectLst/>
-                <a:latin typeface="Cascadia Code Regular" panose="020B0609020000020004" pitchFamily="49" charset="0"/>
-              </a:rPr>
-              <a:t>*'</a:t>
-            </a:r>
-            <a:r>
-              <a:rPr lang="en-US" sz="2800" b="0" dirty="0">
-                <a:solidFill>
-                  <a:srgbClr val="FFFFFF"/>
-                </a:solidFill>
-                <a:effectLst/>
-                <a:latin typeface="Cascadia Code Regular" panose="020B0609020000020004" pitchFamily="49" charset="0"/>
-              </a:rPr>
-              <a:t> </a:t>
-            </a:r>
-            <a:r>
-              <a:rPr lang="en-US" sz="2800" b="0" dirty="0">
-                <a:solidFill>
-                  <a:srgbClr val="D4D4D4"/>
-                </a:solidFill>
-                <a:effectLst/>
-                <a:latin typeface="Cascadia Code Regular" panose="020B0609020000020004" pitchFamily="49" charset="0"/>
-              </a:rPr>
-              <a:t>-</a:t>
-            </a:r>
-            <a:r>
-              <a:rPr lang="en-US" sz="2800" b="0" dirty="0">
-                <a:solidFill>
-                  <a:srgbClr val="FFFFFF"/>
-                </a:solidFill>
-                <a:effectLst/>
-                <a:latin typeface="Cascadia Code Regular" panose="020B0609020000020004" pitchFamily="49" charset="0"/>
-              </a:rPr>
-              <a:t>File </a:t>
-            </a:r>
-            <a:r>
-              <a:rPr lang="en-US" sz="2800" b="0" dirty="0">
-                <a:solidFill>
-                  <a:srgbClr val="D4D4D4"/>
-                </a:solidFill>
-                <a:effectLst/>
-                <a:latin typeface="Cascadia Code Regular" panose="020B0609020000020004" pitchFamily="49" charset="0"/>
-              </a:rPr>
-              <a:t>|</a:t>
-            </a:r>
-            <a:r>
-              <a:rPr lang="en-US" sz="2800" b="0" dirty="0">
-                <a:solidFill>
-                  <a:srgbClr val="FFFFFF"/>
-                </a:solidFill>
-                <a:effectLst/>
-                <a:latin typeface="Cascadia Code Regular" panose="020B0609020000020004" pitchFamily="49" charset="0"/>
-              </a:rPr>
-              <a:t> </a:t>
-            </a:r>
-            <a:r>
-              <a:rPr lang="en-US" sz="2800" b="0" dirty="0">
-                <a:solidFill>
-                  <a:srgbClr val="DCDCAA"/>
-                </a:solidFill>
-                <a:effectLst/>
-                <a:latin typeface="Cascadia Code Regular" panose="020B0609020000020004" pitchFamily="49" charset="0"/>
-              </a:rPr>
-              <a:t>Where-Object</a:t>
-            </a:r>
-            <a:r>
-              <a:rPr lang="en-US" sz="2800" b="0" dirty="0">
-                <a:solidFill>
-                  <a:srgbClr val="FFFFFF"/>
-                </a:solidFill>
-                <a:effectLst/>
-                <a:latin typeface="Cascadia Code Regular" panose="020B0609020000020004" pitchFamily="49" charset="0"/>
-              </a:rPr>
-              <a:t> { </a:t>
-            </a:r>
-            <a:r>
-              <a:rPr lang="en-US" sz="2800" b="0" dirty="0">
-                <a:solidFill>
-                  <a:srgbClr val="9CDCFE"/>
-                </a:solidFill>
-                <a:effectLst/>
-                <a:latin typeface="Cascadia Code Regular" panose="020B0609020000020004" pitchFamily="49" charset="0"/>
-              </a:rPr>
-              <a:t>$_</a:t>
-            </a:r>
-            <a:r>
-              <a:rPr lang="en-US" sz="2800" b="0" dirty="0">
-                <a:solidFill>
-                  <a:srgbClr val="DCDCAA"/>
-                </a:solidFill>
-                <a:effectLst/>
-                <a:latin typeface="Cascadia Code Regular" panose="020B0609020000020004" pitchFamily="49" charset="0"/>
-              </a:rPr>
-              <a:t>.Extension</a:t>
-            </a:r>
-            <a:r>
-              <a:rPr lang="en-US" sz="2800" b="0" dirty="0">
-                <a:solidFill>
-                  <a:srgbClr val="FFFFFF"/>
-                </a:solidFill>
-                <a:effectLst/>
-                <a:latin typeface="Cascadia Code Regular" panose="020B0609020000020004" pitchFamily="49" charset="0"/>
-              </a:rPr>
-              <a:t> </a:t>
-            </a:r>
-            <a:r>
-              <a:rPr lang="en-US" sz="2800" b="0" dirty="0">
-                <a:solidFill>
-                  <a:srgbClr val="D4D4D4"/>
-                </a:solidFill>
-                <a:effectLst/>
-                <a:latin typeface="Cascadia Code Regular" panose="020B0609020000020004" pitchFamily="49" charset="0"/>
-              </a:rPr>
-              <a:t>-in</a:t>
-            </a:r>
-            <a:r>
-              <a:rPr lang="en-US" sz="2800" b="0" dirty="0">
-                <a:solidFill>
-                  <a:srgbClr val="FFFFFF"/>
-                </a:solidFill>
-                <a:effectLst/>
-                <a:latin typeface="Cascadia Code Regular" panose="020B0609020000020004" pitchFamily="49" charset="0"/>
-              </a:rPr>
-              <a:t> </a:t>
-            </a:r>
-            <a:r>
-              <a:rPr lang="en-US" sz="2800" b="0" dirty="0">
-                <a:solidFill>
-                  <a:srgbClr val="CE9178"/>
-                </a:solidFill>
-                <a:effectLst/>
-                <a:latin typeface="Cascadia Code Regular" panose="020B0609020000020004" pitchFamily="49" charset="0"/>
-              </a:rPr>
-              <a:t>'.dll'</a:t>
-            </a:r>
-            <a:r>
-              <a:rPr lang="en-US" sz="2800" b="0" dirty="0">
-                <a:solidFill>
-                  <a:srgbClr val="D4D4D4"/>
-                </a:solidFill>
-                <a:effectLst/>
-                <a:latin typeface="Cascadia Code Regular" panose="020B0609020000020004" pitchFamily="49" charset="0"/>
-              </a:rPr>
-              <a:t>,</a:t>
-            </a:r>
-            <a:r>
-              <a:rPr lang="en-US" sz="2800" b="0" dirty="0">
-                <a:solidFill>
-                  <a:srgbClr val="CE9178"/>
-                </a:solidFill>
-                <a:effectLst/>
-                <a:latin typeface="Cascadia Code Regular" panose="020B0609020000020004" pitchFamily="49" charset="0"/>
-              </a:rPr>
-              <a:t>'.psd1'</a:t>
-            </a:r>
-            <a:r>
-              <a:rPr lang="en-US" sz="2800" b="0" dirty="0">
-                <a:solidFill>
-                  <a:srgbClr val="FFFFFF"/>
-                </a:solidFill>
-                <a:effectLst/>
-                <a:latin typeface="Cascadia Code Regular" panose="020B0609020000020004" pitchFamily="49" charset="0"/>
-              </a:rPr>
-              <a:t> } </a:t>
-            </a:r>
-            <a:r>
-              <a:rPr lang="en-US" sz="2800" b="0" dirty="0">
-                <a:solidFill>
-                  <a:srgbClr val="D4D4D4"/>
-                </a:solidFill>
-                <a:effectLst/>
-                <a:latin typeface="Cascadia Code Regular" panose="020B0609020000020004" pitchFamily="49" charset="0"/>
-              </a:rPr>
-              <a:t>|</a:t>
-            </a:r>
-            <a:r>
-              <a:rPr lang="en-US" sz="2800" b="0" dirty="0">
-                <a:solidFill>
-                  <a:srgbClr val="FFFFFF"/>
-                </a:solidFill>
-                <a:effectLst/>
-                <a:latin typeface="Cascadia Code Regular" panose="020B0609020000020004" pitchFamily="49" charset="0"/>
-              </a:rPr>
-              <a:t> </a:t>
-            </a:r>
-            <a:r>
-              <a:rPr lang="en-US" sz="2800" b="0" dirty="0">
-                <a:solidFill>
-                  <a:srgbClr val="DCDCAA"/>
-                </a:solidFill>
-                <a:effectLst/>
-                <a:latin typeface="Cascadia Code Regular" panose="020B0609020000020004" pitchFamily="49" charset="0"/>
-              </a:rPr>
-              <a:t>Import-Module</a:t>
-            </a:r>
-            <a:endParaRPr lang="en-US" sz="2800" b="0" dirty="0">
-              <a:solidFill>
-                <a:srgbClr val="FFFFFF"/>
-              </a:solidFill>
-              <a:effectLst/>
-              <a:latin typeface="Cascadia Code Regular" panose="020B0609020000020004" pitchFamily="49" charset="0"/>
-            </a:endParaRPr>
+              <a:rPr lang="en-US" dirty="0"/>
+              <a:t>6</a:t>
+            </a:r>
+            <a:endParaRPr lang="en-SE" dirty="0"/>
           </a:p>
         </p:txBody>
       </p:sp>
@@ -7882,7 +7309,7 @@
           <a:p>
             <a:fld id="{A7839206-A81D-4F76-8486-302187992F73}" type="slidenum">
               <a:rPr lang="en-GB" smtClean="0"/>
-              <a:t>7</a:t>
+              <a:t>6</a:t>
             </a:fld>
             <a:endParaRPr lang="en-GB"/>
           </a:p>
@@ -7891,7 +7318,7 @@
     </p:spTree>
     <p:extLst>
       <p:ext uri="{BB962C8B-B14F-4D97-AF65-F5344CB8AC3E}">
-        <p14:creationId xmlns:p14="http://schemas.microsoft.com/office/powerpoint/2010/main" val="2509465834"/>
+        <p14:creationId xmlns:p14="http://schemas.microsoft.com/office/powerpoint/2010/main" val="3434972349"/>
       </p:ext>
     </p:extLst>
   </p:cSld>
@@ -7946,10 +7373,588 @@
           <a:lstStyle/>
           <a:p>
             <a:r>
-              <a:rPr lang="en-US" dirty="0"/>
-              <a:t>10</a:t>
-            </a:r>
-            <a:endParaRPr lang="en-SE" dirty="0"/>
+              <a:rPr lang="sv-SE" sz="1800" dirty="0">
+                <a:effectLst/>
+                <a:latin typeface="Cascadia Mono" panose="020B0609020000020004" pitchFamily="49" charset="0"/>
+              </a:rPr>
+              <a:t>7</a:t>
+            </a:r>
+          </a:p>
+          <a:p>
+            <a:endParaRPr lang="sv-SE" sz="1800" dirty="0">
+              <a:effectLst/>
+              <a:latin typeface="Cascadia Mono" panose="020B0609020000020004" pitchFamily="49" charset="0"/>
+            </a:endParaRPr>
+          </a:p>
+          <a:p>
+            <a:r>
+              <a:rPr lang="sv-SE" sz="1800" dirty="0">
+                <a:effectLst/>
+                <a:latin typeface="Cascadia Mono" panose="020B0609020000020004" pitchFamily="49" charset="0"/>
+              </a:rPr>
+              <a:t>Image </a:t>
+            </a:r>
+            <a:r>
+              <a:rPr lang="sv-SE" sz="1800" dirty="0" err="1">
+                <a:effectLst/>
+                <a:latin typeface="Cascadia Mono" panose="020B0609020000020004" pitchFamily="49" charset="0"/>
+              </a:rPr>
+              <a:t>credit</a:t>
+            </a:r>
+            <a:r>
+              <a:rPr lang="sv-SE" sz="1800" dirty="0">
+                <a:effectLst/>
+                <a:latin typeface="Cascadia Mono" panose="020B0609020000020004" pitchFamily="49" charset="0"/>
+              </a:rPr>
+              <a:t>: Jeff </a:t>
+            </a:r>
+            <a:r>
+              <a:rPr lang="sv-SE" sz="1800" dirty="0" err="1">
+                <a:effectLst/>
+                <a:latin typeface="Cascadia Mono" panose="020B0609020000020004" pitchFamily="49" charset="0"/>
+              </a:rPr>
+              <a:t>Hollan’s</a:t>
+            </a:r>
+            <a:r>
+              <a:rPr lang="sv-SE" sz="1800" dirty="0">
+                <a:effectLst/>
+                <a:latin typeface="Cascadia Mono" panose="020B0609020000020004" pitchFamily="49" charset="0"/>
+              </a:rPr>
+              <a:t> presentation on Durable </a:t>
+            </a:r>
+            <a:r>
+              <a:rPr lang="sv-SE" sz="1800" dirty="0" err="1">
+                <a:effectLst/>
+                <a:latin typeface="Cascadia Mono" panose="020B0609020000020004" pitchFamily="49" charset="0"/>
+              </a:rPr>
+              <a:t>Functions</a:t>
+            </a:r>
+            <a:r>
+              <a:rPr lang="sv-SE" sz="1800" dirty="0">
+                <a:effectLst/>
+                <a:latin typeface="Cascadia Mono" panose="020B0609020000020004" pitchFamily="49" charset="0"/>
+              </a:rPr>
+              <a:t> 2.0 at </a:t>
+            </a:r>
+            <a:r>
+              <a:rPr lang="sv-SE" sz="1800" dirty="0" err="1">
+                <a:effectLst/>
+                <a:latin typeface="Cascadia Mono" panose="020B0609020000020004" pitchFamily="49" charset="0"/>
+              </a:rPr>
+              <a:t>DotNetConf</a:t>
+            </a:r>
+            <a:r>
+              <a:rPr lang="sv-SE" sz="1800" dirty="0">
+                <a:effectLst/>
+                <a:latin typeface="Cascadia Mono" panose="020B0609020000020004" pitchFamily="49" charset="0"/>
+              </a:rPr>
+              <a:t> 2019</a:t>
+            </a:r>
+          </a:p>
+          <a:p>
+            <a:endParaRPr lang="sv-SE" sz="1800" dirty="0">
+              <a:effectLst/>
+              <a:latin typeface="Cascadia Mono" panose="020B0609020000020004" pitchFamily="49" charset="0"/>
+            </a:endParaRPr>
+          </a:p>
+          <a:p>
+            <a:r>
+              <a:rPr lang="en-US" sz="2800" b="0" dirty="0">
+                <a:solidFill>
+                  <a:srgbClr val="DCDCAA"/>
+                </a:solidFill>
+                <a:effectLst/>
+                <a:latin typeface="Cascadia Code Regular" panose="020B0609020000020004" pitchFamily="49" charset="0"/>
+              </a:rPr>
+              <a:t>Get-</a:t>
+            </a:r>
+            <a:r>
+              <a:rPr lang="en-US" sz="2800" b="0" dirty="0" err="1">
+                <a:solidFill>
+                  <a:srgbClr val="DCDCAA"/>
+                </a:solidFill>
+                <a:effectLst/>
+                <a:latin typeface="Cascadia Code Regular" panose="020B0609020000020004" pitchFamily="49" charset="0"/>
+              </a:rPr>
+              <a:t>ChildItem</a:t>
+            </a:r>
+            <a:r>
+              <a:rPr lang="en-US" sz="2800" b="0" dirty="0">
+                <a:solidFill>
+                  <a:srgbClr val="FFFFFF"/>
+                </a:solidFill>
+                <a:effectLst/>
+                <a:latin typeface="Cascadia Code Regular" panose="020B0609020000020004" pitchFamily="49" charset="0"/>
+              </a:rPr>
+              <a:t> </a:t>
+            </a:r>
+            <a:r>
+              <a:rPr lang="en-US" sz="2800" b="0" dirty="0">
+                <a:solidFill>
+                  <a:srgbClr val="CE9178"/>
+                </a:solidFill>
+                <a:effectLst/>
+                <a:latin typeface="Cascadia Code Regular" panose="020B0609020000020004" pitchFamily="49" charset="0"/>
+              </a:rPr>
+              <a:t>"</a:t>
+            </a:r>
+            <a:r>
+              <a:rPr lang="en-US" sz="2800" b="0" dirty="0">
+                <a:solidFill>
+                  <a:srgbClr val="569CD6"/>
+                </a:solidFill>
+                <a:effectLst/>
+                <a:latin typeface="Cascadia Code Regular" panose="020B0609020000020004" pitchFamily="49" charset="0"/>
+              </a:rPr>
+              <a:t>$(</a:t>
+            </a:r>
+            <a:r>
+              <a:rPr lang="en-US" sz="2800" b="0" dirty="0">
+                <a:solidFill>
+                  <a:srgbClr val="DCDCAA"/>
+                </a:solidFill>
+                <a:effectLst/>
+                <a:latin typeface="Cascadia Code Regular" panose="020B0609020000020004" pitchFamily="49" charset="0"/>
+              </a:rPr>
+              <a:t>Split-Path</a:t>
+            </a:r>
+            <a:r>
+              <a:rPr lang="en-US" sz="2800" b="0" dirty="0">
+                <a:solidFill>
+                  <a:srgbClr val="D4D4D4"/>
+                </a:solidFill>
+                <a:effectLst/>
+                <a:latin typeface="Cascadia Code Regular" panose="020B0609020000020004" pitchFamily="49" charset="0"/>
+              </a:rPr>
+              <a:t> (</a:t>
+            </a:r>
+            <a:r>
+              <a:rPr lang="en-US" sz="2800" b="0" dirty="0">
+                <a:solidFill>
+                  <a:srgbClr val="DCDCAA"/>
+                </a:solidFill>
+                <a:effectLst/>
+                <a:latin typeface="Cascadia Code Regular" panose="020B0609020000020004" pitchFamily="49" charset="0"/>
+              </a:rPr>
+              <a:t>Get-Command</a:t>
+            </a:r>
+            <a:r>
+              <a:rPr lang="en-US" sz="2800" b="0" dirty="0">
+                <a:solidFill>
+                  <a:srgbClr val="D4D4D4"/>
+                </a:solidFill>
+                <a:effectLst/>
+                <a:latin typeface="Cascadia Code Regular" panose="020B0609020000020004" pitchFamily="49" charset="0"/>
+              </a:rPr>
+              <a:t> </a:t>
+            </a:r>
+            <a:r>
+              <a:rPr lang="en-US" sz="2800" b="0" dirty="0">
+                <a:solidFill>
+                  <a:srgbClr val="CE9178"/>
+                </a:solidFill>
+                <a:effectLst/>
+                <a:latin typeface="Cascadia Code Regular" panose="020B0609020000020004" pitchFamily="49" charset="0"/>
+              </a:rPr>
+              <a:t>'</a:t>
+            </a:r>
+            <a:r>
+              <a:rPr lang="en-US" sz="2800" b="0" dirty="0" err="1">
+                <a:solidFill>
+                  <a:srgbClr val="CE9178"/>
+                </a:solidFill>
+                <a:effectLst/>
+                <a:latin typeface="Cascadia Code Regular" panose="020B0609020000020004" pitchFamily="49" charset="0"/>
+              </a:rPr>
+              <a:t>func</a:t>
+            </a:r>
+            <a:r>
+              <a:rPr lang="en-US" sz="2800" b="0" dirty="0">
+                <a:solidFill>
+                  <a:srgbClr val="CE9178"/>
+                </a:solidFill>
+                <a:effectLst/>
+                <a:latin typeface="Cascadia Code Regular" panose="020B0609020000020004" pitchFamily="49" charset="0"/>
+              </a:rPr>
+              <a:t>'</a:t>
+            </a:r>
+            <a:r>
+              <a:rPr lang="en-US" sz="2800" b="0" dirty="0">
+                <a:solidFill>
+                  <a:srgbClr val="D4D4D4"/>
+                </a:solidFill>
+                <a:effectLst/>
+                <a:latin typeface="Cascadia Code Regular" panose="020B0609020000020004" pitchFamily="49" charset="0"/>
+              </a:rPr>
+              <a:t>).Source -Parent</a:t>
+            </a:r>
+            <a:r>
+              <a:rPr lang="en-US" sz="2800" b="0" dirty="0">
+                <a:solidFill>
+                  <a:srgbClr val="569CD6"/>
+                </a:solidFill>
+                <a:effectLst/>
+                <a:latin typeface="Cascadia Code Regular" panose="020B0609020000020004" pitchFamily="49" charset="0"/>
+              </a:rPr>
+              <a:t>)</a:t>
+            </a:r>
+            <a:r>
+              <a:rPr lang="en-US" sz="2800" b="0" dirty="0">
+                <a:solidFill>
+                  <a:srgbClr val="CE9178"/>
+                </a:solidFill>
+                <a:effectLst/>
+                <a:latin typeface="Cascadia Code Regular" panose="020B0609020000020004" pitchFamily="49" charset="0"/>
+              </a:rPr>
+              <a:t>\*\7.2"</a:t>
+            </a:r>
+            <a:r>
+              <a:rPr lang="en-US" sz="2800" b="0" dirty="0">
+                <a:solidFill>
+                  <a:srgbClr val="FFFFFF"/>
+                </a:solidFill>
+                <a:effectLst/>
+                <a:latin typeface="Cascadia Code Regular" panose="020B0609020000020004" pitchFamily="49" charset="0"/>
+              </a:rPr>
+              <a:t> </a:t>
+            </a:r>
+            <a:r>
+              <a:rPr lang="en-US" sz="2800" b="0" dirty="0">
+                <a:solidFill>
+                  <a:srgbClr val="D4D4D4"/>
+                </a:solidFill>
+                <a:effectLst/>
+                <a:latin typeface="Cascadia Code Regular" panose="020B0609020000020004" pitchFamily="49" charset="0"/>
+              </a:rPr>
+              <a:t>-</a:t>
+            </a:r>
+            <a:r>
+              <a:rPr lang="en-US" sz="2800" b="0" dirty="0">
+                <a:solidFill>
+                  <a:srgbClr val="FFFFFF"/>
+                </a:solidFill>
+                <a:effectLst/>
+                <a:latin typeface="Cascadia Code Regular" panose="020B0609020000020004" pitchFamily="49" charset="0"/>
+              </a:rPr>
+              <a:t>Recurse </a:t>
+            </a:r>
+            <a:r>
+              <a:rPr lang="en-US" sz="2800" b="0" dirty="0">
+                <a:solidFill>
+                  <a:srgbClr val="D4D4D4"/>
+                </a:solidFill>
+                <a:effectLst/>
+                <a:latin typeface="Cascadia Code Regular" panose="020B0609020000020004" pitchFamily="49" charset="0"/>
+              </a:rPr>
+              <a:t>|</a:t>
+            </a:r>
+            <a:r>
+              <a:rPr lang="en-US" sz="2800" b="0" dirty="0">
+                <a:solidFill>
+                  <a:srgbClr val="FFFFFF"/>
+                </a:solidFill>
+                <a:effectLst/>
+                <a:latin typeface="Cascadia Code Regular" panose="020B0609020000020004" pitchFamily="49" charset="0"/>
+              </a:rPr>
+              <a:t> </a:t>
+            </a:r>
+            <a:r>
+              <a:rPr lang="en-US" sz="2800" b="0" dirty="0">
+                <a:solidFill>
+                  <a:srgbClr val="DCDCAA"/>
+                </a:solidFill>
+                <a:effectLst/>
+                <a:latin typeface="Cascadia Code Regular" panose="020B0609020000020004" pitchFamily="49" charset="0"/>
+              </a:rPr>
+              <a:t>Get-</a:t>
+            </a:r>
+            <a:r>
+              <a:rPr lang="en-US" sz="2800" b="0" dirty="0" err="1">
+                <a:solidFill>
+                  <a:srgbClr val="DCDCAA"/>
+                </a:solidFill>
+                <a:effectLst/>
+                <a:latin typeface="Cascadia Code Regular" panose="020B0609020000020004" pitchFamily="49" charset="0"/>
+              </a:rPr>
+              <a:t>ChildItem</a:t>
+            </a:r>
+            <a:r>
+              <a:rPr lang="en-US" sz="2800" b="0" dirty="0">
+                <a:solidFill>
+                  <a:srgbClr val="FFFFFF"/>
+                </a:solidFill>
+                <a:effectLst/>
+                <a:latin typeface="Cascadia Code Regular" panose="020B0609020000020004" pitchFamily="49" charset="0"/>
+              </a:rPr>
+              <a:t> </a:t>
+            </a:r>
+            <a:r>
+              <a:rPr lang="en-US" sz="2800" b="0" dirty="0">
+                <a:solidFill>
+                  <a:srgbClr val="D4D4D4"/>
+                </a:solidFill>
+                <a:effectLst/>
+                <a:latin typeface="Cascadia Code Regular" panose="020B0609020000020004" pitchFamily="49" charset="0"/>
+              </a:rPr>
+              <a:t>-</a:t>
+            </a:r>
+            <a:r>
+              <a:rPr lang="en-US" sz="2800" b="0" dirty="0">
+                <a:solidFill>
+                  <a:srgbClr val="FFFFFF"/>
+                </a:solidFill>
+                <a:effectLst/>
+                <a:latin typeface="Cascadia Code Regular" panose="020B0609020000020004" pitchFamily="49" charset="0"/>
+              </a:rPr>
+              <a:t>Recurse </a:t>
+            </a:r>
+            <a:r>
+              <a:rPr lang="en-US" sz="2800" b="0" dirty="0">
+                <a:solidFill>
+                  <a:srgbClr val="D4D4D4"/>
+                </a:solidFill>
+                <a:effectLst/>
+                <a:latin typeface="Cascadia Code Regular" panose="020B0609020000020004" pitchFamily="49" charset="0"/>
+              </a:rPr>
+              <a:t>-</a:t>
+            </a:r>
+            <a:r>
+              <a:rPr lang="en-US" sz="2800" b="0" dirty="0">
+                <a:solidFill>
+                  <a:srgbClr val="FFFFFF"/>
+                </a:solidFill>
+                <a:effectLst/>
+                <a:latin typeface="Cascadia Code Regular" panose="020B0609020000020004" pitchFamily="49" charset="0"/>
+              </a:rPr>
+              <a:t>Filter </a:t>
+            </a:r>
+            <a:r>
+              <a:rPr lang="en-US" sz="2800" b="0" dirty="0">
+                <a:solidFill>
+                  <a:srgbClr val="CE9178"/>
+                </a:solidFill>
+                <a:effectLst/>
+                <a:latin typeface="Cascadia Code Regular" panose="020B0609020000020004" pitchFamily="49" charset="0"/>
+              </a:rPr>
+              <a:t>'</a:t>
+            </a:r>
+            <a:r>
+              <a:rPr lang="en-US" sz="2800" b="0" dirty="0" err="1">
+                <a:solidFill>
+                  <a:srgbClr val="CE9178"/>
+                </a:solidFill>
+                <a:effectLst/>
+                <a:latin typeface="Cascadia Code Regular" panose="020B0609020000020004" pitchFamily="49" charset="0"/>
+              </a:rPr>
+              <a:t>Microsoft.Azure.Functions.PowerShellWorker</a:t>
+            </a:r>
+            <a:r>
+              <a:rPr lang="en-US" sz="2800" b="0" dirty="0">
+                <a:solidFill>
+                  <a:srgbClr val="CE9178"/>
+                </a:solidFill>
+                <a:effectLst/>
+                <a:latin typeface="Cascadia Code Regular" panose="020B0609020000020004" pitchFamily="49" charset="0"/>
+              </a:rPr>
+              <a:t>*'</a:t>
+            </a:r>
+            <a:r>
+              <a:rPr lang="en-US" sz="2800" b="0" dirty="0">
+                <a:solidFill>
+                  <a:srgbClr val="FFFFFF"/>
+                </a:solidFill>
+                <a:effectLst/>
+                <a:latin typeface="Cascadia Code Regular" panose="020B0609020000020004" pitchFamily="49" charset="0"/>
+              </a:rPr>
+              <a:t> </a:t>
+            </a:r>
+            <a:r>
+              <a:rPr lang="en-US" sz="2800" b="0" dirty="0">
+                <a:solidFill>
+                  <a:srgbClr val="D4D4D4"/>
+                </a:solidFill>
+                <a:effectLst/>
+                <a:latin typeface="Cascadia Code Regular" panose="020B0609020000020004" pitchFamily="49" charset="0"/>
+              </a:rPr>
+              <a:t>-</a:t>
+            </a:r>
+            <a:r>
+              <a:rPr lang="en-US" sz="2800" b="0" dirty="0">
+                <a:solidFill>
+                  <a:srgbClr val="FFFFFF"/>
+                </a:solidFill>
+                <a:effectLst/>
+                <a:latin typeface="Cascadia Code Regular" panose="020B0609020000020004" pitchFamily="49" charset="0"/>
+              </a:rPr>
+              <a:t>File </a:t>
+            </a:r>
+            <a:r>
+              <a:rPr lang="en-US" sz="2800" b="0" dirty="0">
+                <a:solidFill>
+                  <a:srgbClr val="D4D4D4"/>
+                </a:solidFill>
+                <a:effectLst/>
+                <a:latin typeface="Cascadia Code Regular" panose="020B0609020000020004" pitchFamily="49" charset="0"/>
+              </a:rPr>
+              <a:t>|</a:t>
+            </a:r>
+            <a:r>
+              <a:rPr lang="en-US" sz="2800" b="0" dirty="0">
+                <a:solidFill>
+                  <a:srgbClr val="FFFFFF"/>
+                </a:solidFill>
+                <a:effectLst/>
+                <a:latin typeface="Cascadia Code Regular" panose="020B0609020000020004" pitchFamily="49" charset="0"/>
+              </a:rPr>
+              <a:t> </a:t>
+            </a:r>
+            <a:r>
+              <a:rPr lang="en-US" sz="2800" b="0" dirty="0">
+                <a:solidFill>
+                  <a:srgbClr val="DCDCAA"/>
+                </a:solidFill>
+                <a:effectLst/>
+                <a:latin typeface="Cascadia Code Regular" panose="020B0609020000020004" pitchFamily="49" charset="0"/>
+              </a:rPr>
+              <a:t>Where-Object</a:t>
+            </a:r>
+            <a:r>
+              <a:rPr lang="en-US" sz="2800" b="0" dirty="0">
+                <a:solidFill>
+                  <a:srgbClr val="FFFFFF"/>
+                </a:solidFill>
+                <a:effectLst/>
+                <a:latin typeface="Cascadia Code Regular" panose="020B0609020000020004" pitchFamily="49" charset="0"/>
+              </a:rPr>
+              <a:t> { </a:t>
+            </a:r>
+            <a:r>
+              <a:rPr lang="en-US" sz="2800" b="0" dirty="0">
+                <a:solidFill>
+                  <a:srgbClr val="9CDCFE"/>
+                </a:solidFill>
+                <a:effectLst/>
+                <a:latin typeface="Cascadia Code Regular" panose="020B0609020000020004" pitchFamily="49" charset="0"/>
+              </a:rPr>
+              <a:t>$_</a:t>
+            </a:r>
+            <a:r>
+              <a:rPr lang="en-US" sz="2800" b="0" dirty="0">
+                <a:solidFill>
+                  <a:srgbClr val="DCDCAA"/>
+                </a:solidFill>
+                <a:effectLst/>
+                <a:latin typeface="Cascadia Code Regular" panose="020B0609020000020004" pitchFamily="49" charset="0"/>
+              </a:rPr>
+              <a:t>.Extension</a:t>
+            </a:r>
+            <a:r>
+              <a:rPr lang="en-US" sz="2800" b="0" dirty="0">
+                <a:solidFill>
+                  <a:srgbClr val="FFFFFF"/>
+                </a:solidFill>
+                <a:effectLst/>
+                <a:latin typeface="Cascadia Code Regular" panose="020B0609020000020004" pitchFamily="49" charset="0"/>
+              </a:rPr>
+              <a:t> </a:t>
+            </a:r>
+            <a:r>
+              <a:rPr lang="en-US" sz="2800" b="0" dirty="0">
+                <a:solidFill>
+                  <a:srgbClr val="D4D4D4"/>
+                </a:solidFill>
+                <a:effectLst/>
+                <a:latin typeface="Cascadia Code Regular" panose="020B0609020000020004" pitchFamily="49" charset="0"/>
+              </a:rPr>
+              <a:t>-in</a:t>
+            </a:r>
+            <a:r>
+              <a:rPr lang="en-US" sz="2800" b="0" dirty="0">
+                <a:solidFill>
+                  <a:srgbClr val="FFFFFF"/>
+                </a:solidFill>
+                <a:effectLst/>
+                <a:latin typeface="Cascadia Code Regular" panose="020B0609020000020004" pitchFamily="49" charset="0"/>
+              </a:rPr>
+              <a:t> </a:t>
+            </a:r>
+            <a:r>
+              <a:rPr lang="en-US" sz="2800" b="0" dirty="0">
+                <a:solidFill>
+                  <a:srgbClr val="CE9178"/>
+                </a:solidFill>
+                <a:effectLst/>
+                <a:latin typeface="Cascadia Code Regular" panose="020B0609020000020004" pitchFamily="49" charset="0"/>
+              </a:rPr>
+              <a:t>'.dll'</a:t>
+            </a:r>
+            <a:r>
+              <a:rPr lang="en-US" sz="2800" b="0" dirty="0">
+                <a:solidFill>
+                  <a:srgbClr val="D4D4D4"/>
+                </a:solidFill>
+                <a:effectLst/>
+                <a:latin typeface="Cascadia Code Regular" panose="020B0609020000020004" pitchFamily="49" charset="0"/>
+              </a:rPr>
+              <a:t>,</a:t>
+            </a:r>
+            <a:r>
+              <a:rPr lang="en-US" sz="2800" b="0" dirty="0">
+                <a:solidFill>
+                  <a:srgbClr val="CE9178"/>
+                </a:solidFill>
+                <a:effectLst/>
+                <a:latin typeface="Cascadia Code Regular" panose="020B0609020000020004" pitchFamily="49" charset="0"/>
+              </a:rPr>
+              <a:t>'.psd1'</a:t>
+            </a:r>
+            <a:r>
+              <a:rPr lang="en-US" sz="2800" b="0" dirty="0">
+                <a:solidFill>
+                  <a:srgbClr val="FFFFFF"/>
+                </a:solidFill>
+                <a:effectLst/>
+                <a:latin typeface="Cascadia Code Regular" panose="020B0609020000020004" pitchFamily="49" charset="0"/>
+              </a:rPr>
+              <a:t> } </a:t>
+            </a:r>
+            <a:r>
+              <a:rPr lang="en-US" sz="2800" b="0" dirty="0">
+                <a:solidFill>
+                  <a:srgbClr val="D4D4D4"/>
+                </a:solidFill>
+                <a:effectLst/>
+                <a:latin typeface="Cascadia Code Regular" panose="020B0609020000020004" pitchFamily="49" charset="0"/>
+              </a:rPr>
+              <a:t>|</a:t>
+            </a:r>
+            <a:r>
+              <a:rPr lang="en-US" sz="2800" b="0" dirty="0">
+                <a:solidFill>
+                  <a:srgbClr val="FFFFFF"/>
+                </a:solidFill>
+                <a:effectLst/>
+                <a:latin typeface="Cascadia Code Regular" panose="020B0609020000020004" pitchFamily="49" charset="0"/>
+              </a:rPr>
+              <a:t> </a:t>
+            </a:r>
+            <a:r>
+              <a:rPr lang="en-US" sz="2800" b="0" dirty="0">
+                <a:solidFill>
+                  <a:srgbClr val="DCDCAA"/>
+                </a:solidFill>
+                <a:effectLst/>
+                <a:latin typeface="Cascadia Code Regular" panose="020B0609020000020004" pitchFamily="49" charset="0"/>
+              </a:rPr>
+              <a:t>Import-Module</a:t>
+            </a:r>
+            <a:endParaRPr lang="en-US" sz="2800" b="0" dirty="0">
+              <a:solidFill>
+                <a:srgbClr val="FFFFFF"/>
+              </a:solidFill>
+              <a:effectLst/>
+              <a:latin typeface="Cascadia Code Regular" panose="020B0609020000020004" pitchFamily="49" charset="0"/>
+            </a:endParaRPr>
           </a:p>
         </p:txBody>
       </p:sp>
@@ -7970,7 +7975,7 @@
           <a:p>
             <a:fld id="{A7839206-A81D-4F76-8486-302187992F73}" type="slidenum">
               <a:rPr lang="en-GB" smtClean="0"/>
-              <a:t>8</a:t>
+              <a:t>7</a:t>
             </a:fld>
             <a:endParaRPr lang="en-GB"/>
           </a:p>
@@ -7979,7 +7984,7 @@
     </p:spTree>
     <p:extLst>
       <p:ext uri="{BB962C8B-B14F-4D97-AF65-F5344CB8AC3E}">
-        <p14:creationId xmlns:p14="http://schemas.microsoft.com/office/powerpoint/2010/main" val="1764638741"/>
+        <p14:creationId xmlns:p14="http://schemas.microsoft.com/office/powerpoint/2010/main" val="2509465834"/>
       </p:ext>
     </p:extLst>
   </p:cSld>
@@ -8035,6 +8040,94 @@
           <a:p>
             <a:r>
               <a:rPr lang="en-US" dirty="0"/>
+              <a:t>10</a:t>
+            </a:r>
+            <a:endParaRPr lang="en-SE" dirty="0"/>
+          </a:p>
+        </p:txBody>
+      </p:sp>
+      <p:sp>
+        <p:nvSpPr>
+          <p:cNvPr id="4" name="Slide Number Placeholder 3"/>
+          <p:cNvSpPr>
+            <a:spLocks noGrp="1"/>
+          </p:cNvSpPr>
+          <p:nvPr>
+            <p:ph type="sldNum" sz="quarter" idx="5"/>
+          </p:nvPr>
+        </p:nvSpPr>
+        <p:spPr/>
+        <p:txBody>
+          <a:bodyPr/>
+          <a:lstStyle/>
+          <a:p>
+            <a:fld id="{A7839206-A81D-4F76-8486-302187992F73}" type="slidenum">
+              <a:rPr lang="en-GB" smtClean="0"/>
+              <a:t>8</a:t>
+            </a:fld>
+            <a:endParaRPr lang="en-GB"/>
+          </a:p>
+        </p:txBody>
+      </p:sp>
+    </p:spTree>
+    <p:extLst>
+      <p:ext uri="{BB962C8B-B14F-4D97-AF65-F5344CB8AC3E}">
+        <p14:creationId xmlns:p14="http://schemas.microsoft.com/office/powerpoint/2010/main" val="1764638741"/>
+      </p:ext>
+    </p:extLst>
+  </p:cSld>
+  <p:clrMapOvr>
+    <a:masterClrMapping/>
+  </p:clrMapOvr>
+</p:notes>
+</file>
+
+<file path=ppt/notesSlides/notesSlide8.xml><?xml version="1.0" encoding="utf-8"?>
+<p:notes xmlns:a="http://schemas.openxmlformats.org/drawingml/2006/main" xmlns:r="http://schemas.openxmlformats.org/officeDocument/2006/relationships" xmlns:p="http://schemas.openxmlformats.org/presentationml/2006/main">
+  <p:cSld>
+    <p:spTree>
+      <p:nvGrpSpPr>
+        <p:cNvPr id="1" name=""/>
+        <p:cNvGrpSpPr/>
+        <p:nvPr/>
+      </p:nvGrpSpPr>
+      <p:grpSpPr>
+        <a:xfrm>
+          <a:off x="0" y="0"/>
+          <a:ext cx="0" cy="0"/>
+          <a:chOff x="0" y="0"/>
+          <a:chExt cx="0" cy="0"/>
+        </a:xfrm>
+      </p:grpSpPr>
+      <p:sp>
+        <p:nvSpPr>
+          <p:cNvPr id="2" name="Slide Image Placeholder 1"/>
+          <p:cNvSpPr>
+            <a:spLocks noGrp="1" noRot="1" noChangeAspect="1"/>
+          </p:cNvSpPr>
+          <p:nvPr>
+            <p:ph type="sldImg"/>
+          </p:nvPr>
+        </p:nvSpPr>
+        <p:spPr/>
+      </p:sp>
+      <p:sp>
+        <p:nvSpPr>
+          <p:cNvPr id="3" name="Notes Placeholder 2"/>
+          <p:cNvSpPr>
+            <a:spLocks noGrp="1"/>
+          </p:cNvSpPr>
+          <p:nvPr>
+            <p:ph type="body" idx="1"/>
+          </p:nvPr>
+        </p:nvSpPr>
+        <p:spPr/>
+        <p:txBody>
+          <a:bodyPr/>
+          <a:lstStyle/>
+          <a:p>
+            <a:r>
+              <a:rPr lang="en-US" dirty="0"/>
               <a:t>13</a:t>
             </a:r>
             <a:endParaRPr lang="en-SE" dirty="0"/>
@@ -8077,7 +8170,7 @@
 </p:notes>
 </file>
 
-<file path=ppt/notesSlides/notesSlide8.xml><?xml version="1.0" encoding="utf-8"?>
+<file path=ppt/notesSlides/notesSlide9.xml><?xml version="1.0" encoding="utf-8"?>
 <p:notes xmlns:a="http://schemas.openxmlformats.org/drawingml/2006/main" xmlns:r="http://schemas.openxmlformats.org/officeDocument/2006/relationships" xmlns:p="http://schemas.openxmlformats.org/presentationml/2006/main">
   <p:cSld>
     <p:spTree>
@@ -13341,7 +13434,7 @@
         </p:spPr>
         <p:txBody>
           <a:bodyPr vert="horz" lIns="91440" tIns="45720" rIns="91440" bIns="45720" rtlCol="0" anchor="b">
-            <a:normAutofit fontScale="77500" lnSpcReduction="20000"/>
+            <a:normAutofit/>
           </a:bodyPr>
           <a:lstStyle>
             <a:lvl1pPr algn="l" defTabSz="914400" rtl="0" eaLnBrk="1" latinLnBrk="0" hangingPunct="1">
@@ -13364,7 +13457,7 @@
           </a:lstStyle>
           <a:p>
             <a:r>
-              <a:rPr lang="en-GB" dirty="0">
+              <a:rPr lang="en-GB" sz="4400" dirty="0">
                 <a:solidFill>
                   <a:schemeClr val="bg1"/>
                 </a:solidFill>
@@ -13372,7 +13465,7 @@
               <a:t>Wait-</a:t>
             </a:r>
             <a:r>
-              <a:rPr lang="en-GB" dirty="0" err="1">
+              <a:rPr lang="en-GB" sz="4400" dirty="0" err="1">
                 <a:solidFill>
                   <a:schemeClr val="bg1"/>
                 </a:solidFill>
@@ -13380,7 +13473,7 @@
               <a:t>SessionEnd</a:t>
             </a:r>
             <a:r>
-              <a:rPr lang="en-GB" dirty="0">
+              <a:rPr lang="en-GB" sz="4400" dirty="0">
                 <a:solidFill>
                   <a:schemeClr val="bg1"/>
                 </a:solidFill>
@@ -14821,9 +14914,12 @@
           </a:bodyPr>
           <a:lstStyle/>
           <a:p>
+            <a:pPr marL="0" indent="0">
+              <a:buNone/>
+            </a:pPr>
             <a:r>
               <a:rPr lang="en-US" dirty="0"/>
-              <a:t>What are Azure Functions?</a:t>
+              <a:t>1. What are Azure Functions?</a:t>
             </a:r>
           </a:p>
           <a:p>
@@ -14846,15 +14942,21 @@
             </a:r>
           </a:p>
           <a:p>
+            <a:pPr marL="0" indent="0">
+              <a:buNone/>
+            </a:pPr>
             <a:r>
               <a:rPr lang="en-US" dirty="0"/>
-              <a:t>Why, when, how?</a:t>
+              <a:t>2. Why, when, how?</a:t>
             </a:r>
           </a:p>
           <a:p>
+            <a:pPr marL="0" indent="0">
+              <a:buNone/>
+            </a:pPr>
             <a:r>
               <a:rPr lang="en-US" dirty="0"/>
-              <a:t>Demo</a:t>
+              <a:t>3. Demo</a:t>
             </a:r>
           </a:p>
           <a:p>
@@ -14881,9 +14983,12 @@
             </a:r>
           </a:p>
           <a:p>
+            <a:pPr marL="0" indent="0">
+              <a:buNone/>
+            </a:pPr>
             <a:r>
               <a:rPr lang="en-US" dirty="0"/>
-              <a:t>Recap &amp; Questions</a:t>
+              <a:t>4. Recap &amp; Questions</a:t>
             </a:r>
           </a:p>
         </p:txBody>
@@ -15397,19 +15502,19 @@
         <p:spPr/>
         <p:txBody>
           <a:bodyPr>
-            <a:normAutofit fontScale="85000" lnSpcReduction="20000"/>
+            <a:normAutofit/>
           </a:bodyPr>
           <a:lstStyle/>
           <a:p>
             <a:r>
               <a:rPr lang="en-GB" dirty="0"/>
-              <a:t>“Just run my code” – ignore the infrastructure</a:t>
+              <a:t>“Just run my code”</a:t>
             </a:r>
           </a:p>
           <a:p>
             <a:r>
               <a:rPr lang="en-GB" dirty="0"/>
-              <a:t>Bindings – integrations and triggers</a:t>
+              <a:t>Bindings</a:t>
             </a:r>
           </a:p>
           <a:p>
@@ -15439,38 +15544,11 @@
             </a:r>
           </a:p>
           <a:p>
-            <a:pPr lvl="1"/>
-            <a:r>
-              <a:rPr lang="en-GB" dirty="0"/>
-              <a:t>Simplified system integrations</a:t>
-            </a:r>
-          </a:p>
-          <a:p>
             <a:r>
               <a:rPr lang="en-GB" sz="3200" dirty="0"/>
               <a:t>Got a time machine?</a:t>
             </a:r>
-          </a:p>
-          <a:p>
-            <a:pPr lvl="1"/>
-            <a:r>
-              <a:rPr lang="en-GB" sz="2800" dirty="0"/>
-              <a:t>Travel back 2 hours</a:t>
-            </a:r>
-          </a:p>
-          <a:p>
-            <a:pPr lvl="1"/>
-            <a:r>
-              <a:rPr lang="en-GB" sz="2800" dirty="0"/>
-              <a:t>Travel forward 108 days and 23 hours</a:t>
-            </a:r>
-          </a:p>
-          <a:p>
-            <a:pPr lvl="1"/>
-            <a:r>
-              <a:rPr lang="en-GB" sz="2800" dirty="0"/>
-              <a:t>… or go on YouTube!</a:t>
-            </a:r>
+            <a:endParaRPr lang="en-GB" sz="2800" dirty="0"/>
           </a:p>
         </p:txBody>
       </p:sp>
@@ -15508,6 +15586,117 @@
           </a:p>
         </p:txBody>
       </p:sp>
+      <p:pic>
+        <p:nvPicPr>
+          <p:cNvPr id="2" name="Image 10">
+            <a:extLst>
+              <a:ext uri="{FF2B5EF4-FFF2-40B4-BE49-F238E27FC236}">
+                <a16:creationId xmlns:a16="http://schemas.microsoft.com/office/drawing/2014/main" id="{3FF44118-B324-56E2-46FE-9D2BD75CAA39}"/>
+              </a:ext>
+            </a:extLst>
+          </p:cNvPr>
+          <p:cNvPicPr>
+            <a:picLocks noChangeAspect="1"/>
+          </p:cNvPicPr>
+          <p:nvPr/>
+        </p:nvPicPr>
+        <p:blipFill>
+          <a:blip r:embed="rId3">
+            <a:extLst>
+              <a:ext uri="{28A0092B-C50C-407E-A947-70E740481C1C}">
+                <a14:useLocalDpi xmlns:a14="http://schemas.microsoft.com/office/drawing/2010/main" val="0"/>
+              </a:ext>
+            </a:extLst>
+          </a:blip>
+          <a:stretch>
+            <a:fillRect/>
+          </a:stretch>
+        </p:blipFill>
+        <p:spPr>
+          <a:xfrm>
+            <a:off x="8560526" y="1302008"/>
+            <a:ext cx="1314994" cy="1378160"/>
+          </a:xfrm>
+          <a:prstGeom prst="rect">
+            <a:avLst/>
+          </a:prstGeom>
+        </p:spPr>
+      </p:pic>
+      <p:pic>
+        <p:nvPicPr>
+          <p:cNvPr id="5" name="Picture 4" descr="Logo&#10;&#10;Description automatically generated">
+            <a:extLst>
+              <a:ext uri="{FF2B5EF4-FFF2-40B4-BE49-F238E27FC236}">
+                <a16:creationId xmlns:a16="http://schemas.microsoft.com/office/drawing/2014/main" id="{53EF6A7B-ACF3-E1EE-2111-942C384C472C}"/>
+              </a:ext>
+            </a:extLst>
+          </p:cNvPr>
+          <p:cNvPicPr>
+            <a:picLocks noChangeAspect="1"/>
+          </p:cNvPicPr>
+          <p:nvPr/>
+        </p:nvPicPr>
+        <p:blipFill>
+          <a:blip r:embed="rId4">
+            <a:extLst>
+              <a:ext uri="{28A0092B-C50C-407E-A947-70E740481C1C}">
+                <a14:useLocalDpi xmlns:a14="http://schemas.microsoft.com/office/drawing/2010/main" val="0"/>
+              </a:ext>
+            </a:extLst>
+          </a:blip>
+          <a:stretch>
+            <a:fillRect/>
+          </a:stretch>
+        </p:blipFill>
+        <p:spPr>
+          <a:xfrm>
+            <a:off x="8153400" y="2502019"/>
+            <a:ext cx="2129246" cy="2129246"/>
+          </a:xfrm>
+          <a:prstGeom prst="rect">
+            <a:avLst/>
+          </a:prstGeom>
+        </p:spPr>
+      </p:pic>
+      <p:pic>
+        <p:nvPicPr>
+          <p:cNvPr id="7" name="Graphic 6">
+            <a:extLst>
+              <a:ext uri="{FF2B5EF4-FFF2-40B4-BE49-F238E27FC236}">
+                <a16:creationId xmlns:a16="http://schemas.microsoft.com/office/drawing/2014/main" id="{3DFE335F-B92B-3DF8-BE4B-0F4A74027EE5}"/>
+              </a:ext>
+            </a:extLst>
+          </p:cNvPr>
+          <p:cNvPicPr>
+            <a:picLocks noChangeAspect="1"/>
+          </p:cNvPicPr>
+          <p:nvPr/>
+        </p:nvPicPr>
+        <p:blipFill>
+          <a:blip r:embed="rId5">
+            <a:extLst>
+              <a:ext uri="{28A0092B-C50C-407E-A947-70E740481C1C}">
+                <a14:useLocalDpi xmlns:a14="http://schemas.microsoft.com/office/drawing/2010/main" val="0"/>
+              </a:ext>
+              <a:ext uri="{96DAC541-7B7A-43D3-8B79-37D633B846F1}">
+                <asvg:svgBlip xmlns:asvg="http://schemas.microsoft.com/office/drawing/2016/SVG/main" r:embed="rId6"/>
+              </a:ext>
+            </a:extLst>
+          </a:blip>
+          <a:stretch>
+            <a:fillRect/>
+          </a:stretch>
+        </p:blipFill>
+        <p:spPr>
+          <a:xfrm>
+            <a:off x="8598459" y="4698733"/>
+            <a:ext cx="1239128" cy="857259"/>
+          </a:xfrm>
+          <a:prstGeom prst="rect">
+            <a:avLst/>
+          </a:prstGeom>
+        </p:spPr>
+      </p:pic>
     </p:spTree>
     <p:extLst>
       <p:ext uri="{BB962C8B-B14F-4D97-AF65-F5344CB8AC3E}">
@@ -15850,15 +16039,33 @@
                                   </p:childTnLst>
                                 </p:cTn>
                               </p:par>
+                            </p:childTnLst>
+                          </p:cTn>
+                        </p:par>
+                      </p:childTnLst>
+                    </p:cTn>
+                  </p:par>
+                  <p:par>
+                    <p:cTn id="29" fill="hold">
+                      <p:stCondLst>
+                        <p:cond delay="indefinite"/>
+                      </p:stCondLst>
+                      <p:childTnLst>
+                        <p:par>
+                          <p:cTn id="30" fill="hold">
+                            <p:stCondLst>
+                              <p:cond delay="0"/>
+                            </p:stCondLst>
+                            <p:childTnLst>
                               <p:par>
-                                <p:cTn id="29" presetID="10" presetClass="entr" presetSubtype="0" fill="hold" grpId="0" nodeType="withEffect">
+                                <p:cTn id="31" presetID="10" presetClass="entr" presetSubtype="0" fill="hold" grpId="0" nodeType="clickEffect">
                                   <p:stCondLst>
                                     <p:cond delay="0"/>
                                   </p:stCondLst>
                                   <p:childTnLst>
                                     <p:set>
                                       <p:cBhvr>
-                                        <p:cTn id="30" dur="1" fill="hold">
+                                        <p:cTn id="32" dur="1" fill="hold">
                                           <p:stCondLst>
                                             <p:cond delay="0"/>
                                           </p:stCondLst>
@@ -15880,7 +16087,7 @@
                                     </p:set>
                                     <p:animEffect transition="in" filter="fade">
                                       <p:cBhvr>
-                                        <p:cTn id="31" dur="500"/>
+                                        <p:cTn id="33" dur="500"/>
                                         <p:tgtEl>
                                           <p:spTgt spid="3">
                                             <p:txEl>
@@ -15900,36 +16107,32 @@
                     </p:cTn>
                   </p:par>
                   <p:par>
-                    <p:cTn id="32" fill="hold">
+                    <p:cTn id="34" fill="hold">
                       <p:stCondLst>
                         <p:cond delay="indefinite"/>
                       </p:stCondLst>
                       <p:childTnLst>
                         <p:par>
-                          <p:cTn id="33" fill="hold">
+                          <p:cTn id="35" fill="hold">
                             <p:stCondLst>
                               <p:cond delay="0"/>
                             </p:stCondLst>
                             <p:childTnLst>
                               <p:par>
-                                <p:cTn id="34" presetID="10" presetClass="entr" presetSubtype="0" fill="hold" grpId="0" nodeType="clickEffect">
+                                <p:cTn id="36" presetID="10" presetClass="entr" presetSubtype="0" fill="hold" nodeType="clickEffect">
                                   <p:stCondLst>
                                     <p:cond delay="0"/>
                                   </p:stCondLst>
                                   <p:childTnLst>
                                     <p:set>
                                       <p:cBhvr>
-                                        <p:cTn id="35" dur="1" fill="hold">
+                                        <p:cTn id="37" dur="1" fill="hold">
                                           <p:stCondLst>
                                             <p:cond delay="0"/>
                                           </p:stCondLst>
                                         </p:cTn>
                                         <p:tgtEl>
-                                          <p:spTgt spid="3">
-                                            <p:txEl>
-                                              <p:pRg st="7" end="7"/>
-                                            </p:txEl>
-                                          </p:spTgt>
+                                          <p:spTgt spid="2"/>
                                         </p:tgtEl>
                                         <p:attrNameLst>
                                           <p:attrName>style.visibility</p:attrName>
@@ -15941,13 +16144,9 @@
                                     </p:set>
                                     <p:animEffect transition="in" filter="fade">
                                       <p:cBhvr>
-                                        <p:cTn id="36" dur="500"/>
+                                        <p:cTn id="38" dur="500"/>
                                         <p:tgtEl>
-                                          <p:spTgt spid="3">
-                                            <p:txEl>
-                                              <p:pRg st="7" end="7"/>
-                                            </p:txEl>
-                                          </p:spTgt>
+                                          <p:spTgt spid="2"/>
                                         </p:tgtEl>
                                       </p:cBhvr>
                                     </p:animEffect>
@@ -15961,36 +16160,32 @@
                     </p:cTn>
                   </p:par>
                   <p:par>
-                    <p:cTn id="37" fill="hold">
+                    <p:cTn id="39" fill="hold">
                       <p:stCondLst>
                         <p:cond delay="indefinite"/>
                       </p:stCondLst>
                       <p:childTnLst>
                         <p:par>
-                          <p:cTn id="38" fill="hold">
+                          <p:cTn id="40" fill="hold">
                             <p:stCondLst>
                               <p:cond delay="0"/>
                             </p:stCondLst>
                             <p:childTnLst>
                               <p:par>
-                                <p:cTn id="39" presetID="10" presetClass="entr" presetSubtype="0" fill="hold" grpId="0" nodeType="clickEffect">
+                                <p:cTn id="41" presetID="10" presetClass="entr" presetSubtype="0" fill="hold" nodeType="clickEffect">
                                   <p:stCondLst>
                                     <p:cond delay="0"/>
                                   </p:stCondLst>
                                   <p:childTnLst>
                                     <p:set>
                                       <p:cBhvr>
-                                        <p:cTn id="40" dur="1" fill="hold">
+                                        <p:cTn id="42" dur="1" fill="hold">
                                           <p:stCondLst>
                                             <p:cond delay="0"/>
                                           </p:stCondLst>
                                         </p:cTn>
                                         <p:tgtEl>
-                                          <p:spTgt spid="3">
-                                            <p:txEl>
-                                              <p:pRg st="8" end="8"/>
-                                            </p:txEl>
-                                          </p:spTgt>
+                                          <p:spTgt spid="5"/>
                                         </p:tgtEl>
                                         <p:attrNameLst>
                                           <p:attrName>style.visibility</p:attrName>
@@ -16002,13 +16197,9 @@
                                     </p:set>
                                     <p:animEffect transition="in" filter="fade">
                                       <p:cBhvr>
-                                        <p:cTn id="41" dur="500"/>
+                                        <p:cTn id="43" dur="500"/>
                                         <p:tgtEl>
-                                          <p:spTgt spid="3">
-                                            <p:txEl>
-                                              <p:pRg st="8" end="8"/>
-                                            </p:txEl>
-                                          </p:spTgt>
+                                          <p:spTgt spid="5"/>
                                         </p:tgtEl>
                                       </p:cBhvr>
                                     </p:animEffect>
@@ -16022,36 +16213,32 @@
                     </p:cTn>
                   </p:par>
                   <p:par>
-                    <p:cTn id="42" fill="hold">
+                    <p:cTn id="44" fill="hold">
                       <p:stCondLst>
                         <p:cond delay="indefinite"/>
                       </p:stCondLst>
                       <p:childTnLst>
                         <p:par>
-                          <p:cTn id="43" fill="hold">
+                          <p:cTn id="45" fill="hold">
                             <p:stCondLst>
                               <p:cond delay="0"/>
                             </p:stCondLst>
                             <p:childTnLst>
                               <p:par>
-                                <p:cTn id="44" presetID="10" presetClass="entr" presetSubtype="0" fill="hold" grpId="0" nodeType="clickEffect">
+                                <p:cTn id="46" presetID="10" presetClass="entr" presetSubtype="0" fill="hold" nodeType="clickEffect">
                                   <p:stCondLst>
                                     <p:cond delay="0"/>
                                   </p:stCondLst>
                                   <p:childTnLst>
                                     <p:set>
                                       <p:cBhvr>
-                                        <p:cTn id="45" dur="1" fill="hold">
+                                        <p:cTn id="47" dur="1" fill="hold">
                                           <p:stCondLst>
                                             <p:cond delay="0"/>
                                           </p:stCondLst>
                                         </p:cTn>
                                         <p:tgtEl>
-                                          <p:spTgt spid="3">
-                                            <p:txEl>
-                                              <p:pRg st="9" end="9"/>
-                                            </p:txEl>
-                                          </p:spTgt>
+                                          <p:spTgt spid="7"/>
                                         </p:tgtEl>
                                         <p:attrNameLst>
                                           <p:attrName>style.visibility</p:attrName>
@@ -16063,74 +16250,9 @@
                                     </p:set>
                                     <p:animEffect transition="in" filter="fade">
                                       <p:cBhvr>
-                                        <p:cTn id="46" dur="500"/>
+                                        <p:cTn id="48" dur="500"/>
                                         <p:tgtEl>
-                                          <p:spTgt spid="3">
-                                            <p:txEl>
-                                              <p:pRg st="9" end="9"/>
-                                            </p:txEl>
-                                          </p:spTgt>
-                                        </p:tgtEl>
-                                      </p:cBhvr>
-                                    </p:animEffect>
-                                  </p:childTnLst>
-                                </p:cTn>
-                              </p:par>
-                            </p:childTnLst>
-                          </p:cTn>
-                        </p:par>
-                      </p:childTnLst>
-                    </p:cTn>
-                  </p:par>
-                  <p:par>
-                    <p:cTn id="47" fill="hold">
-                      <p:stCondLst>
-                        <p:cond delay="indefinite"/>
-                      </p:stCondLst>
-                      <p:childTnLst>
-                        <p:par>
-                          <p:cTn id="48" fill="hold">
-                            <p:stCondLst>
-                              <p:cond delay="0"/>
-                            </p:stCondLst>
-                            <p:childTnLst>
-                              <p:par>
-                                <p:cTn id="49" presetID="10" presetClass="entr" presetSubtype="0" fill="hold" grpId="0" nodeType="clickEffect">
-                                  <p:stCondLst>
-                                    <p:cond delay="0"/>
-                                  </p:stCondLst>
-                                  <p:childTnLst>
-                                    <p:set>
-                                      <p:cBhvr>
-                                        <p:cTn id="50" dur="1" fill="hold">
-                                          <p:stCondLst>
-                                            <p:cond delay="0"/>
-                                          </p:stCondLst>
-                                        </p:cTn>
-                                        <p:tgtEl>
-                                          <p:spTgt spid="3">
-                                            <p:txEl>
-                                              <p:pRg st="10" end="10"/>
-                                            </p:txEl>
-                                          </p:spTgt>
-                                        </p:tgtEl>
-                                        <p:attrNameLst>
-                                          <p:attrName>style.visibility</p:attrName>
-                                        </p:attrNameLst>
-                                      </p:cBhvr>
-                                      <p:to>
-                                        <p:strVal val="visible"/>
-                                      </p:to>
-                                    </p:set>
-                                    <p:animEffect transition="in" filter="fade">
-                                      <p:cBhvr>
-                                        <p:cTn id="51" dur="500"/>
-                                        <p:tgtEl>
-                                          <p:spTgt spid="3">
-                                            <p:txEl>
-                                              <p:pRg st="10" end="10"/>
-                                            </p:txEl>
-                                          </p:spTgt>
+                                          <p:spTgt spid="7"/>
                                         </p:tgtEl>
                                       </p:cBhvr>
                                     </p:animEffect>
@@ -18499,8 +18621,8 @@
               <a:chExt cx="281520" cy="345960"/>
             </a:xfrm>
           </p:grpSpPr>
-          <mc:AlternateContent xmlns:mc="http://schemas.openxmlformats.org/markup-compatibility/2006">
-            <mc:Choice xmlns:p14="http://schemas.microsoft.com/office/powerpoint/2010/main" Requires="p14">
+          <mc:AlternateContent xmlns:mc="http://schemas.openxmlformats.org/markup-compatibility/2006" xmlns:p14="http://schemas.microsoft.com/office/powerpoint/2010/main">
+            <mc:Choice Requires="p14">
               <p:contentPart p14:bwMode="auto" r:id="rId4">
                 <p14:nvContentPartPr>
                   <p14:cNvPr id="109" name="Ink 108">
@@ -18519,7 +18641,7 @@
                 </p14:xfrm>
               </p:contentPart>
             </mc:Choice>
-            <mc:Fallback>
+            <mc:Fallback xmlns="">
               <p:pic>
                 <p:nvPicPr>
                   <p:cNvPr id="109" name="Ink 108">
@@ -18550,8 +18672,8 @@
               </p:pic>
             </mc:Fallback>
           </mc:AlternateContent>
-          <mc:AlternateContent xmlns:mc="http://schemas.openxmlformats.org/markup-compatibility/2006">
-            <mc:Choice xmlns:p14="http://schemas.microsoft.com/office/powerpoint/2010/main" Requires="p14">
+          <mc:AlternateContent xmlns:mc="http://schemas.openxmlformats.org/markup-compatibility/2006" xmlns:p14="http://schemas.microsoft.com/office/powerpoint/2010/main">
+            <mc:Choice Requires="p14">
               <p:contentPart p14:bwMode="auto" r:id="rId6">
                 <p14:nvContentPartPr>
                   <p14:cNvPr id="111" name="Ink 110">
@@ -18570,7 +18692,7 @@
                 </p14:xfrm>
               </p:contentPart>
             </mc:Choice>
-            <mc:Fallback>
+            <mc:Fallback xmlns="">
               <p:pic>
                 <p:nvPicPr>
                   <p:cNvPr id="111" name="Ink 110">
@@ -18622,8 +18744,8 @@
               <a:chExt cx="205200" cy="266760"/>
             </a:xfrm>
           </p:grpSpPr>
-          <mc:AlternateContent xmlns:mc="http://schemas.openxmlformats.org/markup-compatibility/2006">
-            <mc:Choice xmlns:p14="http://schemas.microsoft.com/office/powerpoint/2010/main" Requires="p14">
+          <mc:AlternateContent xmlns:mc="http://schemas.openxmlformats.org/markup-compatibility/2006" xmlns:p14="http://schemas.microsoft.com/office/powerpoint/2010/main">
+            <mc:Choice Requires="p14">
               <p:contentPart p14:bwMode="auto" r:id="rId8">
                 <p14:nvContentPartPr>
                   <p14:cNvPr id="162" name="Ink 161">
@@ -18642,7 +18764,7 @@
                 </p14:xfrm>
               </p:contentPart>
             </mc:Choice>
-            <mc:Fallback>
+            <mc:Fallback xmlns="">
               <p:pic>
                 <p:nvPicPr>
                   <p:cNvPr id="162" name="Ink 161">
@@ -18673,8 +18795,8 @@
               </p:pic>
             </mc:Fallback>
           </mc:AlternateContent>
-          <mc:AlternateContent xmlns:mc="http://schemas.openxmlformats.org/markup-compatibility/2006">
-            <mc:Choice xmlns:p14="http://schemas.microsoft.com/office/powerpoint/2010/main" Requires="p14">
+          <mc:AlternateContent xmlns:mc="http://schemas.openxmlformats.org/markup-compatibility/2006" xmlns:p14="http://schemas.microsoft.com/office/powerpoint/2010/main">
+            <mc:Choice Requires="p14">
               <p:contentPart p14:bwMode="auto" r:id="rId10">
                 <p14:nvContentPartPr>
                   <p14:cNvPr id="169" name="Ink 168">
@@ -18693,7 +18815,7 @@
                 </p14:xfrm>
               </p:contentPart>
             </mc:Choice>
-            <mc:Fallback>
+            <mc:Fallback xmlns="">
               <p:pic>
                 <p:nvPicPr>
                   <p:cNvPr id="169" name="Ink 168">
@@ -18766,8 +18888,8 @@
               <a:chExt cx="381600" cy="355320"/>
             </a:xfrm>
           </p:grpSpPr>
-          <mc:AlternateContent xmlns:mc="http://schemas.openxmlformats.org/markup-compatibility/2006">
-            <mc:Choice xmlns:p14="http://schemas.microsoft.com/office/powerpoint/2010/main" Requires="p14">
+          <mc:AlternateContent xmlns:mc="http://schemas.openxmlformats.org/markup-compatibility/2006" xmlns:p14="http://schemas.microsoft.com/office/powerpoint/2010/main">
+            <mc:Choice Requires="p14">
               <p:contentPart p14:bwMode="auto" r:id="rId12">
                 <p14:nvContentPartPr>
                   <p14:cNvPr id="27" name="Ink 26">
@@ -18786,7 +18908,7 @@
                 </p14:xfrm>
               </p:contentPart>
             </mc:Choice>
-            <mc:Fallback>
+            <mc:Fallback xmlns="">
               <p:pic>
                 <p:nvPicPr>
                   <p:cNvPr id="27" name="Ink 26">
@@ -18817,8 +18939,8 @@
               </p:pic>
             </mc:Fallback>
           </mc:AlternateContent>
-          <mc:AlternateContent xmlns:mc="http://schemas.openxmlformats.org/markup-compatibility/2006">
-            <mc:Choice xmlns:p14="http://schemas.microsoft.com/office/powerpoint/2010/main" Requires="p14">
+          <mc:AlternateContent xmlns:mc="http://schemas.openxmlformats.org/markup-compatibility/2006" xmlns:p14="http://schemas.microsoft.com/office/powerpoint/2010/main">
+            <mc:Choice Requires="p14">
               <p:contentPart p14:bwMode="auto" r:id="rId14">
                 <p14:nvContentPartPr>
                   <p14:cNvPr id="28" name="Ink 27">
@@ -18837,7 +18959,7 @@
                 </p14:xfrm>
               </p:contentPart>
             </mc:Choice>
-            <mc:Fallback>
+            <mc:Fallback xmlns="">
               <p:pic>
                 <p:nvPicPr>
                   <p:cNvPr id="28" name="Ink 27">
@@ -18869,8 +18991,8 @@
             </mc:Fallback>
           </mc:AlternateContent>
         </p:grpSp>
-        <mc:AlternateContent xmlns:mc="http://schemas.openxmlformats.org/markup-compatibility/2006">
-          <mc:Choice xmlns:p14="http://schemas.microsoft.com/office/powerpoint/2010/main" Requires="p14">
+        <mc:AlternateContent xmlns:mc="http://schemas.openxmlformats.org/markup-compatibility/2006" xmlns:p14="http://schemas.microsoft.com/office/powerpoint/2010/main">
+          <mc:Choice Requires="p14">
             <p:contentPart p14:bwMode="auto" r:id="rId16">
               <p14:nvContentPartPr>
                 <p14:cNvPr id="181" name="2">
@@ -18889,7 +19011,7 @@
               </p14:xfrm>
             </p:contentPart>
           </mc:Choice>
-          <mc:Fallback>
+          <mc:Fallback xmlns="">
             <p:pic>
               <p:nvPicPr>
                 <p:cNvPr id="181" name="2">
@@ -18961,8 +19083,8 @@
               <a:chExt cx="576720" cy="520920"/>
             </a:xfrm>
           </p:grpSpPr>
-          <mc:AlternateContent xmlns:mc="http://schemas.openxmlformats.org/markup-compatibility/2006">
-            <mc:Choice xmlns:p14="http://schemas.microsoft.com/office/powerpoint/2010/main" Requires="p14">
+          <mc:AlternateContent xmlns:mc="http://schemas.openxmlformats.org/markup-compatibility/2006" xmlns:p14="http://schemas.microsoft.com/office/powerpoint/2010/main">
+            <mc:Choice Requires="p14">
               <p:contentPart p14:bwMode="auto" r:id="rId18">
                 <p14:nvContentPartPr>
                   <p14:cNvPr id="116" name="Ink 115">
@@ -18981,7 +19103,7 @@
                 </p14:xfrm>
               </p:contentPart>
             </mc:Choice>
-            <mc:Fallback>
+            <mc:Fallback xmlns="">
               <p:pic>
                 <p:nvPicPr>
                   <p:cNvPr id="116" name="Ink 115">
@@ -19012,8 +19134,8 @@
               </p:pic>
             </mc:Fallback>
           </mc:AlternateContent>
-          <mc:AlternateContent xmlns:mc="http://schemas.openxmlformats.org/markup-compatibility/2006">
-            <mc:Choice xmlns:p14="http://schemas.microsoft.com/office/powerpoint/2010/main" Requires="p14">
+          <mc:AlternateContent xmlns:mc="http://schemas.openxmlformats.org/markup-compatibility/2006" xmlns:p14="http://schemas.microsoft.com/office/powerpoint/2010/main">
+            <mc:Choice Requires="p14">
               <p:contentPart p14:bwMode="auto" r:id="rId20">
                 <p14:nvContentPartPr>
                   <p14:cNvPr id="122" name="Ink 121">
@@ -19032,7 +19154,7 @@
                 </p14:xfrm>
               </p:contentPart>
             </mc:Choice>
-            <mc:Fallback>
+            <mc:Fallback xmlns="">
               <p:pic>
                 <p:nvPicPr>
                   <p:cNvPr id="122" name="Ink 121">
@@ -19064,8 +19186,8 @@
             </mc:Fallback>
           </mc:AlternateContent>
         </p:grpSp>
-        <mc:AlternateContent xmlns:mc="http://schemas.openxmlformats.org/markup-compatibility/2006">
-          <mc:Choice xmlns:p14="http://schemas.microsoft.com/office/powerpoint/2010/main" Requires="p14">
+        <mc:AlternateContent xmlns:mc="http://schemas.openxmlformats.org/markup-compatibility/2006" xmlns:p14="http://schemas.microsoft.com/office/powerpoint/2010/main">
+          <mc:Choice Requires="p14">
             <p:contentPart p14:bwMode="auto" r:id="rId22">
               <p14:nvContentPartPr>
                 <p14:cNvPr id="183" name="3">
@@ -19084,7 +19206,7 @@
               </p14:xfrm>
             </p:contentPart>
           </mc:Choice>
-          <mc:Fallback>
+          <mc:Fallback xmlns="">
             <p:pic>
               <p:nvPicPr>
                 <p:cNvPr id="183" name="3">
@@ -19156,8 +19278,8 @@
               <a:chExt cx="459360" cy="420120"/>
             </a:xfrm>
           </p:grpSpPr>
-          <mc:AlternateContent xmlns:mc="http://schemas.openxmlformats.org/markup-compatibility/2006">
-            <mc:Choice xmlns:p14="http://schemas.microsoft.com/office/powerpoint/2010/main" Requires="p14">
+          <mc:AlternateContent xmlns:mc="http://schemas.openxmlformats.org/markup-compatibility/2006" xmlns:p14="http://schemas.microsoft.com/office/powerpoint/2010/main">
+            <mc:Choice Requires="p14">
               <p:contentPart p14:bwMode="auto" r:id="rId24">
                 <p14:nvContentPartPr>
                   <p14:cNvPr id="47" name="Ink 46">
@@ -19176,7 +19298,7 @@
                 </p14:xfrm>
               </p:contentPart>
             </mc:Choice>
-            <mc:Fallback>
+            <mc:Fallback xmlns="">
               <p:pic>
                 <p:nvPicPr>
                   <p:cNvPr id="47" name="Ink 46">
@@ -19207,8 +19329,8 @@
               </p:pic>
             </mc:Fallback>
           </mc:AlternateContent>
-          <mc:AlternateContent xmlns:mc="http://schemas.openxmlformats.org/markup-compatibility/2006">
-            <mc:Choice xmlns:p14="http://schemas.microsoft.com/office/powerpoint/2010/main" Requires="p14">
+          <mc:AlternateContent xmlns:mc="http://schemas.openxmlformats.org/markup-compatibility/2006" xmlns:p14="http://schemas.microsoft.com/office/powerpoint/2010/main">
+            <mc:Choice Requires="p14">
               <p:contentPart p14:bwMode="auto" r:id="rId26">
                 <p14:nvContentPartPr>
                   <p14:cNvPr id="64" name="Ink 63">
@@ -19227,7 +19349,7 @@
                 </p14:xfrm>
               </p:contentPart>
             </mc:Choice>
-            <mc:Fallback>
+            <mc:Fallback xmlns="">
               <p:pic>
                 <p:nvPicPr>
                   <p:cNvPr id="64" name="Ink 63">
@@ -19259,8 +19381,8 @@
             </mc:Fallback>
           </mc:AlternateContent>
         </p:grpSp>
-        <mc:AlternateContent xmlns:mc="http://schemas.openxmlformats.org/markup-compatibility/2006">
-          <mc:Choice xmlns:p14="http://schemas.microsoft.com/office/powerpoint/2010/main" Requires="p14">
+        <mc:AlternateContent xmlns:mc="http://schemas.openxmlformats.org/markup-compatibility/2006" xmlns:p14="http://schemas.microsoft.com/office/powerpoint/2010/main">
+          <mc:Choice Requires="p14">
             <p:contentPart p14:bwMode="auto" r:id="rId28">
               <p14:nvContentPartPr>
                 <p14:cNvPr id="184" name="4">
@@ -19279,7 +19401,7 @@
               </p14:xfrm>
             </p:contentPart>
           </mc:Choice>
-          <mc:Fallback>
+          <mc:Fallback xmlns="">
             <p:pic>
               <p:nvPicPr>
                 <p:cNvPr id="184" name="4">
@@ -19351,8 +19473,8 @@
               <a:chExt cx="547560" cy="519840"/>
             </a:xfrm>
           </p:grpSpPr>
-          <mc:AlternateContent xmlns:mc="http://schemas.openxmlformats.org/markup-compatibility/2006">
-            <mc:Choice xmlns:p14="http://schemas.microsoft.com/office/powerpoint/2010/main" Requires="p14">
+          <mc:AlternateContent xmlns:mc="http://schemas.openxmlformats.org/markup-compatibility/2006" xmlns:p14="http://schemas.microsoft.com/office/powerpoint/2010/main">
+            <mc:Choice Requires="p14">
               <p:contentPart p14:bwMode="auto" r:id="rId30">
                 <p14:nvContentPartPr>
                   <p14:cNvPr id="129" name="Ink 128">
@@ -19371,7 +19493,7 @@
                 </p14:xfrm>
               </p:contentPart>
             </mc:Choice>
-            <mc:Fallback>
+            <mc:Fallback xmlns="">
               <p:pic>
                 <p:nvPicPr>
                   <p:cNvPr id="129" name="Ink 128">
@@ -19402,8 +19524,8 @@
               </p:pic>
             </mc:Fallback>
           </mc:AlternateContent>
-          <mc:AlternateContent xmlns:mc="http://schemas.openxmlformats.org/markup-compatibility/2006">
-            <mc:Choice xmlns:p14="http://schemas.microsoft.com/office/powerpoint/2010/main" Requires="p14">
+          <mc:AlternateContent xmlns:mc="http://schemas.openxmlformats.org/markup-compatibility/2006" xmlns:p14="http://schemas.microsoft.com/office/powerpoint/2010/main">
+            <mc:Choice Requires="p14">
               <p:contentPart p14:bwMode="auto" r:id="rId32">
                 <p14:nvContentPartPr>
                   <p14:cNvPr id="141" name="Ink 140">
@@ -19422,7 +19544,7 @@
                 </p14:xfrm>
               </p:contentPart>
             </mc:Choice>
-            <mc:Fallback>
+            <mc:Fallback xmlns="">
               <p:pic>
                 <p:nvPicPr>
                   <p:cNvPr id="141" name="Ink 140">
@@ -19474,8 +19596,8 @@
               <a:chExt cx="105480" cy="205920"/>
             </a:xfrm>
           </p:grpSpPr>
-          <mc:AlternateContent xmlns:mc="http://schemas.openxmlformats.org/markup-compatibility/2006">
-            <mc:Choice xmlns:p14="http://schemas.microsoft.com/office/powerpoint/2010/main" Requires="p14">
+          <mc:AlternateContent xmlns:mc="http://schemas.openxmlformats.org/markup-compatibility/2006" xmlns:p14="http://schemas.microsoft.com/office/powerpoint/2010/main">
+            <mc:Choice Requires="p14">
               <p:contentPart p14:bwMode="auto" r:id="rId34">
                 <p14:nvContentPartPr>
                   <p14:cNvPr id="188" name="Ink 187">
@@ -19494,7 +19616,7 @@
                 </p14:xfrm>
               </p:contentPart>
             </mc:Choice>
-            <mc:Fallback>
+            <mc:Fallback xmlns="">
               <p:pic>
                 <p:nvPicPr>
                   <p:cNvPr id="188" name="Ink 187">
@@ -19525,8 +19647,8 @@
               </p:pic>
             </mc:Fallback>
           </mc:AlternateContent>
-          <mc:AlternateContent xmlns:mc="http://schemas.openxmlformats.org/markup-compatibility/2006">
-            <mc:Choice xmlns:p14="http://schemas.microsoft.com/office/powerpoint/2010/main" Requires="p14">
+          <mc:AlternateContent xmlns:mc="http://schemas.openxmlformats.org/markup-compatibility/2006" xmlns:p14="http://schemas.microsoft.com/office/powerpoint/2010/main">
+            <mc:Choice Requires="p14">
               <p:contentPart p14:bwMode="auto" r:id="rId36">
                 <p14:nvContentPartPr>
                   <p14:cNvPr id="190" name="Ink 189">
@@ -19545,7 +19667,7 @@
                 </p14:xfrm>
               </p:contentPart>
             </mc:Choice>
-            <mc:Fallback>
+            <mc:Fallback xmlns="">
               <p:pic>
                 <p:nvPicPr>
                   <p:cNvPr id="190" name="Ink 189">
@@ -19989,6 +20111,249 @@
                                   </p:childTnLst>
                                 </p:cTn>
                               </p:par>
+                              <p:par>
+                                <p:cTn id="34" presetID="19" presetClass="emph" presetSubtype="0" fill="hold" nodeType="withEffect">
+                                  <p:stCondLst>
+                                    <p:cond delay="0"/>
+                                  </p:stCondLst>
+                                  <p:childTnLst>
+                                    <p:animClr clrSpc="rgb" dir="cw">
+                                      <p:cBhvr override="childStyle">
+                                        <p:cTn id="35" dur="500" fill="hold"/>
+                                        <p:tgtEl>
+                                          <p:spTgt spid="3">
+                                            <p:txEl>
+                                              <p:pRg st="0" end="0"/>
+                                            </p:txEl>
+                                          </p:spTgt>
+                                        </p:tgtEl>
+                                        <p:attrNameLst>
+                                          <p:attrName>style.color</p:attrName>
+                                        </p:attrNameLst>
+                                      </p:cBhvr>
+                                      <p:to>
+                                        <a:srgbClr val="5F5F5F"/>
+                                      </p:to>
+                                    </p:animClr>
+                                    <p:animClr clrSpc="rgb" dir="cw">
+                                      <p:cBhvr>
+                                        <p:cTn id="36" dur="500" fill="hold"/>
+                                        <p:tgtEl>
+                                          <p:spTgt spid="3">
+                                            <p:txEl>
+                                              <p:pRg st="0" end="0"/>
+                                            </p:txEl>
+                                          </p:spTgt>
+                                        </p:tgtEl>
+                                        <p:attrNameLst>
+                                          <p:attrName>fillcolor</p:attrName>
+                                        </p:attrNameLst>
+                                      </p:cBhvr>
+                                      <p:to>
+                                        <a:srgbClr val="5F5F5F"/>
+                                      </p:to>
+                                    </p:animClr>
+                                    <p:set>
+                                      <p:cBhvr>
+                                        <p:cTn id="37" dur="500" fill="hold"/>
+                                        <p:tgtEl>
+                                          <p:spTgt spid="3">
+                                            <p:txEl>
+                                              <p:pRg st="0" end="0"/>
+                                            </p:txEl>
+                                          </p:spTgt>
+                                        </p:tgtEl>
+                                        <p:attrNameLst>
+                                          <p:attrName>fill.type</p:attrName>
+                                        </p:attrNameLst>
+                                      </p:cBhvr>
+                                      <p:to>
+                                        <p:strVal val="solid"/>
+                                      </p:to>
+                                    </p:set>
+                                    <p:set>
+                                      <p:cBhvr>
+                                        <p:cTn id="38" dur="500" fill="hold"/>
+                                        <p:tgtEl>
+                                          <p:spTgt spid="3">
+                                            <p:txEl>
+                                              <p:pRg st="0" end="0"/>
+                                            </p:txEl>
+                                          </p:spTgt>
+                                        </p:tgtEl>
+                                        <p:attrNameLst>
+                                          <p:attrName>fill.on</p:attrName>
+                                        </p:attrNameLst>
+                                      </p:cBhvr>
+                                      <p:to>
+                                        <p:strVal val="true"/>
+                                      </p:to>
+                                    </p:set>
+                                  </p:childTnLst>
+                                </p:cTn>
+                              </p:par>
+                              <p:par>
+                                <p:cTn id="39" presetID="19" presetClass="emph" presetSubtype="0" fill="hold" nodeType="withEffect">
+                                  <p:stCondLst>
+                                    <p:cond delay="0"/>
+                                  </p:stCondLst>
+                                  <p:childTnLst>
+                                    <p:animClr clrSpc="rgb" dir="cw">
+                                      <p:cBhvr override="childStyle">
+                                        <p:cTn id="40" dur="500" fill="hold"/>
+                                        <p:tgtEl>
+                                          <p:spTgt spid="3">
+                                            <p:txEl>
+                                              <p:pRg st="1" end="1"/>
+                                            </p:txEl>
+                                          </p:spTgt>
+                                        </p:tgtEl>
+                                        <p:attrNameLst>
+                                          <p:attrName>style.color</p:attrName>
+                                        </p:attrNameLst>
+                                      </p:cBhvr>
+                                      <p:to>
+                                        <a:srgbClr val="5F5F5F"/>
+                                      </p:to>
+                                    </p:animClr>
+                                    <p:animClr clrSpc="rgb" dir="cw">
+                                      <p:cBhvr>
+                                        <p:cTn id="41" dur="500" fill="hold"/>
+                                        <p:tgtEl>
+                                          <p:spTgt spid="3">
+                                            <p:txEl>
+                                              <p:pRg st="1" end="1"/>
+                                            </p:txEl>
+                                          </p:spTgt>
+                                        </p:tgtEl>
+                                        <p:attrNameLst>
+                                          <p:attrName>fillcolor</p:attrName>
+                                        </p:attrNameLst>
+                                      </p:cBhvr>
+                                      <p:to>
+                                        <a:srgbClr val="5F5F5F"/>
+                                      </p:to>
+                                    </p:animClr>
+                                    <p:set>
+                                      <p:cBhvr>
+                                        <p:cTn id="42" dur="500" fill="hold"/>
+                                        <p:tgtEl>
+                                          <p:spTgt spid="3">
+                                            <p:txEl>
+                                              <p:pRg st="1" end="1"/>
+                                            </p:txEl>
+                                          </p:spTgt>
+                                        </p:tgtEl>
+                                        <p:attrNameLst>
+                                          <p:attrName>fill.type</p:attrName>
+                                        </p:attrNameLst>
+                                      </p:cBhvr>
+                                      <p:to>
+                                        <p:strVal val="solid"/>
+                                      </p:to>
+                                    </p:set>
+                                    <p:set>
+                                      <p:cBhvr>
+                                        <p:cTn id="43" dur="500" fill="hold"/>
+                                        <p:tgtEl>
+                                          <p:spTgt spid="3">
+                                            <p:txEl>
+                                              <p:pRg st="1" end="1"/>
+                                            </p:txEl>
+                                          </p:spTgt>
+                                        </p:tgtEl>
+                                        <p:attrNameLst>
+                                          <p:attrName>fill.on</p:attrName>
+                                        </p:attrNameLst>
+                                      </p:cBhvr>
+                                      <p:to>
+                                        <p:strVal val="true"/>
+                                      </p:to>
+                                    </p:set>
+                                  </p:childTnLst>
+                                </p:cTn>
+                              </p:par>
+                              <p:par>
+                                <p:cTn id="44" presetID="19" presetClass="emph" presetSubtype="0" fill="hold" nodeType="withEffect">
+                                  <p:stCondLst>
+                                    <p:cond delay="0"/>
+                                  </p:stCondLst>
+                                  <p:childTnLst>
+                                    <p:animClr clrSpc="rgb" dir="cw">
+                                      <p:cBhvr override="childStyle">
+                                        <p:cTn id="45" dur="500" fill="hold"/>
+                                        <p:tgtEl>
+                                          <p:spTgt spid="3">
+                                            <p:txEl>
+                                              <p:pRg st="2" end="2"/>
+                                            </p:txEl>
+                                          </p:spTgt>
+                                        </p:tgtEl>
+                                        <p:attrNameLst>
+                                          <p:attrName>style.color</p:attrName>
+                                        </p:attrNameLst>
+                                      </p:cBhvr>
+                                      <p:to>
+                                        <a:srgbClr val="5F5F5F"/>
+                                      </p:to>
+                                    </p:animClr>
+                                    <p:animClr clrSpc="rgb" dir="cw">
+                                      <p:cBhvr>
+                                        <p:cTn id="46" dur="500" fill="hold"/>
+                                        <p:tgtEl>
+                                          <p:spTgt spid="3">
+                                            <p:txEl>
+                                              <p:pRg st="2" end="2"/>
+                                            </p:txEl>
+                                          </p:spTgt>
+                                        </p:tgtEl>
+                                        <p:attrNameLst>
+                                          <p:attrName>fillcolor</p:attrName>
+                                        </p:attrNameLst>
+                                      </p:cBhvr>
+                                      <p:to>
+                                        <a:srgbClr val="5F5F5F"/>
+                                      </p:to>
+                                    </p:animClr>
+                                    <p:set>
+                                      <p:cBhvr>
+                                        <p:cTn id="47" dur="500" fill="hold"/>
+                                        <p:tgtEl>
+                                          <p:spTgt spid="3">
+                                            <p:txEl>
+                                              <p:pRg st="2" end="2"/>
+                                            </p:txEl>
+                                          </p:spTgt>
+                                        </p:tgtEl>
+                                        <p:attrNameLst>
+                                          <p:attrName>fill.type</p:attrName>
+                                        </p:attrNameLst>
+                                      </p:cBhvr>
+                                      <p:to>
+                                        <p:strVal val="solid"/>
+                                      </p:to>
+                                    </p:set>
+                                    <p:set>
+                                      <p:cBhvr>
+                                        <p:cTn id="48" dur="500" fill="hold"/>
+                                        <p:tgtEl>
+                                          <p:spTgt spid="3">
+                                            <p:txEl>
+                                              <p:pRg st="2" end="2"/>
+                                            </p:txEl>
+                                          </p:spTgt>
+                                        </p:tgtEl>
+                                        <p:attrNameLst>
+                                          <p:attrName>fill.on</p:attrName>
+                                        </p:attrNameLst>
+                                      </p:cBhvr>
+                                      <p:to>
+                                        <p:strVal val="true"/>
+                                      </p:to>
+                                    </p:set>
+                                  </p:childTnLst>
+                                </p:cTn>
+                              </p:par>
                             </p:childTnLst>
                           </p:cTn>
                         </p:par>
@@ -19996,26 +20361,26 @@
                     </p:cTn>
                   </p:par>
                   <p:par>
-                    <p:cTn id="34" fill="hold">
+                    <p:cTn id="49" fill="hold">
                       <p:stCondLst>
                         <p:cond delay="indefinite"/>
                       </p:stCondLst>
                       <p:childTnLst>
                         <p:par>
-                          <p:cTn id="35" fill="hold">
+                          <p:cTn id="50" fill="hold">
                             <p:stCondLst>
                               <p:cond delay="0"/>
                             </p:stCondLst>
                             <p:childTnLst>
                               <p:par>
-                                <p:cTn id="36" presetID="10" presetClass="entr" presetSubtype="0" fill="hold" grpId="0" nodeType="clickEffect">
+                                <p:cTn id="51" presetID="10" presetClass="entr" presetSubtype="0" fill="hold" grpId="0" nodeType="clickEffect">
                                   <p:stCondLst>
                                     <p:cond delay="0"/>
                                   </p:stCondLst>
                                   <p:childTnLst>
                                     <p:set>
                                       <p:cBhvr>
-                                        <p:cTn id="37" dur="1" fill="hold">
+                                        <p:cTn id="52" dur="1" fill="hold">
                                           <p:stCondLst>
                                             <p:cond delay="0"/>
                                           </p:stCondLst>
@@ -20037,7 +20402,7 @@
                                     </p:set>
                                     <p:animEffect transition="in" filter="fade">
                                       <p:cBhvr>
-                                        <p:cTn id="38" dur="500"/>
+                                        <p:cTn id="53" dur="500"/>
                                         <p:tgtEl>
                                           <p:spTgt spid="3">
                                             <p:txEl>
@@ -20051,14 +20416,14 @@
                                 </p:cTn>
                               </p:par>
                               <p:par>
-                                <p:cTn id="39" presetID="10" presetClass="entr" presetSubtype="0" fill="hold" nodeType="withEffect">
+                                <p:cTn id="54" presetID="10" presetClass="entr" presetSubtype="0" fill="hold" nodeType="withEffect">
                                   <p:stCondLst>
                                     <p:cond delay="0"/>
                                   </p:stCondLst>
                                   <p:childTnLst>
                                     <p:set>
                                       <p:cBhvr>
-                                        <p:cTn id="40" dur="1" fill="hold">
+                                        <p:cTn id="55" dur="1" fill="hold">
                                           <p:stCondLst>
                                             <p:cond delay="0"/>
                                           </p:stCondLst>
@@ -20076,7 +20441,7 @@
                                     </p:set>
                                     <p:animEffect transition="in" filter="fade">
                                       <p:cBhvr>
-                                        <p:cTn id="41" dur="500"/>
+                                        <p:cTn id="56" dur="500"/>
                                         <p:tgtEl>
                                           <p:spTgt spid="199"/>
                                         </p:tgtEl>
@@ -20086,14 +20451,14 @@
                                 </p:cTn>
                               </p:par>
                               <p:par>
-                                <p:cTn id="42" presetID="10" presetClass="entr" presetSubtype="0" fill="hold" grpId="0" nodeType="withEffect">
+                                <p:cTn id="57" presetID="10" presetClass="entr" presetSubtype="0" fill="hold" grpId="0" nodeType="withEffect">
                                   <p:stCondLst>
                                     <p:cond delay="0"/>
                                   </p:stCondLst>
                                   <p:childTnLst>
                                     <p:set>
                                       <p:cBhvr>
-                                        <p:cTn id="43" dur="1" fill="hold">
+                                        <p:cTn id="58" dur="1" fill="hold">
                                           <p:stCondLst>
                                             <p:cond delay="0"/>
                                           </p:stCondLst>
@@ -20115,7 +20480,7 @@
                                     </p:set>
                                     <p:animEffect transition="in" filter="fade">
                                       <p:cBhvr>
-                                        <p:cTn id="44" dur="500"/>
+                                        <p:cTn id="59" dur="500"/>
                                         <p:tgtEl>
                                           <p:spTgt spid="3">
                                             <p:txEl>
@@ -20129,14 +20494,14 @@
                                 </p:cTn>
                               </p:par>
                               <p:par>
-                                <p:cTn id="45" presetID="10" presetClass="entr" presetSubtype="0" fill="hold" grpId="0" nodeType="withEffect">
+                                <p:cTn id="60" presetID="10" presetClass="entr" presetSubtype="0" fill="hold" grpId="0" nodeType="withEffect">
                                   <p:stCondLst>
                                     <p:cond delay="0"/>
                                   </p:stCondLst>
                                   <p:childTnLst>
                                     <p:set>
                                       <p:cBhvr>
-                                        <p:cTn id="46" dur="1" fill="hold">
+                                        <p:cTn id="61" dur="1" fill="hold">
                                           <p:stCondLst>
                                             <p:cond delay="0"/>
                                           </p:stCondLst>
@@ -20158,7 +20523,7 @@
                                     </p:set>
                                     <p:animEffect transition="in" filter="fade">
                                       <p:cBhvr>
-                                        <p:cTn id="47" dur="500"/>
+                                        <p:cTn id="62" dur="500"/>
                                         <p:tgtEl>
                                           <p:spTgt spid="3">
                                             <p:txEl>
@@ -20172,14 +20537,257 @@
                                 </p:cTn>
                               </p:par>
                               <p:par>
-                                <p:cTn id="48" presetID="10" presetClass="entr" presetSubtype="0" fill="hold" nodeType="withEffect">
+                                <p:cTn id="63" presetID="19" presetClass="emph" presetSubtype="0" fill="hold" nodeType="withEffect">
+                                  <p:stCondLst>
+                                    <p:cond delay="0"/>
+                                  </p:stCondLst>
+                                  <p:childTnLst>
+                                    <p:animClr clrSpc="rgb" dir="cw">
+                                      <p:cBhvr override="childStyle">
+                                        <p:cTn id="64" dur="500" fill="hold"/>
+                                        <p:tgtEl>
+                                          <p:spTgt spid="3">
+                                            <p:txEl>
+                                              <p:pRg st="3" end="3"/>
+                                            </p:txEl>
+                                          </p:spTgt>
+                                        </p:tgtEl>
+                                        <p:attrNameLst>
+                                          <p:attrName>style.color</p:attrName>
+                                        </p:attrNameLst>
+                                      </p:cBhvr>
+                                      <p:to>
+                                        <a:srgbClr val="5F5F5F"/>
+                                      </p:to>
+                                    </p:animClr>
+                                    <p:animClr clrSpc="rgb" dir="cw">
+                                      <p:cBhvr>
+                                        <p:cTn id="65" dur="500" fill="hold"/>
+                                        <p:tgtEl>
+                                          <p:spTgt spid="3">
+                                            <p:txEl>
+                                              <p:pRg st="3" end="3"/>
+                                            </p:txEl>
+                                          </p:spTgt>
+                                        </p:tgtEl>
+                                        <p:attrNameLst>
+                                          <p:attrName>fillcolor</p:attrName>
+                                        </p:attrNameLst>
+                                      </p:cBhvr>
+                                      <p:to>
+                                        <a:srgbClr val="5F5F5F"/>
+                                      </p:to>
+                                    </p:animClr>
+                                    <p:set>
+                                      <p:cBhvr>
+                                        <p:cTn id="66" dur="500" fill="hold"/>
+                                        <p:tgtEl>
+                                          <p:spTgt spid="3">
+                                            <p:txEl>
+                                              <p:pRg st="3" end="3"/>
+                                            </p:txEl>
+                                          </p:spTgt>
+                                        </p:tgtEl>
+                                        <p:attrNameLst>
+                                          <p:attrName>fill.type</p:attrName>
+                                        </p:attrNameLst>
+                                      </p:cBhvr>
+                                      <p:to>
+                                        <p:strVal val="solid"/>
+                                      </p:to>
+                                    </p:set>
+                                    <p:set>
+                                      <p:cBhvr>
+                                        <p:cTn id="67" dur="500" fill="hold"/>
+                                        <p:tgtEl>
+                                          <p:spTgt spid="3">
+                                            <p:txEl>
+                                              <p:pRg st="3" end="3"/>
+                                            </p:txEl>
+                                          </p:spTgt>
+                                        </p:tgtEl>
+                                        <p:attrNameLst>
+                                          <p:attrName>fill.on</p:attrName>
+                                        </p:attrNameLst>
+                                      </p:cBhvr>
+                                      <p:to>
+                                        <p:strVal val="true"/>
+                                      </p:to>
+                                    </p:set>
+                                  </p:childTnLst>
+                                </p:cTn>
+                              </p:par>
+                              <p:par>
+                                <p:cTn id="68" presetID="19" presetClass="emph" presetSubtype="0" fill="hold" nodeType="withEffect">
+                                  <p:stCondLst>
+                                    <p:cond delay="0"/>
+                                  </p:stCondLst>
+                                  <p:childTnLst>
+                                    <p:animClr clrSpc="rgb" dir="cw">
+                                      <p:cBhvr override="childStyle">
+                                        <p:cTn id="69" dur="500" fill="hold"/>
+                                        <p:tgtEl>
+                                          <p:spTgt spid="3">
+                                            <p:txEl>
+                                              <p:pRg st="4" end="4"/>
+                                            </p:txEl>
+                                          </p:spTgt>
+                                        </p:tgtEl>
+                                        <p:attrNameLst>
+                                          <p:attrName>style.color</p:attrName>
+                                        </p:attrNameLst>
+                                      </p:cBhvr>
+                                      <p:to>
+                                        <a:srgbClr val="5F5F5F"/>
+                                      </p:to>
+                                    </p:animClr>
+                                    <p:animClr clrSpc="rgb" dir="cw">
+                                      <p:cBhvr>
+                                        <p:cTn id="70" dur="500" fill="hold"/>
+                                        <p:tgtEl>
+                                          <p:spTgt spid="3">
+                                            <p:txEl>
+                                              <p:pRg st="4" end="4"/>
+                                            </p:txEl>
+                                          </p:spTgt>
+                                        </p:tgtEl>
+                                        <p:attrNameLst>
+                                          <p:attrName>fillcolor</p:attrName>
+                                        </p:attrNameLst>
+                                      </p:cBhvr>
+                                      <p:to>
+                                        <a:srgbClr val="5F5F5F"/>
+                                      </p:to>
+                                    </p:animClr>
+                                    <p:set>
+                                      <p:cBhvr>
+                                        <p:cTn id="71" dur="500" fill="hold"/>
+                                        <p:tgtEl>
+                                          <p:spTgt spid="3">
+                                            <p:txEl>
+                                              <p:pRg st="4" end="4"/>
+                                            </p:txEl>
+                                          </p:spTgt>
+                                        </p:tgtEl>
+                                        <p:attrNameLst>
+                                          <p:attrName>fill.type</p:attrName>
+                                        </p:attrNameLst>
+                                      </p:cBhvr>
+                                      <p:to>
+                                        <p:strVal val="solid"/>
+                                      </p:to>
+                                    </p:set>
+                                    <p:set>
+                                      <p:cBhvr>
+                                        <p:cTn id="72" dur="500" fill="hold"/>
+                                        <p:tgtEl>
+                                          <p:spTgt spid="3">
+                                            <p:txEl>
+                                              <p:pRg st="4" end="4"/>
+                                            </p:txEl>
+                                          </p:spTgt>
+                                        </p:tgtEl>
+                                        <p:attrNameLst>
+                                          <p:attrName>fill.on</p:attrName>
+                                        </p:attrNameLst>
+                                      </p:cBhvr>
+                                      <p:to>
+                                        <p:strVal val="true"/>
+                                      </p:to>
+                                    </p:set>
+                                  </p:childTnLst>
+                                </p:cTn>
+                              </p:par>
+                              <p:par>
+                                <p:cTn id="73" presetID="19" presetClass="emph" presetSubtype="0" fill="hold" nodeType="withEffect">
+                                  <p:stCondLst>
+                                    <p:cond delay="0"/>
+                                  </p:stCondLst>
+                                  <p:childTnLst>
+                                    <p:animClr clrSpc="rgb" dir="cw">
+                                      <p:cBhvr override="childStyle">
+                                        <p:cTn id="74" dur="500" fill="hold"/>
+                                        <p:tgtEl>
+                                          <p:spTgt spid="3">
+                                            <p:txEl>
+                                              <p:pRg st="5" end="5"/>
+                                            </p:txEl>
+                                          </p:spTgt>
+                                        </p:tgtEl>
+                                        <p:attrNameLst>
+                                          <p:attrName>style.color</p:attrName>
+                                        </p:attrNameLst>
+                                      </p:cBhvr>
+                                      <p:to>
+                                        <a:srgbClr val="5F5F5F"/>
+                                      </p:to>
+                                    </p:animClr>
+                                    <p:animClr clrSpc="rgb" dir="cw">
+                                      <p:cBhvr>
+                                        <p:cTn id="75" dur="500" fill="hold"/>
+                                        <p:tgtEl>
+                                          <p:spTgt spid="3">
+                                            <p:txEl>
+                                              <p:pRg st="5" end="5"/>
+                                            </p:txEl>
+                                          </p:spTgt>
+                                        </p:tgtEl>
+                                        <p:attrNameLst>
+                                          <p:attrName>fillcolor</p:attrName>
+                                        </p:attrNameLst>
+                                      </p:cBhvr>
+                                      <p:to>
+                                        <a:srgbClr val="5F5F5F"/>
+                                      </p:to>
+                                    </p:animClr>
+                                    <p:set>
+                                      <p:cBhvr>
+                                        <p:cTn id="76" dur="500" fill="hold"/>
+                                        <p:tgtEl>
+                                          <p:spTgt spid="3">
+                                            <p:txEl>
+                                              <p:pRg st="5" end="5"/>
+                                            </p:txEl>
+                                          </p:spTgt>
+                                        </p:tgtEl>
+                                        <p:attrNameLst>
+                                          <p:attrName>fill.type</p:attrName>
+                                        </p:attrNameLst>
+                                      </p:cBhvr>
+                                      <p:to>
+                                        <p:strVal val="solid"/>
+                                      </p:to>
+                                    </p:set>
+                                    <p:set>
+                                      <p:cBhvr>
+                                        <p:cTn id="77" dur="500" fill="hold"/>
+                                        <p:tgtEl>
+                                          <p:spTgt spid="3">
+                                            <p:txEl>
+                                              <p:pRg st="5" end="5"/>
+                                            </p:txEl>
+                                          </p:spTgt>
+                                        </p:tgtEl>
+                                        <p:attrNameLst>
+                                          <p:attrName>fill.on</p:attrName>
+                                        </p:attrNameLst>
+                                      </p:cBhvr>
+                                      <p:to>
+                                        <p:strVal val="true"/>
+                                      </p:to>
+                                    </p:set>
+                                  </p:childTnLst>
+                                </p:cTn>
+                              </p:par>
+                              <p:par>
+                                <p:cTn id="78" presetID="10" presetClass="entr" presetSubtype="0" fill="hold" nodeType="withEffect">
                                   <p:stCondLst>
                                     <p:cond delay="0"/>
                                   </p:stCondLst>
                                   <p:childTnLst>
                                     <p:set>
                                       <p:cBhvr>
-                                        <p:cTn id="49" dur="1" fill="hold">
+                                        <p:cTn id="79" dur="1" fill="hold">
                                           <p:stCondLst>
                                             <p:cond delay="0"/>
                                           </p:stCondLst>
@@ -20197,7 +20805,7 @@
                                     </p:set>
                                     <p:animEffect transition="in" filter="fade">
                                       <p:cBhvr>
-                                        <p:cTn id="50" dur="500"/>
+                                        <p:cTn id="80" dur="500"/>
                                         <p:tgtEl>
                                           <p:spTgt spid="202"/>
                                         </p:tgtEl>
@@ -20207,14 +20815,14 @@
                                 </p:cTn>
                               </p:par>
                               <p:par>
-                                <p:cTn id="51" presetID="10" presetClass="entr" presetSubtype="0" fill="hold" nodeType="withEffect">
+                                <p:cTn id="81" presetID="10" presetClass="entr" presetSubtype="0" fill="hold" nodeType="withEffect">
                                   <p:stCondLst>
                                     <p:cond delay="0"/>
                                   </p:stCondLst>
                                   <p:childTnLst>
                                     <p:set>
                                       <p:cBhvr>
-                                        <p:cTn id="52" dur="1" fill="hold">
+                                        <p:cTn id="82" dur="1" fill="hold">
                                           <p:stCondLst>
                                             <p:cond delay="0"/>
                                           </p:stCondLst>
@@ -20232,7 +20840,7 @@
                                     </p:set>
                                     <p:animEffect transition="in" filter="fade">
                                       <p:cBhvr>
-                                        <p:cTn id="53" dur="500"/>
+                                        <p:cTn id="83" dur="500"/>
                                         <p:tgtEl>
                                           <p:spTgt spid="203"/>
                                         </p:tgtEl>
@@ -20248,26 +20856,26 @@
                     </p:cTn>
                   </p:par>
                   <p:par>
-                    <p:cTn id="54" fill="hold">
+                    <p:cTn id="84" fill="hold">
                       <p:stCondLst>
                         <p:cond delay="indefinite"/>
                       </p:stCondLst>
                       <p:childTnLst>
                         <p:par>
-                          <p:cTn id="55" fill="hold">
+                          <p:cTn id="85" fill="hold">
                             <p:stCondLst>
                               <p:cond delay="0"/>
                             </p:stCondLst>
                             <p:childTnLst>
                               <p:par>
-                                <p:cTn id="56" presetID="10" presetClass="entr" presetSubtype="0" fill="hold" nodeType="clickEffect">
+                                <p:cTn id="86" presetID="10" presetClass="entr" presetSubtype="0" fill="hold" nodeType="clickEffect">
                                   <p:stCondLst>
                                     <p:cond delay="0"/>
                                   </p:stCondLst>
                                   <p:childTnLst>
                                     <p:set>
                                       <p:cBhvr>
-                                        <p:cTn id="57" dur="1" fill="hold">
+                                        <p:cTn id="87" dur="1" fill="hold">
                                           <p:stCondLst>
                                             <p:cond delay="0"/>
                                           </p:stCondLst>
@@ -20285,7 +20893,7 @@
                                     </p:set>
                                     <p:animEffect transition="in" filter="fade">
                                       <p:cBhvr>
-                                        <p:cTn id="58" dur="500"/>
+                                        <p:cTn id="88" dur="500"/>
                                         <p:tgtEl>
                                           <p:spTgt spid="200"/>
                                         </p:tgtEl>
@@ -20295,14 +20903,14 @@
                                 </p:cTn>
                               </p:par>
                               <p:par>
-                                <p:cTn id="59" presetID="10" presetClass="entr" presetSubtype="0" fill="hold" nodeType="withEffect">
+                                <p:cTn id="89" presetID="10" presetClass="entr" presetSubtype="0" fill="hold" nodeType="withEffect">
                                   <p:stCondLst>
                                     <p:cond delay="0"/>
                                   </p:stCondLst>
                                   <p:childTnLst>
                                     <p:set>
                                       <p:cBhvr>
-                                        <p:cTn id="60" dur="1" fill="hold">
+                                        <p:cTn id="90" dur="1" fill="hold">
                                           <p:stCondLst>
                                             <p:cond delay="0"/>
                                           </p:stCondLst>
@@ -20320,7 +20928,7 @@
                                     </p:set>
                                     <p:animEffect transition="in" filter="fade">
                                       <p:cBhvr>
-                                        <p:cTn id="61" dur="500"/>
+                                        <p:cTn id="91" dur="500"/>
                                         <p:tgtEl>
                                           <p:spTgt spid="204"/>
                                         </p:tgtEl>
@@ -20330,14 +20938,14 @@
                                 </p:cTn>
                               </p:par>
                               <p:par>
-                                <p:cTn id="62" presetID="10" presetClass="entr" presetSubtype="0" fill="hold" nodeType="withEffect">
+                                <p:cTn id="92" presetID="10" presetClass="entr" presetSubtype="0" fill="hold" nodeType="withEffect">
                                   <p:stCondLst>
                                     <p:cond delay="0"/>
                                   </p:stCondLst>
                                   <p:childTnLst>
                                     <p:set>
                                       <p:cBhvr>
-                                        <p:cTn id="63" dur="1" fill="hold">
+                                        <p:cTn id="93" dur="1" fill="hold">
                                           <p:stCondLst>
                                             <p:cond delay="0"/>
                                           </p:stCondLst>
@@ -20355,12 +20963,255 @@
                                     </p:set>
                                     <p:animEffect transition="in" filter="fade">
                                       <p:cBhvr>
-                                        <p:cTn id="64" dur="500"/>
+                                        <p:cTn id="94" dur="500"/>
                                         <p:tgtEl>
                                           <p:spTgt spid="205"/>
                                         </p:tgtEl>
                                       </p:cBhvr>
                                     </p:animEffect>
+                                  </p:childTnLst>
+                                </p:cTn>
+                              </p:par>
+                              <p:par>
+                                <p:cTn id="95" presetID="19" presetClass="emph" presetSubtype="0" fill="hold" nodeType="withEffect">
+                                  <p:stCondLst>
+                                    <p:cond delay="0"/>
+                                  </p:stCondLst>
+                                  <p:childTnLst>
+                                    <p:animClr clrSpc="rgb" dir="cw">
+                                      <p:cBhvr override="childStyle">
+                                        <p:cTn id="96" dur="500" fill="hold"/>
+                                        <p:tgtEl>
+                                          <p:spTgt spid="3">
+                                            <p:txEl>
+                                              <p:pRg st="6" end="6"/>
+                                            </p:txEl>
+                                          </p:spTgt>
+                                        </p:tgtEl>
+                                        <p:attrNameLst>
+                                          <p:attrName>style.color</p:attrName>
+                                        </p:attrNameLst>
+                                      </p:cBhvr>
+                                      <p:to>
+                                        <a:srgbClr val="5F5F5F"/>
+                                      </p:to>
+                                    </p:animClr>
+                                    <p:animClr clrSpc="rgb" dir="cw">
+                                      <p:cBhvr>
+                                        <p:cTn id="97" dur="500" fill="hold"/>
+                                        <p:tgtEl>
+                                          <p:spTgt spid="3">
+                                            <p:txEl>
+                                              <p:pRg st="6" end="6"/>
+                                            </p:txEl>
+                                          </p:spTgt>
+                                        </p:tgtEl>
+                                        <p:attrNameLst>
+                                          <p:attrName>fillcolor</p:attrName>
+                                        </p:attrNameLst>
+                                      </p:cBhvr>
+                                      <p:to>
+                                        <a:srgbClr val="5F5F5F"/>
+                                      </p:to>
+                                    </p:animClr>
+                                    <p:set>
+                                      <p:cBhvr>
+                                        <p:cTn id="98" dur="500" fill="hold"/>
+                                        <p:tgtEl>
+                                          <p:spTgt spid="3">
+                                            <p:txEl>
+                                              <p:pRg st="6" end="6"/>
+                                            </p:txEl>
+                                          </p:spTgt>
+                                        </p:tgtEl>
+                                        <p:attrNameLst>
+                                          <p:attrName>fill.type</p:attrName>
+                                        </p:attrNameLst>
+                                      </p:cBhvr>
+                                      <p:to>
+                                        <p:strVal val="solid"/>
+                                      </p:to>
+                                    </p:set>
+                                    <p:set>
+                                      <p:cBhvr>
+                                        <p:cTn id="99" dur="500" fill="hold"/>
+                                        <p:tgtEl>
+                                          <p:spTgt spid="3">
+                                            <p:txEl>
+                                              <p:pRg st="6" end="6"/>
+                                            </p:txEl>
+                                          </p:spTgt>
+                                        </p:tgtEl>
+                                        <p:attrNameLst>
+                                          <p:attrName>fill.on</p:attrName>
+                                        </p:attrNameLst>
+                                      </p:cBhvr>
+                                      <p:to>
+                                        <p:strVal val="true"/>
+                                      </p:to>
+                                    </p:set>
+                                  </p:childTnLst>
+                                </p:cTn>
+                              </p:par>
+                              <p:par>
+                                <p:cTn id="100" presetID="19" presetClass="emph" presetSubtype="0" fill="hold" nodeType="withEffect">
+                                  <p:stCondLst>
+                                    <p:cond delay="0"/>
+                                  </p:stCondLst>
+                                  <p:childTnLst>
+                                    <p:animClr clrSpc="rgb" dir="cw">
+                                      <p:cBhvr override="childStyle">
+                                        <p:cTn id="101" dur="500" fill="hold"/>
+                                        <p:tgtEl>
+                                          <p:spTgt spid="3">
+                                            <p:txEl>
+                                              <p:pRg st="7" end="7"/>
+                                            </p:txEl>
+                                          </p:spTgt>
+                                        </p:tgtEl>
+                                        <p:attrNameLst>
+                                          <p:attrName>style.color</p:attrName>
+                                        </p:attrNameLst>
+                                      </p:cBhvr>
+                                      <p:to>
+                                        <a:srgbClr val="5F5F5F"/>
+                                      </p:to>
+                                    </p:animClr>
+                                    <p:animClr clrSpc="rgb" dir="cw">
+                                      <p:cBhvr>
+                                        <p:cTn id="102" dur="500" fill="hold"/>
+                                        <p:tgtEl>
+                                          <p:spTgt spid="3">
+                                            <p:txEl>
+                                              <p:pRg st="7" end="7"/>
+                                            </p:txEl>
+                                          </p:spTgt>
+                                        </p:tgtEl>
+                                        <p:attrNameLst>
+                                          <p:attrName>fillcolor</p:attrName>
+                                        </p:attrNameLst>
+                                      </p:cBhvr>
+                                      <p:to>
+                                        <a:srgbClr val="5F5F5F"/>
+                                      </p:to>
+                                    </p:animClr>
+                                    <p:set>
+                                      <p:cBhvr>
+                                        <p:cTn id="103" dur="500" fill="hold"/>
+                                        <p:tgtEl>
+                                          <p:spTgt spid="3">
+                                            <p:txEl>
+                                              <p:pRg st="7" end="7"/>
+                                            </p:txEl>
+                                          </p:spTgt>
+                                        </p:tgtEl>
+                                        <p:attrNameLst>
+                                          <p:attrName>fill.type</p:attrName>
+                                        </p:attrNameLst>
+                                      </p:cBhvr>
+                                      <p:to>
+                                        <p:strVal val="solid"/>
+                                      </p:to>
+                                    </p:set>
+                                    <p:set>
+                                      <p:cBhvr>
+                                        <p:cTn id="104" dur="500" fill="hold"/>
+                                        <p:tgtEl>
+                                          <p:spTgt spid="3">
+                                            <p:txEl>
+                                              <p:pRg st="7" end="7"/>
+                                            </p:txEl>
+                                          </p:spTgt>
+                                        </p:tgtEl>
+                                        <p:attrNameLst>
+                                          <p:attrName>fill.on</p:attrName>
+                                        </p:attrNameLst>
+                                      </p:cBhvr>
+                                      <p:to>
+                                        <p:strVal val="true"/>
+                                      </p:to>
+                                    </p:set>
+                                  </p:childTnLst>
+                                </p:cTn>
+                              </p:par>
+                              <p:par>
+                                <p:cTn id="105" presetID="19" presetClass="emph" presetSubtype="0" fill="hold" nodeType="withEffect">
+                                  <p:stCondLst>
+                                    <p:cond delay="0"/>
+                                  </p:stCondLst>
+                                  <p:childTnLst>
+                                    <p:animClr clrSpc="rgb" dir="cw">
+                                      <p:cBhvr override="childStyle">
+                                        <p:cTn id="106" dur="500" fill="hold"/>
+                                        <p:tgtEl>
+                                          <p:spTgt spid="3">
+                                            <p:txEl>
+                                              <p:pRg st="8" end="8"/>
+                                            </p:txEl>
+                                          </p:spTgt>
+                                        </p:tgtEl>
+                                        <p:attrNameLst>
+                                          <p:attrName>style.color</p:attrName>
+                                        </p:attrNameLst>
+                                      </p:cBhvr>
+                                      <p:to>
+                                        <a:srgbClr val="5F5F5F"/>
+                                      </p:to>
+                                    </p:animClr>
+                                    <p:animClr clrSpc="rgb" dir="cw">
+                                      <p:cBhvr>
+                                        <p:cTn id="107" dur="500" fill="hold"/>
+                                        <p:tgtEl>
+                                          <p:spTgt spid="3">
+                                            <p:txEl>
+                                              <p:pRg st="8" end="8"/>
+                                            </p:txEl>
+                                          </p:spTgt>
+                                        </p:tgtEl>
+                                        <p:attrNameLst>
+                                          <p:attrName>fillcolor</p:attrName>
+                                        </p:attrNameLst>
+                                      </p:cBhvr>
+                                      <p:to>
+                                        <a:srgbClr val="5F5F5F"/>
+                                      </p:to>
+                                    </p:animClr>
+                                    <p:set>
+                                      <p:cBhvr>
+                                        <p:cTn id="108" dur="500" fill="hold"/>
+                                        <p:tgtEl>
+                                          <p:spTgt spid="3">
+                                            <p:txEl>
+                                              <p:pRg st="8" end="8"/>
+                                            </p:txEl>
+                                          </p:spTgt>
+                                        </p:tgtEl>
+                                        <p:attrNameLst>
+                                          <p:attrName>fill.type</p:attrName>
+                                        </p:attrNameLst>
+                                      </p:cBhvr>
+                                      <p:to>
+                                        <p:strVal val="solid"/>
+                                      </p:to>
+                                    </p:set>
+                                    <p:set>
+                                      <p:cBhvr>
+                                        <p:cTn id="109" dur="500" fill="hold"/>
+                                        <p:tgtEl>
+                                          <p:spTgt spid="3">
+                                            <p:txEl>
+                                              <p:pRg st="8" end="8"/>
+                                            </p:txEl>
+                                          </p:spTgt>
+                                        </p:tgtEl>
+                                        <p:attrNameLst>
+                                          <p:attrName>fill.on</p:attrName>
+                                        </p:attrNameLst>
+                                      </p:cBhvr>
+                                      <p:to>
+                                        <p:strVal val="true"/>
+                                      </p:to>
+                                    </p:set>
                                   </p:childTnLst>
                                 </p:cTn>
                               </p:par>
@@ -22317,12 +23168,15 @@
 </file>
 
 <file path=customXml/item1.xml><?xml version="1.0" encoding="utf-8"?>
-<?mso-contentType ?>
-<FormTemplates xmlns="http://schemas.microsoft.com/sharepoint/v3/contenttype/forms">
-  <Display>DocumentLibraryForm</Display>
-  <Edit>DocumentLibraryForm</Edit>
-  <New>DocumentLibraryForm</New>
-</FormTemplates>
+<p:properties xmlns:p="http://schemas.microsoft.com/office/2006/metadata/properties" xmlns:xsi="http://www.w3.org/2001/XMLSchema-instance" xmlns:pc="http://schemas.microsoft.com/office/infopath/2007/PartnerControls">
+  <documentManagement>
+    <MediaLengthInSeconds xmlns="5b653a37-a943-418c-a7e6-aa09ee196dc6" xsi:nil="true"/>
+    <TaxCatchAll xmlns="bd297347-8c74-4a03-a42f-06ff7841fbbf" xsi:nil="true"/>
+    <lcf76f155ced4ddcb4097134ff3c332f xmlns="5b653a37-a943-418c-a7e6-aa09ee196dc6">
+      <Terms xmlns="http://schemas.microsoft.com/office/infopath/2007/PartnerControls"/>
+    </lcf76f155ced4ddcb4097134ff3c332f>
+  </documentManagement>
+</p:properties>
 </file>
 
 <file path=customXml/item2.xml><?xml version="1.0" encoding="utf-8"?>
@@ -22543,21 +23397,23 @@
 </file>
 
 <file path=customXml/item3.xml><?xml version="1.0" encoding="utf-8"?>
-<p:properties xmlns:p="http://schemas.microsoft.com/office/2006/metadata/properties" xmlns:xsi="http://www.w3.org/2001/XMLSchema-instance" xmlns:pc="http://schemas.microsoft.com/office/infopath/2007/PartnerControls">
-  <documentManagement>
-    <MediaLengthInSeconds xmlns="5b653a37-a943-418c-a7e6-aa09ee196dc6" xsi:nil="true"/>
-    <TaxCatchAll xmlns="bd297347-8c74-4a03-a42f-06ff7841fbbf" xsi:nil="true"/>
-    <lcf76f155ced4ddcb4097134ff3c332f xmlns="5b653a37-a943-418c-a7e6-aa09ee196dc6">
-      <Terms xmlns="http://schemas.microsoft.com/office/infopath/2007/PartnerControls"/>
-    </lcf76f155ced4ddcb4097134ff3c332f>
-  </documentManagement>
-</p:properties>
+<?mso-contentType ?>
+<FormTemplates xmlns="http://schemas.microsoft.com/sharepoint/v3/contenttype/forms">
+  <Display>DocumentLibraryForm</Display>
+  <Edit>DocumentLibraryForm</Edit>
+  <New>DocumentLibraryForm</New>
+</FormTemplates>
 </file>
 
 <file path=customXml/itemProps1.xml><?xml version="1.0" encoding="utf-8"?>
-<ds:datastoreItem xmlns:ds="http://schemas.openxmlformats.org/officeDocument/2006/customXml" ds:itemID="{F79F2385-5F5D-40A9-91E4-EC41CD22028D}">
+<ds:datastoreItem xmlns:ds="http://schemas.openxmlformats.org/officeDocument/2006/customXml" ds:itemID="{D6E60845-C3D9-4D03-A1AD-12FE491785E0}">
   <ds:schemaRefs>
-    <ds:schemaRef ds:uri="http://schemas.microsoft.com/sharepoint/v3/contenttype/forms"/>
+    <ds:schemaRef ds:uri="http://schemas.microsoft.com/office/2006/metadata/properties"/>
+    <ds:schemaRef ds:uri="http://www.w3.org/2000/xmlns/"/>
+    <ds:schemaRef ds:uri="5b653a37-a943-418c-a7e6-aa09ee196dc6"/>
+    <ds:schemaRef ds:uri="http://www.w3.org/2001/XMLSchema-instance"/>
+    <ds:schemaRef ds:uri="bd297347-8c74-4a03-a42f-06ff7841fbbf"/>
+    <ds:schemaRef ds:uri="http://schemas.microsoft.com/office/infopath/2007/PartnerControls"/>
   </ds:schemaRefs>
 </ds:datastoreItem>
 </file>
@@ -22583,14 +23439,9 @@
 </file>
 
 <file path=customXml/itemProps3.xml><?xml version="1.0" encoding="utf-8"?>
-<ds:datastoreItem xmlns:ds="http://schemas.openxmlformats.org/officeDocument/2006/customXml" ds:itemID="{D6E60845-C3D9-4D03-A1AD-12FE491785E0}">
+<ds:datastoreItem xmlns:ds="http://schemas.openxmlformats.org/officeDocument/2006/customXml" ds:itemID="{F79F2385-5F5D-40A9-91E4-EC41CD22028D}">
   <ds:schemaRefs>
-    <ds:schemaRef ds:uri="http://schemas.microsoft.com/office/2006/metadata/properties"/>
-    <ds:schemaRef ds:uri="http://www.w3.org/2000/xmlns/"/>
-    <ds:schemaRef ds:uri="5b653a37-a943-418c-a7e6-aa09ee196dc6"/>
-    <ds:schemaRef ds:uri="http://www.w3.org/2001/XMLSchema-instance"/>
-    <ds:schemaRef ds:uri="bd297347-8c74-4a03-a42f-06ff7841fbbf"/>
-    <ds:schemaRef ds:uri="http://schemas.microsoft.com/office/infopath/2007/PartnerControls"/>
+    <ds:schemaRef ds:uri="http://schemas.microsoft.com/sharepoint/v3/contenttype/forms"/>
   </ds:schemaRefs>
 </ds:datastoreItem>
 </file>
</xml_diff>

<commit_message>
image credit in pptx, readme with links
</commit_message>
<xml_diff>
--- a/PSDayUK2023_DurableFunctions_EmanuelPalm.pptx
+++ b/PSDayUK2023_DurableFunctions_EmanuelPalm.pptx
@@ -5019,6 +5019,38 @@
     </pc:docChg>
   </pc:docChgLst>
   <pc:docChgLst>
+    <pc:chgData name="Geoffroy Dubreuil" userId="S::geoffroydubreuil@synedgy.com::36186b9b-dc71-47e0-bff2-bd95e619117d" providerId="AD" clId="Web-{70831B7B-7240-2930-905C-5A029E9F81C9}"/>
+    <pc:docChg chg="modSld">
+      <pc:chgData name="Geoffroy Dubreuil" userId="S::geoffroydubreuil@synedgy.com::36186b9b-dc71-47e0-bff2-bd95e619117d" providerId="AD" clId="Web-{70831B7B-7240-2930-905C-5A029E9F81C9}" dt="2023-02-07T13:04:13.485" v="6" actId="1076"/>
+      <pc:docMkLst>
+        <pc:docMk/>
+      </pc:docMkLst>
+      <pc:sldChg chg="addSp modSp">
+        <pc:chgData name="Geoffroy Dubreuil" userId="S::geoffroydubreuil@synedgy.com::36186b9b-dc71-47e0-bff2-bd95e619117d" providerId="AD" clId="Web-{70831B7B-7240-2930-905C-5A029E9F81C9}" dt="2023-02-07T13:04:13.485" v="6" actId="1076"/>
+        <pc:sldMkLst>
+          <pc:docMk/>
+          <pc:sldMk cId="3984835757" sldId="261"/>
+        </pc:sldMkLst>
+        <pc:picChg chg="mod">
+          <ac:chgData name="Geoffroy Dubreuil" userId="S::geoffroydubreuil@synedgy.com::36186b9b-dc71-47e0-bff2-bd95e619117d" providerId="AD" clId="Web-{70831B7B-7240-2930-905C-5A029E9F81C9}" dt="2023-02-07T13:04:13.485" v="6" actId="1076"/>
+          <ac:picMkLst>
+            <pc:docMk/>
+            <pc:sldMk cId="3984835757" sldId="261"/>
+            <ac:picMk id="3" creationId="{FE381F8E-136A-9F6A-5074-1DBF37A9F9D8}"/>
+          </ac:picMkLst>
+        </pc:picChg>
+        <pc:picChg chg="add mod">
+          <ac:chgData name="Geoffroy Dubreuil" userId="S::geoffroydubreuil@synedgy.com::36186b9b-dc71-47e0-bff2-bd95e619117d" providerId="AD" clId="Web-{70831B7B-7240-2930-905C-5A029E9F81C9}" dt="2023-02-07T13:04:13.438" v="5" actId="1076"/>
+          <ac:picMkLst>
+            <pc:docMk/>
+            <pc:sldMk cId="3984835757" sldId="261"/>
+            <ac:picMk id="5" creationId="{1491D86D-0DB3-80B4-D474-91F8617C6E00}"/>
+          </ac:picMkLst>
+        </pc:picChg>
+      </pc:sldChg>
+    </pc:docChg>
+  </pc:docChgLst>
+  <pc:docChgLst>
     <pc:chgData name="Geoffroy Dubreuil" userId="36186b9b-dc71-47e0-bff2-bd95e619117d" providerId="ADAL" clId="{FDCFBEA8-E6B3-4B70-BD51-E497D37AE5D3}"/>
     <pc:docChg chg="undo custSel delSld modSld modMainMaster">
       <pc:chgData name="Geoffroy Dubreuil" userId="36186b9b-dc71-47e0-bff2-bd95e619117d" providerId="ADAL" clId="{FDCFBEA8-E6B3-4B70-BD51-E497D37AE5D3}" dt="2022-05-04T14:37:38.069" v="394" actId="478"/>
@@ -5409,38 +5441,6 @@
           </ac:picMkLst>
         </pc:picChg>
       </pc:sldMasterChg>
-    </pc:docChg>
-  </pc:docChgLst>
-  <pc:docChgLst>
-    <pc:chgData name="Geoffroy Dubreuil" userId="S::geoffroydubreuil@synedgy.com::36186b9b-dc71-47e0-bff2-bd95e619117d" providerId="AD" clId="Web-{70831B7B-7240-2930-905C-5A029E9F81C9}"/>
-    <pc:docChg chg="modSld">
-      <pc:chgData name="Geoffroy Dubreuil" userId="S::geoffroydubreuil@synedgy.com::36186b9b-dc71-47e0-bff2-bd95e619117d" providerId="AD" clId="Web-{70831B7B-7240-2930-905C-5A029E9F81C9}" dt="2023-02-07T13:04:13.485" v="6" actId="1076"/>
-      <pc:docMkLst>
-        <pc:docMk/>
-      </pc:docMkLst>
-      <pc:sldChg chg="addSp modSp">
-        <pc:chgData name="Geoffroy Dubreuil" userId="S::geoffroydubreuil@synedgy.com::36186b9b-dc71-47e0-bff2-bd95e619117d" providerId="AD" clId="Web-{70831B7B-7240-2930-905C-5A029E9F81C9}" dt="2023-02-07T13:04:13.485" v="6" actId="1076"/>
-        <pc:sldMkLst>
-          <pc:docMk/>
-          <pc:sldMk cId="3984835757" sldId="261"/>
-        </pc:sldMkLst>
-        <pc:picChg chg="mod">
-          <ac:chgData name="Geoffroy Dubreuil" userId="S::geoffroydubreuil@synedgy.com::36186b9b-dc71-47e0-bff2-bd95e619117d" providerId="AD" clId="Web-{70831B7B-7240-2930-905C-5A029E9F81C9}" dt="2023-02-07T13:04:13.485" v="6" actId="1076"/>
-          <ac:picMkLst>
-            <pc:docMk/>
-            <pc:sldMk cId="3984835757" sldId="261"/>
-            <ac:picMk id="3" creationId="{FE381F8E-136A-9F6A-5074-1DBF37A9F9D8}"/>
-          </ac:picMkLst>
-        </pc:picChg>
-        <pc:picChg chg="add mod">
-          <ac:chgData name="Geoffroy Dubreuil" userId="S::geoffroydubreuil@synedgy.com::36186b9b-dc71-47e0-bff2-bd95e619117d" providerId="AD" clId="Web-{70831B7B-7240-2930-905C-5A029E9F81C9}" dt="2023-02-07T13:04:13.438" v="5" actId="1076"/>
-          <ac:picMkLst>
-            <pc:docMk/>
-            <pc:sldMk cId="3984835757" sldId="261"/>
-            <ac:picMk id="5" creationId="{1491D86D-0DB3-80B4-D474-91F8617C6E00}"/>
-          </ac:picMkLst>
-        </pc:picChg>
-      </pc:sldChg>
     </pc:docChg>
   </pc:docChgLst>
   <pc:docChgLst>
@@ -5956,7 +5956,7 @@
           <a:p>
             <a:fld id="{69440670-43D7-400A-ABC5-B69E064DBB37}" type="datetimeFigureOut">
               <a:rPr lang="en-GB" smtClean="0"/>
-              <a:t>28/02/2023</a:t>
+              <a:t>01/03/2023</a:t>
             </a:fld>
             <a:endParaRPr lang="en-GB"/>
           </a:p>
@@ -6609,7 +6609,7 @@
           <a:p>
             <a:fld id="{611B03A4-75C9-4E3D-9183-2102CA9AEC33}" type="datetimeFigureOut">
               <a:rPr lang="en-GB" smtClean="0"/>
-              <a:t>28/02/2023</a:t>
+              <a:t>01/03/2023</a:t>
             </a:fld>
             <a:endParaRPr lang="en-GB"/>
           </a:p>
@@ -11597,6 +11597,42 @@
           </a:prstGeom>
         </p:spPr>
       </p:pic>
+      <p:pic>
+        <p:nvPicPr>
+          <p:cNvPr id="4" name="Picture 3" descr="Icon&#10;&#10;Description automatically generated">
+            <a:extLst>
+              <a:ext uri="{FF2B5EF4-FFF2-40B4-BE49-F238E27FC236}">
+                <a16:creationId xmlns:a16="http://schemas.microsoft.com/office/drawing/2014/main" id="{158ABF07-150E-D203-A025-EE10A1FE2A66}"/>
+              </a:ext>
+            </a:extLst>
+          </p:cNvPr>
+          <p:cNvPicPr>
+            <a:picLocks noChangeAspect="1"/>
+          </p:cNvPicPr>
+          <p:nvPr userDrawn="1"/>
+        </p:nvPicPr>
+        <p:blipFill>
+          <a:blip r:embed="rId8">
+            <a:extLst>
+              <a:ext uri="{28A0092B-C50C-407E-A947-70E740481C1C}">
+                <a14:useLocalDpi xmlns:a14="http://schemas.microsoft.com/office/drawing/2010/main" val="0"/>
+              </a:ext>
+            </a:extLst>
+          </a:blip>
+          <a:stretch>
+            <a:fillRect/>
+          </a:stretch>
+        </p:blipFill>
+        <p:spPr>
+          <a:xfrm>
+            <a:off x="6173592" y="6355971"/>
+            <a:ext cx="360065" cy="352237"/>
+          </a:xfrm>
+          <a:prstGeom prst="rect">
+            <a:avLst/>
+          </a:prstGeom>
+        </p:spPr>
+      </p:pic>
     </p:spTree>
     <p:extLst>
       <p:ext uri="{BB962C8B-B14F-4D97-AF65-F5344CB8AC3E}">
@@ -12296,6 +12332,42 @@
           </a:p>
         </p:txBody>
       </p:sp>
+      <p:pic>
+        <p:nvPicPr>
+          <p:cNvPr id="5" name="Picture 4" descr="Icon&#10;&#10;Description automatically generated">
+            <a:extLst>
+              <a:ext uri="{FF2B5EF4-FFF2-40B4-BE49-F238E27FC236}">
+                <a16:creationId xmlns:a16="http://schemas.microsoft.com/office/drawing/2014/main" id="{6B580833-F693-CA90-87AB-79AC7FC43BCB}"/>
+              </a:ext>
+            </a:extLst>
+          </p:cNvPr>
+          <p:cNvPicPr>
+            <a:picLocks noChangeAspect="1"/>
+          </p:cNvPicPr>
+          <p:nvPr userDrawn="1"/>
+        </p:nvPicPr>
+        <p:blipFill>
+          <a:blip r:embed="rId17">
+            <a:extLst>
+              <a:ext uri="{28A0092B-C50C-407E-A947-70E740481C1C}">
+                <a14:useLocalDpi xmlns:a14="http://schemas.microsoft.com/office/drawing/2010/main" val="0"/>
+              </a:ext>
+            </a:extLst>
+          </a:blip>
+          <a:stretch>
+            <a:fillRect/>
+          </a:stretch>
+        </p:blipFill>
+        <p:spPr>
+          <a:xfrm>
+            <a:off x="6173592" y="6355971"/>
+            <a:ext cx="360065" cy="352237"/>
+          </a:xfrm>
+          <a:prstGeom prst="rect">
+            <a:avLst/>
+          </a:prstGeom>
+        </p:spPr>
+      </p:pic>
     </p:spTree>
     <p:extLst>
       <p:ext uri="{BB962C8B-B14F-4D97-AF65-F5344CB8AC3E}">
@@ -13379,6 +13451,147 @@
           </a:effectLst>
         </p:spPr>
       </p:pic>
+      <p:sp>
+        <p:nvSpPr>
+          <p:cNvPr id="9" name="Espace réservé du numéro de diapositive 5">
+            <a:extLst>
+              <a:ext uri="{FF2B5EF4-FFF2-40B4-BE49-F238E27FC236}">
+                <a16:creationId xmlns:a16="http://schemas.microsoft.com/office/drawing/2014/main" id="{0B4DC1EF-4F47-CC0D-3D31-0FE2BBB3FF4D}"/>
+              </a:ext>
+            </a:extLst>
+          </p:cNvPr>
+          <p:cNvSpPr txBox="1">
+            <a:spLocks/>
+          </p:cNvSpPr>
+          <p:nvPr/>
+        </p:nvSpPr>
+        <p:spPr>
+          <a:xfrm>
+            <a:off x="3188970" y="6361363"/>
+            <a:ext cx="2954965" cy="365125"/>
+          </a:xfrm>
+          <a:prstGeom prst="rect">
+            <a:avLst/>
+          </a:prstGeom>
+        </p:spPr>
+        <p:txBody>
+          <a:bodyPr/>
+          <a:lstStyle>
+            <a:defPPr>
+              <a:defRPr lang="en-US"/>
+            </a:defPPr>
+            <a:lvl1pPr marL="0" algn="l" defTabSz="914400" rtl="0" eaLnBrk="1" latinLnBrk="0" hangingPunct="1">
+              <a:defRPr sz="1800" kern="1200">
+                <a:solidFill>
+                  <a:schemeClr val="tx1"/>
+                </a:solidFill>
+                <a:latin typeface="+mn-lt"/>
+                <a:ea typeface="+mn-ea"/>
+                <a:cs typeface="+mn-cs"/>
+              </a:defRPr>
+            </a:lvl1pPr>
+            <a:lvl2pPr marL="457200" algn="l" defTabSz="914400" rtl="0" eaLnBrk="1" latinLnBrk="0" hangingPunct="1">
+              <a:defRPr sz="1800" kern="1200">
+                <a:solidFill>
+                  <a:schemeClr val="tx1"/>
+                </a:solidFill>
+                <a:latin typeface="+mn-lt"/>
+                <a:ea typeface="+mn-ea"/>
+                <a:cs typeface="+mn-cs"/>
+              </a:defRPr>
+            </a:lvl2pPr>
+            <a:lvl3pPr marL="914400" algn="l" defTabSz="914400" rtl="0" eaLnBrk="1" latinLnBrk="0" hangingPunct="1">
+              <a:defRPr sz="1800" kern="1200">
+                <a:solidFill>
+                  <a:schemeClr val="tx1"/>
+                </a:solidFill>
+                <a:latin typeface="+mn-lt"/>
+                <a:ea typeface="+mn-ea"/>
+                <a:cs typeface="+mn-cs"/>
+              </a:defRPr>
+            </a:lvl3pPr>
+            <a:lvl4pPr marL="1371600" algn="l" defTabSz="914400" rtl="0" eaLnBrk="1" latinLnBrk="0" hangingPunct="1">
+              <a:defRPr sz="1800" kern="1200">
+                <a:solidFill>
+                  <a:schemeClr val="tx1"/>
+                </a:solidFill>
+                <a:latin typeface="+mn-lt"/>
+                <a:ea typeface="+mn-ea"/>
+                <a:cs typeface="+mn-cs"/>
+              </a:defRPr>
+            </a:lvl4pPr>
+            <a:lvl5pPr marL="1828800" algn="l" defTabSz="914400" rtl="0" eaLnBrk="1" latinLnBrk="0" hangingPunct="1">
+              <a:defRPr sz="1800" kern="1200">
+                <a:solidFill>
+                  <a:schemeClr val="tx1"/>
+                </a:solidFill>
+                <a:latin typeface="+mn-lt"/>
+                <a:ea typeface="+mn-ea"/>
+                <a:cs typeface="+mn-cs"/>
+              </a:defRPr>
+            </a:lvl5pPr>
+            <a:lvl6pPr marL="2286000" algn="l" defTabSz="914400" rtl="0" eaLnBrk="1" latinLnBrk="0" hangingPunct="1">
+              <a:defRPr sz="1800" kern="1200">
+                <a:solidFill>
+                  <a:schemeClr val="tx1"/>
+                </a:solidFill>
+                <a:latin typeface="+mn-lt"/>
+                <a:ea typeface="+mn-ea"/>
+                <a:cs typeface="+mn-cs"/>
+              </a:defRPr>
+            </a:lvl6pPr>
+            <a:lvl7pPr marL="2743200" algn="l" defTabSz="914400" rtl="0" eaLnBrk="1" latinLnBrk="0" hangingPunct="1">
+              <a:defRPr sz="1800" kern="1200">
+                <a:solidFill>
+                  <a:schemeClr val="tx1"/>
+                </a:solidFill>
+                <a:latin typeface="+mn-lt"/>
+                <a:ea typeface="+mn-ea"/>
+                <a:cs typeface="+mn-cs"/>
+              </a:defRPr>
+            </a:lvl7pPr>
+            <a:lvl8pPr marL="3200400" algn="l" defTabSz="914400" rtl="0" eaLnBrk="1" latinLnBrk="0" hangingPunct="1">
+              <a:defRPr sz="1800" kern="1200">
+                <a:solidFill>
+                  <a:schemeClr val="tx1"/>
+                </a:solidFill>
+                <a:latin typeface="+mn-lt"/>
+                <a:ea typeface="+mn-ea"/>
+                <a:cs typeface="+mn-cs"/>
+              </a:defRPr>
+            </a:lvl8pPr>
+            <a:lvl9pPr marL="3657600" algn="l" defTabSz="914400" rtl="0" eaLnBrk="1" latinLnBrk="0" hangingPunct="1">
+              <a:defRPr sz="1800" kern="1200">
+                <a:solidFill>
+                  <a:schemeClr val="tx1"/>
+                </a:solidFill>
+                <a:latin typeface="+mn-lt"/>
+                <a:ea typeface="+mn-ea"/>
+                <a:cs typeface="+mn-cs"/>
+              </a:defRPr>
+            </a:lvl9pPr>
+          </a:lstStyle>
+          <a:p>
+            <a:pPr algn="r"/>
+            <a:r>
+              <a:rPr lang="en-GB" b="1" dirty="0" err="1">
+                <a:solidFill>
+                  <a:schemeClr val="bg1"/>
+                </a:solidFill>
+              </a:rPr>
+              <a:t>PalmEmanuel</a:t>
+            </a:r>
+            <a:r>
+              <a:rPr lang="en-GB" b="1" dirty="0">
+                <a:solidFill>
+                  <a:schemeClr val="bg1"/>
+                </a:solidFill>
+              </a:rPr>
+              <a:t>/PSDayUK2023</a:t>
+            </a:r>
+          </a:p>
+        </p:txBody>
+      </p:sp>
     </p:spTree>
     <p:extLst>
       <p:ext uri="{BB962C8B-B14F-4D97-AF65-F5344CB8AC3E}">
@@ -13842,6 +14055,147 @@
                 <a:cs typeface="Cascadia Code" panose="020B0609020000020004" pitchFamily="49" charset="0"/>
               </a:rPr>
               <a:t>You can use the Durable Functions API for operations not exposed through the PowerShell module.</a:t>
+            </a:r>
+          </a:p>
+        </p:txBody>
+      </p:sp>
+      <p:sp>
+        <p:nvSpPr>
+          <p:cNvPr id="4" name="Espace réservé du numéro de diapositive 5">
+            <a:extLst>
+              <a:ext uri="{FF2B5EF4-FFF2-40B4-BE49-F238E27FC236}">
+                <a16:creationId xmlns:a16="http://schemas.microsoft.com/office/drawing/2014/main" id="{3B1BC02B-DA52-5B39-2570-7B130C181679}"/>
+              </a:ext>
+            </a:extLst>
+          </p:cNvPr>
+          <p:cNvSpPr txBox="1">
+            <a:spLocks/>
+          </p:cNvSpPr>
+          <p:nvPr/>
+        </p:nvSpPr>
+        <p:spPr>
+          <a:xfrm>
+            <a:off x="3188970" y="6361363"/>
+            <a:ext cx="2954965" cy="365125"/>
+          </a:xfrm>
+          <a:prstGeom prst="rect">
+            <a:avLst/>
+          </a:prstGeom>
+        </p:spPr>
+        <p:txBody>
+          <a:bodyPr/>
+          <a:lstStyle>
+            <a:defPPr>
+              <a:defRPr lang="en-US"/>
+            </a:defPPr>
+            <a:lvl1pPr marL="0" algn="l" defTabSz="914400" rtl="0" eaLnBrk="1" latinLnBrk="0" hangingPunct="1">
+              <a:defRPr sz="1800" kern="1200">
+                <a:solidFill>
+                  <a:schemeClr val="tx1"/>
+                </a:solidFill>
+                <a:latin typeface="+mn-lt"/>
+                <a:ea typeface="+mn-ea"/>
+                <a:cs typeface="+mn-cs"/>
+              </a:defRPr>
+            </a:lvl1pPr>
+            <a:lvl2pPr marL="457200" algn="l" defTabSz="914400" rtl="0" eaLnBrk="1" latinLnBrk="0" hangingPunct="1">
+              <a:defRPr sz="1800" kern="1200">
+                <a:solidFill>
+                  <a:schemeClr val="tx1"/>
+                </a:solidFill>
+                <a:latin typeface="+mn-lt"/>
+                <a:ea typeface="+mn-ea"/>
+                <a:cs typeface="+mn-cs"/>
+              </a:defRPr>
+            </a:lvl2pPr>
+            <a:lvl3pPr marL="914400" algn="l" defTabSz="914400" rtl="0" eaLnBrk="1" latinLnBrk="0" hangingPunct="1">
+              <a:defRPr sz="1800" kern="1200">
+                <a:solidFill>
+                  <a:schemeClr val="tx1"/>
+                </a:solidFill>
+                <a:latin typeface="+mn-lt"/>
+                <a:ea typeface="+mn-ea"/>
+                <a:cs typeface="+mn-cs"/>
+              </a:defRPr>
+            </a:lvl3pPr>
+            <a:lvl4pPr marL="1371600" algn="l" defTabSz="914400" rtl="0" eaLnBrk="1" latinLnBrk="0" hangingPunct="1">
+              <a:defRPr sz="1800" kern="1200">
+                <a:solidFill>
+                  <a:schemeClr val="tx1"/>
+                </a:solidFill>
+                <a:latin typeface="+mn-lt"/>
+                <a:ea typeface="+mn-ea"/>
+                <a:cs typeface="+mn-cs"/>
+              </a:defRPr>
+            </a:lvl4pPr>
+            <a:lvl5pPr marL="1828800" algn="l" defTabSz="914400" rtl="0" eaLnBrk="1" latinLnBrk="0" hangingPunct="1">
+              <a:defRPr sz="1800" kern="1200">
+                <a:solidFill>
+                  <a:schemeClr val="tx1"/>
+                </a:solidFill>
+                <a:latin typeface="+mn-lt"/>
+                <a:ea typeface="+mn-ea"/>
+                <a:cs typeface="+mn-cs"/>
+              </a:defRPr>
+            </a:lvl5pPr>
+            <a:lvl6pPr marL="2286000" algn="l" defTabSz="914400" rtl="0" eaLnBrk="1" latinLnBrk="0" hangingPunct="1">
+              <a:defRPr sz="1800" kern="1200">
+                <a:solidFill>
+                  <a:schemeClr val="tx1"/>
+                </a:solidFill>
+                <a:latin typeface="+mn-lt"/>
+                <a:ea typeface="+mn-ea"/>
+                <a:cs typeface="+mn-cs"/>
+              </a:defRPr>
+            </a:lvl6pPr>
+            <a:lvl7pPr marL="2743200" algn="l" defTabSz="914400" rtl="0" eaLnBrk="1" latinLnBrk="0" hangingPunct="1">
+              <a:defRPr sz="1800" kern="1200">
+                <a:solidFill>
+                  <a:schemeClr val="tx1"/>
+                </a:solidFill>
+                <a:latin typeface="+mn-lt"/>
+                <a:ea typeface="+mn-ea"/>
+                <a:cs typeface="+mn-cs"/>
+              </a:defRPr>
+            </a:lvl7pPr>
+            <a:lvl8pPr marL="3200400" algn="l" defTabSz="914400" rtl="0" eaLnBrk="1" latinLnBrk="0" hangingPunct="1">
+              <a:defRPr sz="1800" kern="1200">
+                <a:solidFill>
+                  <a:schemeClr val="tx1"/>
+                </a:solidFill>
+                <a:latin typeface="+mn-lt"/>
+                <a:ea typeface="+mn-ea"/>
+                <a:cs typeface="+mn-cs"/>
+              </a:defRPr>
+            </a:lvl8pPr>
+            <a:lvl9pPr marL="3657600" algn="l" defTabSz="914400" rtl="0" eaLnBrk="1" latinLnBrk="0" hangingPunct="1">
+              <a:defRPr sz="1800" kern="1200">
+                <a:solidFill>
+                  <a:schemeClr val="tx1"/>
+                </a:solidFill>
+                <a:latin typeface="+mn-lt"/>
+                <a:ea typeface="+mn-ea"/>
+                <a:cs typeface="+mn-cs"/>
+              </a:defRPr>
+            </a:lvl9pPr>
+          </a:lstStyle>
+          <a:p>
+            <a:pPr algn="r"/>
+            <a:r>
+              <a:rPr lang="en-GB" b="1" dirty="0" err="1">
+                <a:solidFill>
+                  <a:schemeClr val="bg1"/>
+                </a:solidFill>
+              </a:rPr>
+              <a:t>PalmEmanuel</a:t>
+            </a:r>
+            <a:r>
+              <a:rPr lang="en-GB" b="1" dirty="0">
+                <a:solidFill>
+                  <a:schemeClr val="bg1"/>
+                </a:solidFill>
+              </a:rPr>
+              <a:t>/PSDayUK2023</a:t>
             </a:r>
           </a:p>
         </p:txBody>
@@ -17080,6 +17434,78 @@
           </a:prstGeom>
         </p:spPr>
       </p:pic>
+      <p:sp>
+        <p:nvSpPr>
+          <p:cNvPr id="4" name="TextBox 3">
+            <a:extLst>
+              <a:ext uri="{FF2B5EF4-FFF2-40B4-BE49-F238E27FC236}">
+                <a16:creationId xmlns:a16="http://schemas.microsoft.com/office/drawing/2014/main" id="{B4996E2D-30C1-FEF3-EF59-17CB0D46FB98}"/>
+              </a:ext>
+            </a:extLst>
+          </p:cNvPr>
+          <p:cNvSpPr txBox="1"/>
+          <p:nvPr/>
+        </p:nvSpPr>
+        <p:spPr>
+          <a:xfrm>
+            <a:off x="9582763" y="6606960"/>
+            <a:ext cx="2773983" cy="246221"/>
+          </a:xfrm>
+          <a:prstGeom prst="rect">
+            <a:avLst/>
+          </a:prstGeom>
+          <a:noFill/>
+        </p:spPr>
+        <p:txBody>
+          <a:bodyPr wrap="square" rtlCol="0">
+            <a:spAutoFit/>
+          </a:bodyPr>
+          <a:lstStyle/>
+          <a:p>
+            <a:r>
+              <a:rPr lang="en-US" sz="1000" dirty="0">
+                <a:solidFill>
+                  <a:schemeClr val="tx1">
+                    <a:lumMod val="50000"/>
+                    <a:lumOff val="50000"/>
+                  </a:schemeClr>
+                </a:solidFill>
+              </a:rPr>
+              <a:t>Image: Durable Functions 2.0 @ </a:t>
+            </a:r>
+            <a:r>
+              <a:rPr lang="en-US" sz="1000" dirty="0" err="1">
+                <a:solidFill>
+                  <a:schemeClr val="tx1">
+                    <a:lumMod val="50000"/>
+                    <a:lumOff val="50000"/>
+                  </a:schemeClr>
+                </a:solidFill>
+              </a:rPr>
+              <a:t>.Net</a:t>
+            </a:r>
+            <a:r>
+              <a:rPr lang="en-US" sz="1000" dirty="0">
+                <a:solidFill>
+                  <a:schemeClr val="tx1">
+                    <a:lumMod val="50000"/>
+                    <a:lumOff val="50000"/>
+                  </a:schemeClr>
+                </a:solidFill>
+              </a:rPr>
+              <a:t> Conf 2019</a:t>
+            </a:r>
+            <a:endParaRPr lang="en-SE" sz="1000" dirty="0">
+              <a:solidFill>
+                <a:schemeClr val="tx1">
+                  <a:lumMod val="50000"/>
+                  <a:lumOff val="50000"/>
+                </a:schemeClr>
+              </a:solidFill>
+            </a:endParaRPr>
+          </a:p>
+        </p:txBody>
+      </p:sp>
     </p:spTree>
     <p:extLst>
       <p:ext uri="{BB962C8B-B14F-4D97-AF65-F5344CB8AC3E}">
@@ -17241,6 +17667,41 @@
                                   </p:childTnLst>
                                 </p:cTn>
                               </p:par>
+                              <p:par>
+                                <p:cTn id="16" presetID="10" presetClass="entr" presetSubtype="0" fill="hold" grpId="0" nodeType="withEffect">
+                                  <p:stCondLst>
+                                    <p:cond delay="500"/>
+                                  </p:stCondLst>
+                                  <p:childTnLst>
+                                    <p:set>
+                                      <p:cBhvr>
+                                        <p:cTn id="17" dur="1" fill="hold">
+                                          <p:stCondLst>
+                                            <p:cond delay="0"/>
+                                          </p:stCondLst>
+                                        </p:cTn>
+                                        <p:tgtEl>
+                                          <p:spTgt spid="4"/>
+                                        </p:tgtEl>
+                                        <p:attrNameLst>
+                                          <p:attrName>style.visibility</p:attrName>
+                                        </p:attrNameLst>
+                                      </p:cBhvr>
+                                      <p:to>
+                                        <p:strVal val="visible"/>
+                                      </p:to>
+                                    </p:set>
+                                    <p:animEffect transition="in" filter="fade">
+                                      <p:cBhvr>
+                                        <p:cTn id="18" dur="500"/>
+                                        <p:tgtEl>
+                                          <p:spTgt spid="4"/>
+                                        </p:tgtEl>
+                                      </p:cBhvr>
+                                    </p:animEffect>
+                                  </p:childTnLst>
+                                </p:cTn>
+                              </p:par>
                             </p:childTnLst>
                           </p:cTn>
                         </p:par>
@@ -17248,26 +17709,26 @@
                     </p:cTn>
                   </p:par>
                   <p:par>
-                    <p:cTn id="16" fill="hold">
+                    <p:cTn id="19" fill="hold">
                       <p:stCondLst>
                         <p:cond delay="indefinite"/>
                       </p:stCondLst>
                       <p:childTnLst>
                         <p:par>
-                          <p:cTn id="17" fill="hold">
+                          <p:cTn id="20" fill="hold">
                             <p:stCondLst>
                               <p:cond delay="0"/>
                             </p:stCondLst>
                             <p:childTnLst>
                               <p:par>
-                                <p:cTn id="18" presetID="10" presetClass="entr" presetSubtype="0" fill="hold" nodeType="clickEffect">
+                                <p:cTn id="21" presetID="10" presetClass="entr" presetSubtype="0" fill="hold" nodeType="clickEffect">
                                   <p:stCondLst>
                                     <p:cond delay="0"/>
                                   </p:stCondLst>
                                   <p:childTnLst>
                                     <p:set>
                                       <p:cBhvr>
-                                        <p:cTn id="19" dur="1" fill="hold">
+                                        <p:cTn id="22" dur="1" fill="hold">
                                           <p:stCondLst>
                                             <p:cond delay="0"/>
                                           </p:stCondLst>
@@ -17285,7 +17746,7 @@
                                     </p:set>
                                     <p:animEffect transition="in" filter="fade">
                                       <p:cBhvr>
-                                        <p:cTn id="20" dur="500"/>
+                                        <p:cTn id="23" dur="500"/>
                                         <p:tgtEl>
                                           <p:spTgt spid="11"/>
                                         </p:tgtEl>
@@ -17301,26 +17762,26 @@
                     </p:cTn>
                   </p:par>
                   <p:par>
-                    <p:cTn id="21" fill="hold">
+                    <p:cTn id="24" fill="hold">
                       <p:stCondLst>
                         <p:cond delay="indefinite"/>
                       </p:stCondLst>
                       <p:childTnLst>
                         <p:par>
-                          <p:cTn id="22" fill="hold">
+                          <p:cTn id="25" fill="hold">
                             <p:stCondLst>
                               <p:cond delay="0"/>
                             </p:stCondLst>
                             <p:childTnLst>
                               <p:par>
-                                <p:cTn id="23" presetID="10" presetClass="entr" presetSubtype="0" fill="hold" nodeType="clickEffect">
+                                <p:cTn id="26" presetID="10" presetClass="entr" presetSubtype="0" fill="hold" nodeType="clickEffect">
                                   <p:stCondLst>
                                     <p:cond delay="0"/>
                                   </p:stCondLst>
                                   <p:childTnLst>
                                     <p:set>
                                       <p:cBhvr>
-                                        <p:cTn id="24" dur="1" fill="hold">
+                                        <p:cTn id="27" dur="1" fill="hold">
                                           <p:stCondLst>
                                             <p:cond delay="0"/>
                                           </p:stCondLst>
@@ -17338,7 +17799,7 @@
                                     </p:set>
                                     <p:animEffect transition="in" filter="fade">
                                       <p:cBhvr>
-                                        <p:cTn id="25" dur="500"/>
+                                        <p:cTn id="28" dur="500"/>
                                         <p:tgtEl>
                                           <p:spTgt spid="13"/>
                                         </p:tgtEl>
@@ -17354,26 +17815,26 @@
                     </p:cTn>
                   </p:par>
                   <p:par>
-                    <p:cTn id="26" fill="hold">
+                    <p:cTn id="29" fill="hold">
                       <p:stCondLst>
                         <p:cond delay="indefinite"/>
                       </p:stCondLst>
                       <p:childTnLst>
                         <p:par>
-                          <p:cTn id="27" fill="hold">
+                          <p:cTn id="30" fill="hold">
                             <p:stCondLst>
                               <p:cond delay="0"/>
                             </p:stCondLst>
                             <p:childTnLst>
                               <p:par>
-                                <p:cTn id="28" presetID="10" presetClass="entr" presetSubtype="0" fill="hold" nodeType="clickEffect">
+                                <p:cTn id="31" presetID="10" presetClass="entr" presetSubtype="0" fill="hold" nodeType="clickEffect">
                                   <p:stCondLst>
                                     <p:cond delay="0"/>
                                   </p:stCondLst>
                                   <p:childTnLst>
                                     <p:set>
                                       <p:cBhvr>
-                                        <p:cTn id="29" dur="1" fill="hold">
+                                        <p:cTn id="32" dur="1" fill="hold">
                                           <p:stCondLst>
                                             <p:cond delay="0"/>
                                           </p:stCondLst>
@@ -17391,7 +17852,7 @@
                                     </p:set>
                                     <p:animEffect transition="in" filter="fade">
                                       <p:cBhvr>
-                                        <p:cTn id="30" dur="500"/>
+                                        <p:cTn id="33" dur="500"/>
                                         <p:tgtEl>
                                           <p:spTgt spid="15"/>
                                         </p:tgtEl>
@@ -17407,26 +17868,26 @@
                     </p:cTn>
                   </p:par>
                   <p:par>
-                    <p:cTn id="31" fill="hold">
+                    <p:cTn id="34" fill="hold">
                       <p:stCondLst>
                         <p:cond delay="indefinite"/>
                       </p:stCondLst>
                       <p:childTnLst>
                         <p:par>
-                          <p:cTn id="32" fill="hold">
+                          <p:cTn id="35" fill="hold">
                             <p:stCondLst>
                               <p:cond delay="0"/>
                             </p:stCondLst>
                             <p:childTnLst>
                               <p:par>
-                                <p:cTn id="33" presetID="10" presetClass="entr" presetSubtype="0" fill="hold" nodeType="clickEffect">
+                                <p:cTn id="36" presetID="10" presetClass="entr" presetSubtype="0" fill="hold" nodeType="clickEffect">
                                   <p:stCondLst>
                                     <p:cond delay="0"/>
                                   </p:stCondLst>
                                   <p:childTnLst>
                                     <p:set>
                                       <p:cBhvr>
-                                        <p:cTn id="34" dur="1" fill="hold">
+                                        <p:cTn id="37" dur="1" fill="hold">
                                           <p:stCondLst>
                                             <p:cond delay="0"/>
                                           </p:stCondLst>
@@ -17444,7 +17905,7 @@
                                     </p:set>
                                     <p:animEffect transition="in" filter="fade">
                                       <p:cBhvr>
-                                        <p:cTn id="35" dur="500"/>
+                                        <p:cTn id="38" dur="500"/>
                                         <p:tgtEl>
                                           <p:spTgt spid="17"/>
                                         </p:tgtEl>
@@ -17460,26 +17921,26 @@
                     </p:cTn>
                   </p:par>
                   <p:par>
-                    <p:cTn id="36" fill="hold">
+                    <p:cTn id="39" fill="hold">
                       <p:stCondLst>
                         <p:cond delay="indefinite"/>
                       </p:stCondLst>
                       <p:childTnLst>
                         <p:par>
-                          <p:cTn id="37" fill="hold">
+                          <p:cTn id="40" fill="hold">
                             <p:stCondLst>
                               <p:cond delay="0"/>
                             </p:stCondLst>
                             <p:childTnLst>
                               <p:par>
-                                <p:cTn id="38" presetID="10" presetClass="entr" presetSubtype="0" fill="hold" nodeType="clickEffect">
+                                <p:cTn id="41" presetID="10" presetClass="entr" presetSubtype="0" fill="hold" nodeType="clickEffect">
                                   <p:stCondLst>
                                     <p:cond delay="0"/>
                                   </p:stCondLst>
                                   <p:childTnLst>
                                     <p:set>
                                       <p:cBhvr>
-                                        <p:cTn id="39" dur="1" fill="hold">
+                                        <p:cTn id="42" dur="1" fill="hold">
                                           <p:stCondLst>
                                             <p:cond delay="0"/>
                                           </p:stCondLst>
@@ -17497,7 +17958,7 @@
                                     </p:set>
                                     <p:animEffect transition="in" filter="fade">
                                       <p:cBhvr>
-                                        <p:cTn id="40" dur="500"/>
+                                        <p:cTn id="43" dur="500"/>
                                         <p:tgtEl>
                                           <p:spTgt spid="19"/>
                                         </p:tgtEl>
@@ -17513,26 +17974,26 @@
                     </p:cTn>
                   </p:par>
                   <p:par>
-                    <p:cTn id="41" fill="hold">
+                    <p:cTn id="44" fill="hold">
                       <p:stCondLst>
                         <p:cond delay="indefinite"/>
                       </p:stCondLst>
                       <p:childTnLst>
                         <p:par>
-                          <p:cTn id="42" fill="hold">
+                          <p:cTn id="45" fill="hold">
                             <p:stCondLst>
                               <p:cond delay="0"/>
                             </p:stCondLst>
                             <p:childTnLst>
                               <p:par>
-                                <p:cTn id="43" presetID="10" presetClass="exit" presetSubtype="0" fill="hold" grpId="1" nodeType="clickEffect">
+                                <p:cTn id="46" presetID="10" presetClass="exit" presetSubtype="0" fill="hold" grpId="1" nodeType="clickEffect">
                                   <p:stCondLst>
                                     <p:cond delay="500"/>
                                   </p:stCondLst>
                                   <p:childTnLst>
                                     <p:animEffect transition="out" filter="fade">
                                       <p:cBhvr>
-                                        <p:cTn id="44" dur="500"/>
+                                        <p:cTn id="47" dur="500"/>
                                         <p:tgtEl>
                                           <p:spTgt spid="34"/>
                                         </p:tgtEl>
@@ -17540,7 +18001,7 @@
                                     </p:animEffect>
                                     <p:set>
                                       <p:cBhvr>
-                                        <p:cTn id="45" dur="1" fill="hold">
+                                        <p:cTn id="48" dur="1" fill="hold">
                                           <p:stCondLst>
                                             <p:cond delay="499"/>
                                           </p:stCondLst>
@@ -17560,51 +18021,16 @@
                                 </p:cTn>
                               </p:par>
                               <p:par>
-                                <p:cTn id="46" presetID="10" presetClass="exit" presetSubtype="0" fill="hold" nodeType="withEffect">
+                                <p:cTn id="49" presetID="10" presetClass="exit" presetSubtype="0" fill="hold" grpId="1" nodeType="withEffect">
                                   <p:stCondLst>
-                                    <p:cond delay="0"/>
-                                  </p:stCondLst>
-                                  <p:childTnLst>
-                                    <p:animEffect transition="out" filter="fade">
-                                      <p:cBhvr>
-                                        <p:cTn id="47" dur="500"/>
-                                        <p:tgtEl>
-                                          <p:spTgt spid="9"/>
-                                        </p:tgtEl>
-                                      </p:cBhvr>
-                                    </p:animEffect>
-                                    <p:set>
-                                      <p:cBhvr>
-                                        <p:cTn id="48" dur="1" fill="hold">
-                                          <p:stCondLst>
-                                            <p:cond delay="499"/>
-                                          </p:stCondLst>
-                                        </p:cTn>
-                                        <p:tgtEl>
-                                          <p:spTgt spid="9"/>
-                                        </p:tgtEl>
-                                        <p:attrNameLst>
-                                          <p:attrName>style.visibility</p:attrName>
-                                        </p:attrNameLst>
-                                      </p:cBhvr>
-                                      <p:to>
-                                        <p:strVal val="hidden"/>
-                                      </p:to>
-                                    </p:set>
-                                  </p:childTnLst>
-                                </p:cTn>
-                              </p:par>
-                              <p:par>
-                                <p:cTn id="49" presetID="10" presetClass="exit" presetSubtype="0" fill="hold" nodeType="withEffect">
-                                  <p:stCondLst>
-                                    <p:cond delay="0"/>
+                                    <p:cond delay="500"/>
                                   </p:stCondLst>
                                   <p:childTnLst>
                                     <p:animEffect transition="out" filter="fade">
                                       <p:cBhvr>
                                         <p:cTn id="50" dur="500"/>
                                         <p:tgtEl>
-                                          <p:spTgt spid="15"/>
+                                          <p:spTgt spid="4"/>
                                         </p:tgtEl>
                                       </p:cBhvr>
                                     </p:animEffect>
@@ -17616,7 +18042,7 @@
                                           </p:stCondLst>
                                         </p:cTn>
                                         <p:tgtEl>
-                                          <p:spTgt spid="15"/>
+                                          <p:spTgt spid="4"/>
                                         </p:tgtEl>
                                         <p:attrNameLst>
                                           <p:attrName>style.visibility</p:attrName>
@@ -17639,7 +18065,7 @@
                                       <p:cBhvr>
                                         <p:cTn id="53" dur="500"/>
                                         <p:tgtEl>
-                                          <p:spTgt spid="11"/>
+                                          <p:spTgt spid="9"/>
                                         </p:tgtEl>
                                       </p:cBhvr>
                                     </p:animEffect>
@@ -17651,7 +18077,7 @@
                                           </p:stCondLst>
                                         </p:cTn>
                                         <p:tgtEl>
-                                          <p:spTgt spid="11"/>
+                                          <p:spTgt spid="9"/>
                                         </p:tgtEl>
                                         <p:attrNameLst>
                                           <p:attrName>style.visibility</p:attrName>
@@ -17674,7 +18100,7 @@
                                       <p:cBhvr>
                                         <p:cTn id="56" dur="500"/>
                                         <p:tgtEl>
-                                          <p:spTgt spid="17"/>
+                                          <p:spTgt spid="15"/>
                                         </p:tgtEl>
                                       </p:cBhvr>
                                     </p:animEffect>
@@ -17686,7 +18112,7 @@
                                           </p:stCondLst>
                                         </p:cTn>
                                         <p:tgtEl>
-                                          <p:spTgt spid="17"/>
+                                          <p:spTgt spid="15"/>
                                         </p:tgtEl>
                                         <p:attrNameLst>
                                           <p:attrName>style.visibility</p:attrName>
@@ -17709,7 +18135,7 @@
                                       <p:cBhvr>
                                         <p:cTn id="59" dur="500"/>
                                         <p:tgtEl>
-                                          <p:spTgt spid="13"/>
+                                          <p:spTgt spid="11"/>
                                         </p:tgtEl>
                                       </p:cBhvr>
                                     </p:animEffect>
@@ -17721,7 +18147,7 @@
                                           </p:stCondLst>
                                         </p:cTn>
                                         <p:tgtEl>
-                                          <p:spTgt spid="13"/>
+                                          <p:spTgt spid="11"/>
                                         </p:tgtEl>
                                         <p:attrNameLst>
                                           <p:attrName>style.visibility</p:attrName>
@@ -17744,13 +18170,83 @@
                                       <p:cBhvr>
                                         <p:cTn id="62" dur="500"/>
                                         <p:tgtEl>
+                                          <p:spTgt spid="17"/>
+                                        </p:tgtEl>
+                                      </p:cBhvr>
+                                    </p:animEffect>
+                                    <p:set>
+                                      <p:cBhvr>
+                                        <p:cTn id="63" dur="1" fill="hold">
+                                          <p:stCondLst>
+                                            <p:cond delay="499"/>
+                                          </p:stCondLst>
+                                        </p:cTn>
+                                        <p:tgtEl>
+                                          <p:spTgt spid="17"/>
+                                        </p:tgtEl>
+                                        <p:attrNameLst>
+                                          <p:attrName>style.visibility</p:attrName>
+                                        </p:attrNameLst>
+                                      </p:cBhvr>
+                                      <p:to>
+                                        <p:strVal val="hidden"/>
+                                      </p:to>
+                                    </p:set>
+                                  </p:childTnLst>
+                                </p:cTn>
+                              </p:par>
+                              <p:par>
+                                <p:cTn id="64" presetID="10" presetClass="exit" presetSubtype="0" fill="hold" nodeType="withEffect">
+                                  <p:stCondLst>
+                                    <p:cond delay="0"/>
+                                  </p:stCondLst>
+                                  <p:childTnLst>
+                                    <p:animEffect transition="out" filter="fade">
+                                      <p:cBhvr>
+                                        <p:cTn id="65" dur="500"/>
+                                        <p:tgtEl>
+                                          <p:spTgt spid="13"/>
+                                        </p:tgtEl>
+                                      </p:cBhvr>
+                                    </p:animEffect>
+                                    <p:set>
+                                      <p:cBhvr>
+                                        <p:cTn id="66" dur="1" fill="hold">
+                                          <p:stCondLst>
+                                            <p:cond delay="499"/>
+                                          </p:stCondLst>
+                                        </p:cTn>
+                                        <p:tgtEl>
+                                          <p:spTgt spid="13"/>
+                                        </p:tgtEl>
+                                        <p:attrNameLst>
+                                          <p:attrName>style.visibility</p:attrName>
+                                        </p:attrNameLst>
+                                      </p:cBhvr>
+                                      <p:to>
+                                        <p:strVal val="hidden"/>
+                                      </p:to>
+                                    </p:set>
+                                  </p:childTnLst>
+                                </p:cTn>
+                              </p:par>
+                              <p:par>
+                                <p:cTn id="67" presetID="10" presetClass="exit" presetSubtype="0" fill="hold" nodeType="withEffect">
+                                  <p:stCondLst>
+                                    <p:cond delay="0"/>
+                                  </p:stCondLst>
+                                  <p:childTnLst>
+                                    <p:animEffect transition="out" filter="fade">
+                                      <p:cBhvr>
+                                        <p:cTn id="68" dur="500"/>
+                                        <p:tgtEl>
                                           <p:spTgt spid="19"/>
                                         </p:tgtEl>
                                       </p:cBhvr>
                                     </p:animEffect>
                                     <p:set>
                                       <p:cBhvr>
-                                        <p:cTn id="63" dur="1" fill="hold">
+                                        <p:cTn id="69" dur="1" fill="hold">
                                           <p:stCondLst>
                                             <p:cond delay="499"/>
                                           </p:stCondLst>
@@ -17770,14 +18266,14 @@
                                 </p:cTn>
                               </p:par>
                               <p:par>
-                                <p:cTn id="64" presetID="10" presetClass="entr" presetSubtype="0" fill="hold" grpId="0" nodeType="withEffect">
+                                <p:cTn id="70" presetID="10" presetClass="entr" presetSubtype="0" fill="hold" grpId="0" nodeType="withEffect">
                                   <p:stCondLst>
                                     <p:cond delay="500"/>
                                   </p:stCondLst>
                                   <p:childTnLst>
                                     <p:set>
                                       <p:cBhvr>
-                                        <p:cTn id="65" dur="1" fill="hold">
+                                        <p:cTn id="71" dur="1" fill="hold">
                                           <p:stCondLst>
                                             <p:cond delay="0"/>
                                           </p:stCondLst>
@@ -17799,7 +18295,7 @@
                                     </p:set>
                                     <p:animEffect transition="in" filter="fade">
                                       <p:cBhvr>
-                                        <p:cTn id="66" dur="500"/>
+                                        <p:cTn id="72" dur="500"/>
                                         <p:tgtEl>
                                           <p:spTgt spid="3">
                                             <p:txEl>
@@ -17813,14 +18309,14 @@
                                 </p:cTn>
                               </p:par>
                               <p:par>
-                                <p:cTn id="67" presetID="10" presetClass="entr" presetSubtype="0" fill="hold" grpId="0" nodeType="withEffect">
+                                <p:cTn id="73" presetID="10" presetClass="entr" presetSubtype="0" fill="hold" grpId="0" nodeType="withEffect">
                                   <p:stCondLst>
-                                    <p:cond delay="0"/>
+                                    <p:cond delay="500"/>
                                   </p:stCondLst>
                                   <p:childTnLst>
                                     <p:set>
                                       <p:cBhvr>
-                                        <p:cTn id="68" dur="1" fill="hold">
+                                        <p:cTn id="74" dur="1" fill="hold">
                                           <p:stCondLst>
                                             <p:cond delay="0"/>
                                           </p:stCondLst>
@@ -17842,7 +18338,7 @@
                                     </p:set>
                                     <p:animEffect transition="in" filter="fade">
                                       <p:cBhvr>
-                                        <p:cTn id="69" dur="500"/>
+                                        <p:cTn id="75" dur="500"/>
                                         <p:tgtEl>
                                           <p:spTgt spid="3">
                                             <p:txEl>
@@ -17862,26 +18358,26 @@
                     </p:cTn>
                   </p:par>
                   <p:par>
-                    <p:cTn id="70" fill="hold">
+                    <p:cTn id="76" fill="hold">
                       <p:stCondLst>
                         <p:cond delay="indefinite"/>
                       </p:stCondLst>
                       <p:childTnLst>
                         <p:par>
-                          <p:cTn id="71" fill="hold">
+                          <p:cTn id="77" fill="hold">
                             <p:stCondLst>
                               <p:cond delay="0"/>
                             </p:stCondLst>
                             <p:childTnLst>
                               <p:par>
-                                <p:cTn id="72" presetID="10" presetClass="entr" presetSubtype="0" fill="hold" grpId="0" nodeType="clickEffect">
+                                <p:cTn id="78" presetID="10" presetClass="entr" presetSubtype="0" fill="hold" grpId="0" nodeType="clickEffect">
                                   <p:stCondLst>
                                     <p:cond delay="0"/>
                                   </p:stCondLst>
                                   <p:childTnLst>
                                     <p:set>
                                       <p:cBhvr>
-                                        <p:cTn id="73" dur="1" fill="hold">
+                                        <p:cTn id="79" dur="1" fill="hold">
                                           <p:stCondLst>
                                             <p:cond delay="0"/>
                                           </p:stCondLst>
@@ -17903,7 +18399,7 @@
                                     </p:set>
                                     <p:animEffect transition="in" filter="fade">
                                       <p:cBhvr>
-                                        <p:cTn id="74" dur="500"/>
+                                        <p:cTn id="80" dur="500"/>
                                         <p:tgtEl>
                                           <p:spTgt spid="3">
                                             <p:txEl>
@@ -17923,26 +18419,26 @@
                     </p:cTn>
                   </p:par>
                   <p:par>
-                    <p:cTn id="75" fill="hold">
+                    <p:cTn id="81" fill="hold">
                       <p:stCondLst>
                         <p:cond delay="indefinite"/>
                       </p:stCondLst>
                       <p:childTnLst>
                         <p:par>
-                          <p:cTn id="76" fill="hold">
+                          <p:cTn id="82" fill="hold">
                             <p:stCondLst>
                               <p:cond delay="0"/>
                             </p:stCondLst>
                             <p:childTnLst>
                               <p:par>
-                                <p:cTn id="77" presetID="10" presetClass="entr" presetSubtype="0" fill="hold" grpId="0" nodeType="clickEffect">
+                                <p:cTn id="83" presetID="10" presetClass="entr" presetSubtype="0" fill="hold" grpId="0" nodeType="clickEffect">
                                   <p:stCondLst>
                                     <p:cond delay="0"/>
                                   </p:stCondLst>
                                   <p:childTnLst>
                                     <p:set>
                                       <p:cBhvr>
-                                        <p:cTn id="78" dur="1" fill="hold">
+                                        <p:cTn id="84" dur="1" fill="hold">
                                           <p:stCondLst>
                                             <p:cond delay="0"/>
                                           </p:stCondLst>
@@ -17964,7 +18460,7 @@
                                     </p:set>
                                     <p:animEffect transition="in" filter="fade">
                                       <p:cBhvr>
-                                        <p:cTn id="79" dur="500"/>
+                                        <p:cTn id="85" dur="500"/>
                                         <p:tgtEl>
                                           <p:spTgt spid="3">
                                             <p:txEl>
@@ -18008,6 +18504,8 @@
       <p:bldP spid="3" grpId="0" uiExpand="1" build="p"/>
       <p:bldP spid="34" grpId="0" animBg="1"/>
       <p:bldP spid="34" grpId="1" animBg="1"/>
+      <p:bldP spid="4" grpId="0"/>
+      <p:bldP spid="4" grpId="1"/>
     </p:bldLst>
   </p:timing>
 </p:sld>
@@ -23168,15 +23666,12 @@
 </file>
 
 <file path=customXml/item1.xml><?xml version="1.0" encoding="utf-8"?>
-<p:properties xmlns:p="http://schemas.microsoft.com/office/2006/metadata/properties" xmlns:xsi="http://www.w3.org/2001/XMLSchema-instance" xmlns:pc="http://schemas.microsoft.com/office/infopath/2007/PartnerControls">
-  <documentManagement>
-    <MediaLengthInSeconds xmlns="5b653a37-a943-418c-a7e6-aa09ee196dc6" xsi:nil="true"/>
-    <TaxCatchAll xmlns="bd297347-8c74-4a03-a42f-06ff7841fbbf" xsi:nil="true"/>
-    <lcf76f155ced4ddcb4097134ff3c332f xmlns="5b653a37-a943-418c-a7e6-aa09ee196dc6">
-      <Terms xmlns="http://schemas.microsoft.com/office/infopath/2007/PartnerControls"/>
-    </lcf76f155ced4ddcb4097134ff3c332f>
-  </documentManagement>
-</p:properties>
+<?mso-contentType ?>
+<FormTemplates xmlns="http://schemas.microsoft.com/sharepoint/v3/contenttype/forms">
+  <Display>DocumentLibraryForm</Display>
+  <Edit>DocumentLibraryForm</Edit>
+  <New>DocumentLibraryForm</New>
+</FormTemplates>
 </file>
 
 <file path=customXml/item2.xml><?xml version="1.0" encoding="utf-8"?>
@@ -23397,23 +23892,21 @@
 </file>
 
 <file path=customXml/item3.xml><?xml version="1.0" encoding="utf-8"?>
-<?mso-contentType ?>
-<FormTemplates xmlns="http://schemas.microsoft.com/sharepoint/v3/contenttype/forms">
-  <Display>DocumentLibraryForm</Display>
-  <Edit>DocumentLibraryForm</Edit>
-  <New>DocumentLibraryForm</New>
-</FormTemplates>
+<p:properties xmlns:p="http://schemas.microsoft.com/office/2006/metadata/properties" xmlns:xsi="http://www.w3.org/2001/XMLSchema-instance" xmlns:pc="http://schemas.microsoft.com/office/infopath/2007/PartnerControls">
+  <documentManagement>
+    <MediaLengthInSeconds xmlns="5b653a37-a943-418c-a7e6-aa09ee196dc6" xsi:nil="true"/>
+    <TaxCatchAll xmlns="bd297347-8c74-4a03-a42f-06ff7841fbbf" xsi:nil="true"/>
+    <lcf76f155ced4ddcb4097134ff3c332f xmlns="5b653a37-a943-418c-a7e6-aa09ee196dc6">
+      <Terms xmlns="http://schemas.microsoft.com/office/infopath/2007/PartnerControls"/>
+    </lcf76f155ced4ddcb4097134ff3c332f>
+  </documentManagement>
+</p:properties>
 </file>
 
 <file path=customXml/itemProps1.xml><?xml version="1.0" encoding="utf-8"?>
-<ds:datastoreItem xmlns:ds="http://schemas.openxmlformats.org/officeDocument/2006/customXml" ds:itemID="{D6E60845-C3D9-4D03-A1AD-12FE491785E0}">
+<ds:datastoreItem xmlns:ds="http://schemas.openxmlformats.org/officeDocument/2006/customXml" ds:itemID="{F79F2385-5F5D-40A9-91E4-EC41CD22028D}">
   <ds:schemaRefs>
-    <ds:schemaRef ds:uri="http://schemas.microsoft.com/office/2006/metadata/properties"/>
-    <ds:schemaRef ds:uri="http://www.w3.org/2000/xmlns/"/>
-    <ds:schemaRef ds:uri="5b653a37-a943-418c-a7e6-aa09ee196dc6"/>
-    <ds:schemaRef ds:uri="http://www.w3.org/2001/XMLSchema-instance"/>
-    <ds:schemaRef ds:uri="bd297347-8c74-4a03-a42f-06ff7841fbbf"/>
-    <ds:schemaRef ds:uri="http://schemas.microsoft.com/office/infopath/2007/PartnerControls"/>
+    <ds:schemaRef ds:uri="http://schemas.microsoft.com/sharepoint/v3/contenttype/forms"/>
   </ds:schemaRefs>
 </ds:datastoreItem>
 </file>
@@ -23439,9 +23932,14 @@
 </file>
 
 <file path=customXml/itemProps3.xml><?xml version="1.0" encoding="utf-8"?>
-<ds:datastoreItem xmlns:ds="http://schemas.openxmlformats.org/officeDocument/2006/customXml" ds:itemID="{F79F2385-5F5D-40A9-91E4-EC41CD22028D}">
+<ds:datastoreItem xmlns:ds="http://schemas.openxmlformats.org/officeDocument/2006/customXml" ds:itemID="{D6E60845-C3D9-4D03-A1AD-12FE491785E0}">
   <ds:schemaRefs>
-    <ds:schemaRef ds:uri="http://schemas.microsoft.com/sharepoint/v3/contenttype/forms"/>
+    <ds:schemaRef ds:uri="http://schemas.microsoft.com/office/2006/metadata/properties"/>
+    <ds:schemaRef ds:uri="http://www.w3.org/2000/xmlns/"/>
+    <ds:schemaRef ds:uri="5b653a37-a943-418c-a7e6-aa09ee196dc6"/>
+    <ds:schemaRef ds:uri="http://www.w3.org/2001/XMLSchema-instance"/>
+    <ds:schemaRef ds:uri="bd297347-8c74-4a03-a42f-06ff7841fbbf"/>
+    <ds:schemaRef ds:uri="http://schemas.microsoft.com/office/infopath/2007/PartnerControls"/>
   </ds:schemaRefs>
 </ds:datastoreItem>
 </file>
</xml_diff>